<commit_message>
inclusão de diagrama de sequencia e ajuste apresentação
</commit_message>
<xml_diff>
--- a/docs_tcc/apresentacao_projeto_arquitetural_TCC.pptx
+++ b/docs_tcc/apresentacao_projeto_arquitetural_TCC.pptx
@@ -86,10 +86,8 @@
             <a:noAutofit/>
           </a:bodyPr>
           <a:p>
-            <a:endParaRPr b="0" lang="pt-BR" sz="3200" spc="-1" strike="noStrike">
-              <a:solidFill>
-                <a:srgbClr val="000000"/>
-              </a:solidFill>
+            <a:pPr algn="ctr"/>
+            <a:endParaRPr b="0" lang="pt-BR" sz="4400" spc="-1" strike="noStrike">
               <a:latin typeface="Arial"/>
             </a:endParaRPr>
           </a:p>
@@ -119,11 +117,8 @@
             <a:normAutofit/>
           </a:bodyPr>
           <a:p>
-            <a:endParaRPr b="0" lang="pt-BR" sz="2200" spc="-1" strike="noStrike">
-              <a:solidFill>
-                <a:srgbClr val="000000"/>
-              </a:solidFill>
-              <a:latin typeface="Trebuchet MS"/>
+            <a:endParaRPr b="0" lang="pt-BR" sz="3200" spc="-1" strike="noStrike">
+              <a:latin typeface="Arial"/>
             </a:endParaRPr>
           </a:p>
         </p:txBody>
@@ -152,11 +147,8 @@
             <a:normAutofit/>
           </a:bodyPr>
           <a:p>
-            <a:endParaRPr b="0" lang="pt-BR" sz="2200" spc="-1" strike="noStrike">
-              <a:solidFill>
-                <a:srgbClr val="000000"/>
-              </a:solidFill>
-              <a:latin typeface="Trebuchet MS"/>
+            <a:endParaRPr b="0" lang="pt-BR" sz="3200" spc="-1" strike="noStrike">
+              <a:latin typeface="Arial"/>
             </a:endParaRPr>
           </a:p>
         </p:txBody>
@@ -207,10 +199,8 @@
             <a:noAutofit/>
           </a:bodyPr>
           <a:p>
-            <a:endParaRPr b="0" lang="pt-BR" sz="3200" spc="-1" strike="noStrike">
-              <a:solidFill>
-                <a:srgbClr val="000000"/>
-              </a:solidFill>
+            <a:pPr algn="ctr"/>
+            <a:endParaRPr b="0" lang="pt-BR" sz="4400" spc="-1" strike="noStrike">
               <a:latin typeface="Arial"/>
             </a:endParaRPr>
           </a:p>
@@ -240,11 +230,8 @@
             <a:normAutofit/>
           </a:bodyPr>
           <a:p>
-            <a:endParaRPr b="0" lang="pt-BR" sz="2200" spc="-1" strike="noStrike">
-              <a:solidFill>
-                <a:srgbClr val="000000"/>
-              </a:solidFill>
-              <a:latin typeface="Trebuchet MS"/>
+            <a:endParaRPr b="0" lang="pt-BR" sz="3200" spc="-1" strike="noStrike">
+              <a:latin typeface="Arial"/>
             </a:endParaRPr>
           </a:p>
         </p:txBody>
@@ -273,11 +260,8 @@
             <a:normAutofit/>
           </a:bodyPr>
           <a:p>
-            <a:endParaRPr b="0" lang="pt-BR" sz="2200" spc="-1" strike="noStrike">
-              <a:solidFill>
-                <a:srgbClr val="000000"/>
-              </a:solidFill>
-              <a:latin typeface="Trebuchet MS"/>
+            <a:endParaRPr b="0" lang="pt-BR" sz="3200" spc="-1" strike="noStrike">
+              <a:latin typeface="Arial"/>
             </a:endParaRPr>
           </a:p>
         </p:txBody>
@@ -306,11 +290,8 @@
             <a:normAutofit/>
           </a:bodyPr>
           <a:p>
-            <a:endParaRPr b="0" lang="pt-BR" sz="2200" spc="-1" strike="noStrike">
-              <a:solidFill>
-                <a:srgbClr val="000000"/>
-              </a:solidFill>
-              <a:latin typeface="Trebuchet MS"/>
+            <a:endParaRPr b="0" lang="pt-BR" sz="3200" spc="-1" strike="noStrike">
+              <a:latin typeface="Arial"/>
             </a:endParaRPr>
           </a:p>
         </p:txBody>
@@ -339,11 +320,8 @@
             <a:normAutofit/>
           </a:bodyPr>
           <a:p>
-            <a:endParaRPr b="0" lang="pt-BR" sz="2200" spc="-1" strike="noStrike">
-              <a:solidFill>
-                <a:srgbClr val="000000"/>
-              </a:solidFill>
-              <a:latin typeface="Trebuchet MS"/>
+            <a:endParaRPr b="0" lang="pt-BR" sz="3200" spc="-1" strike="noStrike">
+              <a:latin typeface="Arial"/>
             </a:endParaRPr>
           </a:p>
         </p:txBody>
@@ -394,10 +372,8 @@
             <a:noAutofit/>
           </a:bodyPr>
           <a:p>
-            <a:endParaRPr b="0" lang="pt-BR" sz="3200" spc="-1" strike="noStrike">
-              <a:solidFill>
-                <a:srgbClr val="000000"/>
-              </a:solidFill>
+            <a:pPr algn="ctr"/>
+            <a:endParaRPr b="0" lang="pt-BR" sz="4400" spc="-1" strike="noStrike">
               <a:latin typeface="Arial"/>
             </a:endParaRPr>
           </a:p>
@@ -427,11 +403,8 @@
             <a:normAutofit/>
           </a:bodyPr>
           <a:p>
-            <a:endParaRPr b="0" lang="pt-BR" sz="2200" spc="-1" strike="noStrike">
-              <a:solidFill>
-                <a:srgbClr val="000000"/>
-              </a:solidFill>
-              <a:latin typeface="Trebuchet MS"/>
+            <a:endParaRPr b="0" lang="pt-BR" sz="3200" spc="-1" strike="noStrike">
+              <a:latin typeface="Arial"/>
             </a:endParaRPr>
           </a:p>
         </p:txBody>
@@ -460,11 +433,8 @@
             <a:normAutofit/>
           </a:bodyPr>
           <a:p>
-            <a:endParaRPr b="0" lang="pt-BR" sz="2200" spc="-1" strike="noStrike">
-              <a:solidFill>
-                <a:srgbClr val="000000"/>
-              </a:solidFill>
-              <a:latin typeface="Trebuchet MS"/>
+            <a:endParaRPr b="0" lang="pt-BR" sz="3200" spc="-1" strike="noStrike">
+              <a:latin typeface="Arial"/>
             </a:endParaRPr>
           </a:p>
         </p:txBody>
@@ -493,11 +463,8 @@
             <a:normAutofit/>
           </a:bodyPr>
           <a:p>
-            <a:endParaRPr b="0" lang="pt-BR" sz="2200" spc="-1" strike="noStrike">
-              <a:solidFill>
-                <a:srgbClr val="000000"/>
-              </a:solidFill>
-              <a:latin typeface="Trebuchet MS"/>
+            <a:endParaRPr b="0" lang="pt-BR" sz="3200" spc="-1" strike="noStrike">
+              <a:latin typeface="Arial"/>
             </a:endParaRPr>
           </a:p>
         </p:txBody>
@@ -526,11 +493,8 @@
             <a:normAutofit/>
           </a:bodyPr>
           <a:p>
-            <a:endParaRPr b="0" lang="pt-BR" sz="2200" spc="-1" strike="noStrike">
-              <a:solidFill>
-                <a:srgbClr val="000000"/>
-              </a:solidFill>
-              <a:latin typeface="Trebuchet MS"/>
+            <a:endParaRPr b="0" lang="pt-BR" sz="3200" spc="-1" strike="noStrike">
+              <a:latin typeface="Arial"/>
             </a:endParaRPr>
           </a:p>
         </p:txBody>
@@ -559,11 +523,8 @@
             <a:normAutofit/>
           </a:bodyPr>
           <a:p>
-            <a:endParaRPr b="0" lang="pt-BR" sz="2200" spc="-1" strike="noStrike">
-              <a:solidFill>
-                <a:srgbClr val="000000"/>
-              </a:solidFill>
-              <a:latin typeface="Trebuchet MS"/>
+            <a:endParaRPr b="0" lang="pt-BR" sz="3200" spc="-1" strike="noStrike">
+              <a:latin typeface="Arial"/>
             </a:endParaRPr>
           </a:p>
         </p:txBody>
@@ -592,11 +553,8 @@
             <a:normAutofit/>
           </a:bodyPr>
           <a:p>
-            <a:endParaRPr b="0" lang="pt-BR" sz="2200" spc="-1" strike="noStrike">
-              <a:solidFill>
-                <a:srgbClr val="000000"/>
-              </a:solidFill>
-              <a:latin typeface="Trebuchet MS"/>
+            <a:endParaRPr b="0" lang="pt-BR" sz="3200" spc="-1" strike="noStrike">
+              <a:latin typeface="Arial"/>
             </a:endParaRPr>
           </a:p>
         </p:txBody>
@@ -669,10 +627,8 @@
             <a:noAutofit/>
           </a:bodyPr>
           <a:p>
-            <a:endParaRPr b="0" lang="pt-BR" sz="3200" spc="-1" strike="noStrike">
-              <a:solidFill>
-                <a:srgbClr val="000000"/>
-              </a:solidFill>
+            <a:pPr algn="ctr"/>
+            <a:endParaRPr b="0" lang="pt-BR" sz="4400" spc="-1" strike="noStrike">
               <a:latin typeface="Arial"/>
             </a:endParaRPr>
           </a:p>
@@ -755,10 +711,8 @@
             <a:noAutofit/>
           </a:bodyPr>
           <a:p>
-            <a:endParaRPr b="0" lang="pt-BR" sz="3200" spc="-1" strike="noStrike">
-              <a:solidFill>
-                <a:srgbClr val="000000"/>
-              </a:solidFill>
+            <a:pPr algn="ctr"/>
+            <a:endParaRPr b="0" lang="pt-BR" sz="4400" spc="-1" strike="noStrike">
               <a:latin typeface="Arial"/>
             </a:endParaRPr>
           </a:p>
@@ -788,11 +742,8 @@
             <a:normAutofit/>
           </a:bodyPr>
           <a:p>
-            <a:endParaRPr b="0" lang="pt-BR" sz="2200" spc="-1" strike="noStrike">
-              <a:solidFill>
-                <a:srgbClr val="000000"/>
-              </a:solidFill>
-              <a:latin typeface="Trebuchet MS"/>
+            <a:endParaRPr b="0" lang="pt-BR" sz="3200" spc="-1" strike="noStrike">
+              <a:latin typeface="Arial"/>
             </a:endParaRPr>
           </a:p>
         </p:txBody>
@@ -843,10 +794,8 @@
             <a:noAutofit/>
           </a:bodyPr>
           <a:p>
-            <a:endParaRPr b="0" lang="pt-BR" sz="3200" spc="-1" strike="noStrike">
-              <a:solidFill>
-                <a:srgbClr val="000000"/>
-              </a:solidFill>
+            <a:pPr algn="ctr"/>
+            <a:endParaRPr b="0" lang="pt-BR" sz="4400" spc="-1" strike="noStrike">
               <a:latin typeface="Arial"/>
             </a:endParaRPr>
           </a:p>
@@ -876,11 +825,8 @@
             <a:normAutofit/>
           </a:bodyPr>
           <a:p>
-            <a:endParaRPr b="0" lang="pt-BR" sz="2200" spc="-1" strike="noStrike">
-              <a:solidFill>
-                <a:srgbClr val="000000"/>
-              </a:solidFill>
-              <a:latin typeface="Trebuchet MS"/>
+            <a:endParaRPr b="0" lang="pt-BR" sz="3200" spc="-1" strike="noStrike">
+              <a:latin typeface="Arial"/>
             </a:endParaRPr>
           </a:p>
         </p:txBody>
@@ -909,11 +855,8 @@
             <a:normAutofit/>
           </a:bodyPr>
           <a:p>
-            <a:endParaRPr b="0" lang="pt-BR" sz="2200" spc="-1" strike="noStrike">
-              <a:solidFill>
-                <a:srgbClr val="000000"/>
-              </a:solidFill>
-              <a:latin typeface="Trebuchet MS"/>
+            <a:endParaRPr b="0" lang="pt-BR" sz="3200" spc="-1" strike="noStrike">
+              <a:latin typeface="Arial"/>
             </a:endParaRPr>
           </a:p>
         </p:txBody>
@@ -964,10 +907,8 @@
             <a:noAutofit/>
           </a:bodyPr>
           <a:p>
-            <a:endParaRPr b="0" lang="pt-BR" sz="3200" spc="-1" strike="noStrike">
-              <a:solidFill>
-                <a:srgbClr val="000000"/>
-              </a:solidFill>
+            <a:pPr algn="ctr"/>
+            <a:endParaRPr b="0" lang="pt-BR" sz="4400" spc="-1" strike="noStrike">
               <a:latin typeface="Arial"/>
             </a:endParaRPr>
           </a:p>
@@ -1072,10 +1013,8 @@
             <a:noAutofit/>
           </a:bodyPr>
           <a:p>
-            <a:endParaRPr b="0" lang="pt-BR" sz="3200" spc="-1" strike="noStrike">
-              <a:solidFill>
-                <a:srgbClr val="000000"/>
-              </a:solidFill>
+            <a:pPr algn="ctr"/>
+            <a:endParaRPr b="0" lang="pt-BR" sz="4400" spc="-1" strike="noStrike">
               <a:latin typeface="Arial"/>
             </a:endParaRPr>
           </a:p>
@@ -1105,11 +1044,8 @@
             <a:normAutofit/>
           </a:bodyPr>
           <a:p>
-            <a:endParaRPr b="0" lang="pt-BR" sz="2200" spc="-1" strike="noStrike">
-              <a:solidFill>
-                <a:srgbClr val="000000"/>
-              </a:solidFill>
-              <a:latin typeface="Trebuchet MS"/>
+            <a:endParaRPr b="0" lang="pt-BR" sz="3200" spc="-1" strike="noStrike">
+              <a:latin typeface="Arial"/>
             </a:endParaRPr>
           </a:p>
         </p:txBody>
@@ -1138,11 +1074,8 @@
             <a:normAutofit/>
           </a:bodyPr>
           <a:p>
-            <a:endParaRPr b="0" lang="pt-BR" sz="2200" spc="-1" strike="noStrike">
-              <a:solidFill>
-                <a:srgbClr val="000000"/>
-              </a:solidFill>
-              <a:latin typeface="Trebuchet MS"/>
+            <a:endParaRPr b="0" lang="pt-BR" sz="3200" spc="-1" strike="noStrike">
+              <a:latin typeface="Arial"/>
             </a:endParaRPr>
           </a:p>
         </p:txBody>
@@ -1171,11 +1104,8 @@
             <a:normAutofit/>
           </a:bodyPr>
           <a:p>
-            <a:endParaRPr b="0" lang="pt-BR" sz="2200" spc="-1" strike="noStrike">
-              <a:solidFill>
-                <a:srgbClr val="000000"/>
-              </a:solidFill>
-              <a:latin typeface="Trebuchet MS"/>
+            <a:endParaRPr b="0" lang="pt-BR" sz="3200" spc="-1" strike="noStrike">
+              <a:latin typeface="Arial"/>
             </a:endParaRPr>
           </a:p>
         </p:txBody>
@@ -1226,10 +1156,8 @@
             <a:noAutofit/>
           </a:bodyPr>
           <a:p>
-            <a:endParaRPr b="0" lang="pt-BR" sz="3200" spc="-1" strike="noStrike">
-              <a:solidFill>
-                <a:srgbClr val="000000"/>
-              </a:solidFill>
+            <a:pPr algn="ctr"/>
+            <a:endParaRPr b="0" lang="pt-BR" sz="4400" spc="-1" strike="noStrike">
               <a:latin typeface="Arial"/>
             </a:endParaRPr>
           </a:p>
@@ -1312,10 +1240,8 @@
             <a:noAutofit/>
           </a:bodyPr>
           <a:p>
-            <a:endParaRPr b="0" lang="pt-BR" sz="3200" spc="-1" strike="noStrike">
-              <a:solidFill>
-                <a:srgbClr val="000000"/>
-              </a:solidFill>
+            <a:pPr algn="ctr"/>
+            <a:endParaRPr b="0" lang="pt-BR" sz="4400" spc="-1" strike="noStrike">
               <a:latin typeface="Arial"/>
             </a:endParaRPr>
           </a:p>
@@ -1345,11 +1271,8 @@
             <a:normAutofit/>
           </a:bodyPr>
           <a:p>
-            <a:endParaRPr b="0" lang="pt-BR" sz="2200" spc="-1" strike="noStrike">
-              <a:solidFill>
-                <a:srgbClr val="000000"/>
-              </a:solidFill>
-              <a:latin typeface="Trebuchet MS"/>
+            <a:endParaRPr b="0" lang="pt-BR" sz="3200" spc="-1" strike="noStrike">
+              <a:latin typeface="Arial"/>
             </a:endParaRPr>
           </a:p>
         </p:txBody>
@@ -1378,11 +1301,8 @@
             <a:normAutofit/>
           </a:bodyPr>
           <a:p>
-            <a:endParaRPr b="0" lang="pt-BR" sz="2200" spc="-1" strike="noStrike">
-              <a:solidFill>
-                <a:srgbClr val="000000"/>
-              </a:solidFill>
-              <a:latin typeface="Trebuchet MS"/>
+            <a:endParaRPr b="0" lang="pt-BR" sz="3200" spc="-1" strike="noStrike">
+              <a:latin typeface="Arial"/>
             </a:endParaRPr>
           </a:p>
         </p:txBody>
@@ -1411,11 +1331,8 @@
             <a:normAutofit/>
           </a:bodyPr>
           <a:p>
-            <a:endParaRPr b="0" lang="pt-BR" sz="2200" spc="-1" strike="noStrike">
-              <a:solidFill>
-                <a:srgbClr val="000000"/>
-              </a:solidFill>
-              <a:latin typeface="Trebuchet MS"/>
+            <a:endParaRPr b="0" lang="pt-BR" sz="3200" spc="-1" strike="noStrike">
+              <a:latin typeface="Arial"/>
             </a:endParaRPr>
           </a:p>
         </p:txBody>
@@ -1466,10 +1383,8 @@
             <a:noAutofit/>
           </a:bodyPr>
           <a:p>
-            <a:endParaRPr b="0" lang="pt-BR" sz="3200" spc="-1" strike="noStrike">
-              <a:solidFill>
-                <a:srgbClr val="000000"/>
-              </a:solidFill>
+            <a:pPr algn="ctr"/>
+            <a:endParaRPr b="0" lang="pt-BR" sz="4400" spc="-1" strike="noStrike">
               <a:latin typeface="Arial"/>
             </a:endParaRPr>
           </a:p>
@@ -1499,11 +1414,8 @@
             <a:normAutofit/>
           </a:bodyPr>
           <a:p>
-            <a:endParaRPr b="0" lang="pt-BR" sz="2200" spc="-1" strike="noStrike">
-              <a:solidFill>
-                <a:srgbClr val="000000"/>
-              </a:solidFill>
-              <a:latin typeface="Trebuchet MS"/>
+            <a:endParaRPr b="0" lang="pt-BR" sz="3200" spc="-1" strike="noStrike">
+              <a:latin typeface="Arial"/>
             </a:endParaRPr>
           </a:p>
         </p:txBody>
@@ -1532,11 +1444,8 @@
             <a:normAutofit/>
           </a:bodyPr>
           <a:p>
-            <a:endParaRPr b="0" lang="pt-BR" sz="2200" spc="-1" strike="noStrike">
-              <a:solidFill>
-                <a:srgbClr val="000000"/>
-              </a:solidFill>
-              <a:latin typeface="Trebuchet MS"/>
+            <a:endParaRPr b="0" lang="pt-BR" sz="3200" spc="-1" strike="noStrike">
+              <a:latin typeface="Arial"/>
             </a:endParaRPr>
           </a:p>
         </p:txBody>
@@ -1565,11 +1474,8 @@
             <a:normAutofit/>
           </a:bodyPr>
           <a:p>
-            <a:endParaRPr b="0" lang="pt-BR" sz="2200" spc="-1" strike="noStrike">
-              <a:solidFill>
-                <a:srgbClr val="000000"/>
-              </a:solidFill>
-              <a:latin typeface="Trebuchet MS"/>
+            <a:endParaRPr b="0" lang="pt-BR" sz="3200" spc="-1" strike="noStrike">
+              <a:latin typeface="Arial"/>
             </a:endParaRPr>
           </a:p>
         </p:txBody>
@@ -1620,10 +1526,8 @@
             <a:noAutofit/>
           </a:bodyPr>
           <a:p>
-            <a:endParaRPr b="0" lang="pt-BR" sz="3200" spc="-1" strike="noStrike">
-              <a:solidFill>
-                <a:srgbClr val="000000"/>
-              </a:solidFill>
+            <a:pPr algn="ctr"/>
+            <a:endParaRPr b="0" lang="pt-BR" sz="4400" spc="-1" strike="noStrike">
               <a:latin typeface="Arial"/>
             </a:endParaRPr>
           </a:p>
@@ -1653,11 +1557,8 @@
             <a:normAutofit/>
           </a:bodyPr>
           <a:p>
-            <a:endParaRPr b="0" lang="pt-BR" sz="2200" spc="-1" strike="noStrike">
-              <a:solidFill>
-                <a:srgbClr val="000000"/>
-              </a:solidFill>
-              <a:latin typeface="Trebuchet MS"/>
+            <a:endParaRPr b="0" lang="pt-BR" sz="3200" spc="-1" strike="noStrike">
+              <a:latin typeface="Arial"/>
             </a:endParaRPr>
           </a:p>
         </p:txBody>
@@ -1686,11 +1587,8 @@
             <a:normAutofit/>
           </a:bodyPr>
           <a:p>
-            <a:endParaRPr b="0" lang="pt-BR" sz="2200" spc="-1" strike="noStrike">
-              <a:solidFill>
-                <a:srgbClr val="000000"/>
-              </a:solidFill>
-              <a:latin typeface="Trebuchet MS"/>
+            <a:endParaRPr b="0" lang="pt-BR" sz="3200" spc="-1" strike="noStrike">
+              <a:latin typeface="Arial"/>
             </a:endParaRPr>
           </a:p>
         </p:txBody>
@@ -1741,10 +1639,8 @@
             <a:noAutofit/>
           </a:bodyPr>
           <a:p>
-            <a:endParaRPr b="0" lang="pt-BR" sz="3200" spc="-1" strike="noStrike">
-              <a:solidFill>
-                <a:srgbClr val="000000"/>
-              </a:solidFill>
+            <a:pPr algn="ctr"/>
+            <a:endParaRPr b="0" lang="pt-BR" sz="4400" spc="-1" strike="noStrike">
               <a:latin typeface="Arial"/>
             </a:endParaRPr>
           </a:p>
@@ -1774,11 +1670,8 @@
             <a:normAutofit/>
           </a:bodyPr>
           <a:p>
-            <a:endParaRPr b="0" lang="pt-BR" sz="2200" spc="-1" strike="noStrike">
-              <a:solidFill>
-                <a:srgbClr val="000000"/>
-              </a:solidFill>
-              <a:latin typeface="Trebuchet MS"/>
+            <a:endParaRPr b="0" lang="pt-BR" sz="3200" spc="-1" strike="noStrike">
+              <a:latin typeface="Arial"/>
             </a:endParaRPr>
           </a:p>
         </p:txBody>
@@ -1807,11 +1700,8 @@
             <a:normAutofit/>
           </a:bodyPr>
           <a:p>
-            <a:endParaRPr b="0" lang="pt-BR" sz="2200" spc="-1" strike="noStrike">
-              <a:solidFill>
-                <a:srgbClr val="000000"/>
-              </a:solidFill>
-              <a:latin typeface="Trebuchet MS"/>
+            <a:endParaRPr b="0" lang="pt-BR" sz="3200" spc="-1" strike="noStrike">
+              <a:latin typeface="Arial"/>
             </a:endParaRPr>
           </a:p>
         </p:txBody>
@@ -1840,11 +1730,8 @@
             <a:normAutofit/>
           </a:bodyPr>
           <a:p>
-            <a:endParaRPr b="0" lang="pt-BR" sz="2200" spc="-1" strike="noStrike">
-              <a:solidFill>
-                <a:srgbClr val="000000"/>
-              </a:solidFill>
-              <a:latin typeface="Trebuchet MS"/>
+            <a:endParaRPr b="0" lang="pt-BR" sz="3200" spc="-1" strike="noStrike">
+              <a:latin typeface="Arial"/>
             </a:endParaRPr>
           </a:p>
         </p:txBody>
@@ -1873,11 +1760,8 @@
             <a:normAutofit/>
           </a:bodyPr>
           <a:p>
-            <a:endParaRPr b="0" lang="pt-BR" sz="2200" spc="-1" strike="noStrike">
-              <a:solidFill>
-                <a:srgbClr val="000000"/>
-              </a:solidFill>
-              <a:latin typeface="Trebuchet MS"/>
+            <a:endParaRPr b="0" lang="pt-BR" sz="3200" spc="-1" strike="noStrike">
+              <a:latin typeface="Arial"/>
             </a:endParaRPr>
           </a:p>
         </p:txBody>
@@ -1928,10 +1812,8 @@
             <a:noAutofit/>
           </a:bodyPr>
           <a:p>
-            <a:endParaRPr b="0" lang="pt-BR" sz="3200" spc="-1" strike="noStrike">
-              <a:solidFill>
-                <a:srgbClr val="000000"/>
-              </a:solidFill>
+            <a:pPr algn="ctr"/>
+            <a:endParaRPr b="0" lang="pt-BR" sz="4400" spc="-1" strike="noStrike">
               <a:latin typeface="Arial"/>
             </a:endParaRPr>
           </a:p>
@@ -1961,11 +1843,8 @@
             <a:normAutofit/>
           </a:bodyPr>
           <a:p>
-            <a:endParaRPr b="0" lang="pt-BR" sz="2200" spc="-1" strike="noStrike">
-              <a:solidFill>
-                <a:srgbClr val="000000"/>
-              </a:solidFill>
-              <a:latin typeface="Trebuchet MS"/>
+            <a:endParaRPr b="0" lang="pt-BR" sz="3200" spc="-1" strike="noStrike">
+              <a:latin typeface="Arial"/>
             </a:endParaRPr>
           </a:p>
         </p:txBody>
@@ -1994,11 +1873,8 @@
             <a:normAutofit/>
           </a:bodyPr>
           <a:p>
-            <a:endParaRPr b="0" lang="pt-BR" sz="2200" spc="-1" strike="noStrike">
-              <a:solidFill>
-                <a:srgbClr val="000000"/>
-              </a:solidFill>
-              <a:latin typeface="Trebuchet MS"/>
+            <a:endParaRPr b="0" lang="pt-BR" sz="3200" spc="-1" strike="noStrike">
+              <a:latin typeface="Arial"/>
             </a:endParaRPr>
           </a:p>
         </p:txBody>
@@ -2027,11 +1903,8 @@
             <a:normAutofit/>
           </a:bodyPr>
           <a:p>
-            <a:endParaRPr b="0" lang="pt-BR" sz="2200" spc="-1" strike="noStrike">
-              <a:solidFill>
-                <a:srgbClr val="000000"/>
-              </a:solidFill>
-              <a:latin typeface="Trebuchet MS"/>
+            <a:endParaRPr b="0" lang="pt-BR" sz="3200" spc="-1" strike="noStrike">
+              <a:latin typeface="Arial"/>
             </a:endParaRPr>
           </a:p>
         </p:txBody>
@@ -2060,11 +1933,8 @@
             <a:normAutofit/>
           </a:bodyPr>
           <a:p>
-            <a:endParaRPr b="0" lang="pt-BR" sz="2200" spc="-1" strike="noStrike">
-              <a:solidFill>
-                <a:srgbClr val="000000"/>
-              </a:solidFill>
-              <a:latin typeface="Trebuchet MS"/>
+            <a:endParaRPr b="0" lang="pt-BR" sz="3200" spc="-1" strike="noStrike">
+              <a:latin typeface="Arial"/>
             </a:endParaRPr>
           </a:p>
         </p:txBody>
@@ -2093,11 +1963,8 @@
             <a:normAutofit/>
           </a:bodyPr>
           <a:p>
-            <a:endParaRPr b="0" lang="pt-BR" sz="2200" spc="-1" strike="noStrike">
-              <a:solidFill>
-                <a:srgbClr val="000000"/>
-              </a:solidFill>
-              <a:latin typeface="Trebuchet MS"/>
+            <a:endParaRPr b="0" lang="pt-BR" sz="3200" spc="-1" strike="noStrike">
+              <a:latin typeface="Arial"/>
             </a:endParaRPr>
           </a:p>
         </p:txBody>
@@ -2126,11 +1993,8 @@
             <a:normAutofit/>
           </a:bodyPr>
           <a:p>
-            <a:endParaRPr b="0" lang="pt-BR" sz="2200" spc="-1" strike="noStrike">
-              <a:solidFill>
-                <a:srgbClr val="000000"/>
-              </a:solidFill>
-              <a:latin typeface="Trebuchet MS"/>
+            <a:endParaRPr b="0" lang="pt-BR" sz="3200" spc="-1" strike="noStrike">
+              <a:latin typeface="Arial"/>
             </a:endParaRPr>
           </a:p>
         </p:txBody>
@@ -2181,10 +2045,8 @@
             <a:noAutofit/>
           </a:bodyPr>
           <a:p>
-            <a:endParaRPr b="0" lang="pt-BR" sz="3200" spc="-1" strike="noStrike">
-              <a:solidFill>
-                <a:srgbClr val="000000"/>
-              </a:solidFill>
+            <a:pPr algn="ctr"/>
+            <a:endParaRPr b="0" lang="pt-BR" sz="4400" spc="-1" strike="noStrike">
               <a:latin typeface="Arial"/>
             </a:endParaRPr>
           </a:p>
@@ -2214,11 +2076,8 @@
             <a:normAutofit/>
           </a:bodyPr>
           <a:p>
-            <a:endParaRPr b="0" lang="pt-BR" sz="2200" spc="-1" strike="noStrike">
-              <a:solidFill>
-                <a:srgbClr val="000000"/>
-              </a:solidFill>
-              <a:latin typeface="Trebuchet MS"/>
+            <a:endParaRPr b="0" lang="pt-BR" sz="3200" spc="-1" strike="noStrike">
+              <a:latin typeface="Arial"/>
             </a:endParaRPr>
           </a:p>
         </p:txBody>
@@ -2269,10 +2128,8 @@
             <a:noAutofit/>
           </a:bodyPr>
           <a:p>
-            <a:endParaRPr b="0" lang="pt-BR" sz="3200" spc="-1" strike="noStrike">
-              <a:solidFill>
-                <a:srgbClr val="000000"/>
-              </a:solidFill>
+            <a:pPr algn="ctr"/>
+            <a:endParaRPr b="0" lang="pt-BR" sz="4400" spc="-1" strike="noStrike">
               <a:latin typeface="Arial"/>
             </a:endParaRPr>
           </a:p>
@@ -2302,11 +2159,8 @@
             <a:normAutofit/>
           </a:bodyPr>
           <a:p>
-            <a:endParaRPr b="0" lang="pt-BR" sz="2200" spc="-1" strike="noStrike">
-              <a:solidFill>
-                <a:srgbClr val="000000"/>
-              </a:solidFill>
-              <a:latin typeface="Trebuchet MS"/>
+            <a:endParaRPr b="0" lang="pt-BR" sz="3200" spc="-1" strike="noStrike">
+              <a:latin typeface="Arial"/>
             </a:endParaRPr>
           </a:p>
         </p:txBody>
@@ -2335,11 +2189,8 @@
             <a:normAutofit/>
           </a:bodyPr>
           <a:p>
-            <a:endParaRPr b="0" lang="pt-BR" sz="2200" spc="-1" strike="noStrike">
-              <a:solidFill>
-                <a:srgbClr val="000000"/>
-              </a:solidFill>
-              <a:latin typeface="Trebuchet MS"/>
+            <a:endParaRPr b="0" lang="pt-BR" sz="3200" spc="-1" strike="noStrike">
+              <a:latin typeface="Arial"/>
             </a:endParaRPr>
           </a:p>
         </p:txBody>
@@ -2390,10 +2241,8 @@
             <a:noAutofit/>
           </a:bodyPr>
           <a:p>
-            <a:endParaRPr b="0" lang="pt-BR" sz="3200" spc="-1" strike="noStrike">
-              <a:solidFill>
-                <a:srgbClr val="000000"/>
-              </a:solidFill>
+            <a:pPr algn="ctr"/>
+            <a:endParaRPr b="0" lang="pt-BR" sz="4400" spc="-1" strike="noStrike">
               <a:latin typeface="Arial"/>
             </a:endParaRPr>
           </a:p>
@@ -2498,10 +2347,8 @@
             <a:noAutofit/>
           </a:bodyPr>
           <a:p>
-            <a:endParaRPr b="0" lang="pt-BR" sz="3200" spc="-1" strike="noStrike">
-              <a:solidFill>
-                <a:srgbClr val="000000"/>
-              </a:solidFill>
+            <a:pPr algn="ctr"/>
+            <a:endParaRPr b="0" lang="pt-BR" sz="4400" spc="-1" strike="noStrike">
               <a:latin typeface="Arial"/>
             </a:endParaRPr>
           </a:p>
@@ -2531,11 +2378,8 @@
             <a:normAutofit/>
           </a:bodyPr>
           <a:p>
-            <a:endParaRPr b="0" lang="pt-BR" sz="2200" spc="-1" strike="noStrike">
-              <a:solidFill>
-                <a:srgbClr val="000000"/>
-              </a:solidFill>
-              <a:latin typeface="Trebuchet MS"/>
+            <a:endParaRPr b="0" lang="pt-BR" sz="3200" spc="-1" strike="noStrike">
+              <a:latin typeface="Arial"/>
             </a:endParaRPr>
           </a:p>
         </p:txBody>
@@ -2564,11 +2408,8 @@
             <a:normAutofit/>
           </a:bodyPr>
           <a:p>
-            <a:endParaRPr b="0" lang="pt-BR" sz="2200" spc="-1" strike="noStrike">
-              <a:solidFill>
-                <a:srgbClr val="000000"/>
-              </a:solidFill>
-              <a:latin typeface="Trebuchet MS"/>
+            <a:endParaRPr b="0" lang="pt-BR" sz="3200" spc="-1" strike="noStrike">
+              <a:latin typeface="Arial"/>
             </a:endParaRPr>
           </a:p>
         </p:txBody>
@@ -2597,11 +2438,8 @@
             <a:normAutofit/>
           </a:bodyPr>
           <a:p>
-            <a:endParaRPr b="0" lang="pt-BR" sz="2200" spc="-1" strike="noStrike">
-              <a:solidFill>
-                <a:srgbClr val="000000"/>
-              </a:solidFill>
-              <a:latin typeface="Trebuchet MS"/>
+            <a:endParaRPr b="0" lang="pt-BR" sz="3200" spc="-1" strike="noStrike">
+              <a:latin typeface="Arial"/>
             </a:endParaRPr>
           </a:p>
         </p:txBody>
@@ -2652,10 +2490,8 @@
             <a:noAutofit/>
           </a:bodyPr>
           <a:p>
-            <a:endParaRPr b="0" lang="pt-BR" sz="3200" spc="-1" strike="noStrike">
-              <a:solidFill>
-                <a:srgbClr val="000000"/>
-              </a:solidFill>
+            <a:pPr algn="ctr"/>
+            <a:endParaRPr b="0" lang="pt-BR" sz="4400" spc="-1" strike="noStrike">
               <a:latin typeface="Arial"/>
             </a:endParaRPr>
           </a:p>
@@ -2685,11 +2521,8 @@
             <a:normAutofit/>
           </a:bodyPr>
           <a:p>
-            <a:endParaRPr b="0" lang="pt-BR" sz="2200" spc="-1" strike="noStrike">
-              <a:solidFill>
-                <a:srgbClr val="000000"/>
-              </a:solidFill>
-              <a:latin typeface="Trebuchet MS"/>
+            <a:endParaRPr b="0" lang="pt-BR" sz="3200" spc="-1" strike="noStrike">
+              <a:latin typeface="Arial"/>
             </a:endParaRPr>
           </a:p>
         </p:txBody>
@@ -2718,11 +2551,8 @@
             <a:normAutofit/>
           </a:bodyPr>
           <a:p>
-            <a:endParaRPr b="0" lang="pt-BR" sz="2200" spc="-1" strike="noStrike">
-              <a:solidFill>
-                <a:srgbClr val="000000"/>
-              </a:solidFill>
-              <a:latin typeface="Trebuchet MS"/>
+            <a:endParaRPr b="0" lang="pt-BR" sz="3200" spc="-1" strike="noStrike">
+              <a:latin typeface="Arial"/>
             </a:endParaRPr>
           </a:p>
         </p:txBody>
@@ -2751,11 +2581,8 @@
             <a:normAutofit/>
           </a:bodyPr>
           <a:p>
-            <a:endParaRPr b="0" lang="pt-BR" sz="2200" spc="-1" strike="noStrike">
-              <a:solidFill>
-                <a:srgbClr val="000000"/>
-              </a:solidFill>
-              <a:latin typeface="Trebuchet MS"/>
+            <a:endParaRPr b="0" lang="pt-BR" sz="3200" spc="-1" strike="noStrike">
+              <a:latin typeface="Arial"/>
             </a:endParaRPr>
           </a:p>
         </p:txBody>
@@ -2806,10 +2633,8 @@
             <a:noAutofit/>
           </a:bodyPr>
           <a:p>
-            <a:endParaRPr b="0" lang="pt-BR" sz="3200" spc="-1" strike="noStrike">
-              <a:solidFill>
-                <a:srgbClr val="000000"/>
-              </a:solidFill>
+            <a:pPr algn="ctr"/>
+            <a:endParaRPr b="0" lang="pt-BR" sz="4400" spc="-1" strike="noStrike">
               <a:latin typeface="Arial"/>
             </a:endParaRPr>
           </a:p>
@@ -2839,11 +2664,8 @@
             <a:normAutofit/>
           </a:bodyPr>
           <a:p>
-            <a:endParaRPr b="0" lang="pt-BR" sz="2200" spc="-1" strike="noStrike">
-              <a:solidFill>
-                <a:srgbClr val="000000"/>
-              </a:solidFill>
-              <a:latin typeface="Trebuchet MS"/>
+            <a:endParaRPr b="0" lang="pt-BR" sz="3200" spc="-1" strike="noStrike">
+              <a:latin typeface="Arial"/>
             </a:endParaRPr>
           </a:p>
         </p:txBody>
@@ -2872,11 +2694,8 @@
             <a:normAutofit/>
           </a:bodyPr>
           <a:p>
-            <a:endParaRPr b="0" lang="pt-BR" sz="2200" spc="-1" strike="noStrike">
-              <a:solidFill>
-                <a:srgbClr val="000000"/>
-              </a:solidFill>
-              <a:latin typeface="Trebuchet MS"/>
+            <a:endParaRPr b="0" lang="pt-BR" sz="3200" spc="-1" strike="noStrike">
+              <a:latin typeface="Arial"/>
             </a:endParaRPr>
           </a:p>
         </p:txBody>
@@ -2905,11 +2724,8 @@
             <a:normAutofit/>
           </a:bodyPr>
           <a:p>
-            <a:endParaRPr b="0" lang="pt-BR" sz="2200" spc="-1" strike="noStrike">
-              <a:solidFill>
-                <a:srgbClr val="000000"/>
-              </a:solidFill>
-              <a:latin typeface="Trebuchet MS"/>
+            <a:endParaRPr b="0" lang="pt-BR" sz="3200" spc="-1" strike="noStrike">
+              <a:latin typeface="Arial"/>
             </a:endParaRPr>
           </a:p>
         </p:txBody>
@@ -2970,19 +2786,14 @@
             <a:noAutofit/>
           </a:bodyPr>
           <a:p>
+            <a:pPr algn="ctr"/>
             <a:r>
-              <a:rPr b="0" lang="pt-BR" sz="3200" spc="-1" strike="noStrike">
-                <a:solidFill>
-                  <a:srgbClr val="000000"/>
-                </a:solidFill>
+              <a:rPr b="0" lang="pt-BR" sz="4400" spc="-1" strike="noStrike">
                 <a:latin typeface="Arial"/>
               </a:rPr>
               <a:t>Clique para editar o formato do texto do título</a:t>
             </a:r>
-            <a:endParaRPr b="0" lang="pt-BR" sz="3200" spc="-1" strike="noStrike">
-              <a:solidFill>
-                <a:srgbClr val="000000"/>
-              </a:solidFill>
+            <a:endParaRPr b="0" lang="pt-BR" sz="4400" spc="-1" strike="noStrike">
               <a:latin typeface="Arial"/>
             </a:endParaRPr>
           </a:p>
@@ -3024,19 +2835,13 @@
               <a:buChar char=""/>
             </a:pPr>
             <a:r>
-              <a:rPr b="0" lang="pt-BR" sz="2200" spc="-1" strike="noStrike">
-                <a:solidFill>
-                  <a:srgbClr val="000000"/>
-                </a:solidFill>
-                <a:latin typeface="Trebuchet MS"/>
+              <a:rPr b="0" lang="pt-BR" sz="3200" spc="-1" strike="noStrike">
+                <a:latin typeface="Arial"/>
               </a:rPr>
               <a:t>Clique para editar o formato do texto da estrutura de tópicos</a:t>
             </a:r>
-            <a:endParaRPr b="0" lang="pt-BR" sz="2200" spc="-1" strike="noStrike">
-              <a:solidFill>
-                <a:srgbClr val="000000"/>
-              </a:solidFill>
-              <a:latin typeface="Trebuchet MS"/>
+            <a:endParaRPr b="0" lang="pt-BR" sz="3200" spc="-1" strike="noStrike">
+              <a:latin typeface="Arial"/>
             </a:endParaRPr>
           </a:p>
           <a:p>
@@ -3052,19 +2857,13 @@
               <a:buChar char=""/>
             </a:pPr>
             <a:r>
-              <a:rPr b="0" lang="pt-BR" sz="1800" spc="-1" strike="noStrike">
-                <a:solidFill>
-                  <a:srgbClr val="000000"/>
-                </a:solidFill>
-                <a:latin typeface="Trebuchet MS"/>
+              <a:rPr b="0" lang="pt-BR" sz="2800" spc="-1" strike="noStrike">
+                <a:latin typeface="Arial"/>
               </a:rPr>
               <a:t>2.º nível da estrutura de tópicos</a:t>
             </a:r>
-            <a:endParaRPr b="0" lang="pt-BR" sz="1800" spc="-1" strike="noStrike">
-              <a:solidFill>
-                <a:srgbClr val="000000"/>
-              </a:solidFill>
-              <a:latin typeface="Trebuchet MS"/>
+            <a:endParaRPr b="0" lang="pt-BR" sz="2800" spc="-1" strike="noStrike">
+              <a:latin typeface="Arial"/>
             </a:endParaRPr>
           </a:p>
           <a:p>
@@ -3080,19 +2879,13 @@
               <a:buChar char=""/>
             </a:pPr>
             <a:r>
-              <a:rPr b="0" lang="pt-BR" sz="1600" spc="-1" strike="noStrike">
-                <a:solidFill>
-                  <a:srgbClr val="000000"/>
-                </a:solidFill>
-                <a:latin typeface="Trebuchet MS"/>
+              <a:rPr b="0" lang="pt-BR" sz="2400" spc="-1" strike="noStrike">
+                <a:latin typeface="Arial"/>
               </a:rPr>
               <a:t>3.º nível da estrutura de tópicos</a:t>
             </a:r>
-            <a:endParaRPr b="0" lang="pt-BR" sz="1600" spc="-1" strike="noStrike">
-              <a:solidFill>
-                <a:srgbClr val="000000"/>
-              </a:solidFill>
-              <a:latin typeface="Trebuchet MS"/>
+            <a:endParaRPr b="0" lang="pt-BR" sz="2400" spc="-1" strike="noStrike">
+              <a:latin typeface="Arial"/>
             </a:endParaRPr>
           </a:p>
           <a:p>
@@ -3109,18 +2902,12 @@
             </a:pPr>
             <a:r>
               <a:rPr b="0" lang="pt-BR" sz="2000" spc="-1" strike="noStrike">
-                <a:solidFill>
-                  <a:srgbClr val="000000"/>
-                </a:solidFill>
-                <a:latin typeface="EurostileT"/>
+                <a:latin typeface="Arial"/>
               </a:rPr>
               <a:t>4.º nível da estrutura de tópicos</a:t>
             </a:r>
             <a:endParaRPr b="0" lang="pt-BR" sz="2000" spc="-1" strike="noStrike">
-              <a:solidFill>
-                <a:srgbClr val="000000"/>
-              </a:solidFill>
-              <a:latin typeface="EurostileT"/>
+              <a:latin typeface="Arial"/>
             </a:endParaRPr>
           </a:p>
           <a:p>
@@ -3137,18 +2924,12 @@
             </a:pPr>
             <a:r>
               <a:rPr b="0" lang="pt-BR" sz="2000" spc="-1" strike="noStrike">
-                <a:solidFill>
-                  <a:srgbClr val="000000"/>
-                </a:solidFill>
-                <a:latin typeface="EurostileT"/>
+                <a:latin typeface="Arial"/>
               </a:rPr>
               <a:t>5.º nível da estrutura de tópicos</a:t>
             </a:r>
             <a:endParaRPr b="0" lang="pt-BR" sz="2000" spc="-1" strike="noStrike">
-              <a:solidFill>
-                <a:srgbClr val="000000"/>
-              </a:solidFill>
-              <a:latin typeface="EurostileT"/>
+              <a:latin typeface="Arial"/>
             </a:endParaRPr>
           </a:p>
           <a:p>
@@ -3165,18 +2946,12 @@
             </a:pPr>
             <a:r>
               <a:rPr b="0" lang="pt-BR" sz="2000" spc="-1" strike="noStrike">
-                <a:solidFill>
-                  <a:srgbClr val="000000"/>
-                </a:solidFill>
-                <a:latin typeface="EurostileT"/>
+                <a:latin typeface="Arial"/>
               </a:rPr>
               <a:t>6.º nível da estrutura de tópicos</a:t>
             </a:r>
             <a:endParaRPr b="0" lang="pt-BR" sz="2000" spc="-1" strike="noStrike">
-              <a:solidFill>
-                <a:srgbClr val="000000"/>
-              </a:solidFill>
-              <a:latin typeface="EurostileT"/>
+              <a:latin typeface="Arial"/>
             </a:endParaRPr>
           </a:p>
           <a:p>
@@ -3193,18 +2968,12 @@
             </a:pPr>
             <a:r>
               <a:rPr b="0" lang="pt-BR" sz="2000" spc="-1" strike="noStrike">
-                <a:solidFill>
-                  <a:srgbClr val="000000"/>
-                </a:solidFill>
-                <a:latin typeface="EurostileT"/>
+                <a:latin typeface="Arial"/>
               </a:rPr>
               <a:t>7.º nível da estrutura de tópicos</a:t>
             </a:r>
             <a:endParaRPr b="0" lang="pt-BR" sz="2000" spc="-1" strike="noStrike">
-              <a:solidFill>
-                <a:srgbClr val="000000"/>
-              </a:solidFill>
-              <a:latin typeface="EurostileT"/>
+              <a:latin typeface="Arial"/>
             </a:endParaRPr>
           </a:p>
         </p:txBody>
@@ -3280,19 +3049,14 @@
             <a:noAutofit/>
           </a:bodyPr>
           <a:p>
+            <a:pPr algn="ctr"/>
             <a:r>
-              <a:rPr b="0" lang="pt-BR" sz="3200" spc="-1" strike="noStrike">
-                <a:solidFill>
-                  <a:srgbClr val="000000"/>
-                </a:solidFill>
+              <a:rPr b="0" lang="pt-BR" sz="4400" spc="-1" strike="noStrike">
                 <a:latin typeface="Arial"/>
               </a:rPr>
               <a:t>Clique para editar o formato do texto do título</a:t>
             </a:r>
-            <a:endParaRPr b="0" lang="pt-BR" sz="3200" spc="-1" strike="noStrike">
-              <a:solidFill>
-                <a:srgbClr val="000000"/>
-              </a:solidFill>
+            <a:endParaRPr b="0" lang="pt-BR" sz="4400" spc="-1" strike="noStrike">
               <a:latin typeface="Arial"/>
             </a:endParaRPr>
           </a:p>
@@ -3334,19 +3098,13 @@
               <a:buChar char=""/>
             </a:pPr>
             <a:r>
-              <a:rPr b="0" lang="pt-BR" sz="2200" spc="-1" strike="noStrike">
-                <a:solidFill>
-                  <a:srgbClr val="000000"/>
-                </a:solidFill>
-                <a:latin typeface="Trebuchet MS"/>
+              <a:rPr b="0" lang="pt-BR" sz="3200" spc="-1" strike="noStrike">
+                <a:latin typeface="Arial"/>
               </a:rPr>
               <a:t>Clique para editar o formato do texto da estrutura de tópicos</a:t>
             </a:r>
-            <a:endParaRPr b="0" lang="pt-BR" sz="2200" spc="-1" strike="noStrike">
-              <a:solidFill>
-                <a:srgbClr val="000000"/>
-              </a:solidFill>
-              <a:latin typeface="Trebuchet MS"/>
+            <a:endParaRPr b="0" lang="pt-BR" sz="3200" spc="-1" strike="noStrike">
+              <a:latin typeface="Arial"/>
             </a:endParaRPr>
           </a:p>
           <a:p>
@@ -3362,19 +3120,13 @@
               <a:buChar char=""/>
             </a:pPr>
             <a:r>
-              <a:rPr b="0" lang="pt-BR" sz="1800" spc="-1" strike="noStrike">
-                <a:solidFill>
-                  <a:srgbClr val="000000"/>
-                </a:solidFill>
-                <a:latin typeface="Trebuchet MS"/>
+              <a:rPr b="0" lang="pt-BR" sz="2800" spc="-1" strike="noStrike">
+                <a:latin typeface="Arial"/>
               </a:rPr>
               <a:t>2.º nível da estrutura de tópicos</a:t>
             </a:r>
-            <a:endParaRPr b="0" lang="pt-BR" sz="1800" spc="-1" strike="noStrike">
-              <a:solidFill>
-                <a:srgbClr val="000000"/>
-              </a:solidFill>
-              <a:latin typeface="Trebuchet MS"/>
+            <a:endParaRPr b="0" lang="pt-BR" sz="2800" spc="-1" strike="noStrike">
+              <a:latin typeface="Arial"/>
             </a:endParaRPr>
           </a:p>
           <a:p>
@@ -3390,19 +3142,13 @@
               <a:buChar char=""/>
             </a:pPr>
             <a:r>
-              <a:rPr b="0" lang="pt-BR" sz="1600" spc="-1" strike="noStrike">
-                <a:solidFill>
-                  <a:srgbClr val="000000"/>
-                </a:solidFill>
-                <a:latin typeface="Trebuchet MS"/>
+              <a:rPr b="0" lang="pt-BR" sz="2400" spc="-1" strike="noStrike">
+                <a:latin typeface="Arial"/>
               </a:rPr>
               <a:t>3.º nível da estrutura de tópicos</a:t>
             </a:r>
-            <a:endParaRPr b="0" lang="pt-BR" sz="1600" spc="-1" strike="noStrike">
-              <a:solidFill>
-                <a:srgbClr val="000000"/>
-              </a:solidFill>
-              <a:latin typeface="Trebuchet MS"/>
+            <a:endParaRPr b="0" lang="pt-BR" sz="2400" spc="-1" strike="noStrike">
+              <a:latin typeface="Arial"/>
             </a:endParaRPr>
           </a:p>
           <a:p>
@@ -3419,18 +3165,12 @@
             </a:pPr>
             <a:r>
               <a:rPr b="0" lang="pt-BR" sz="2000" spc="-1" strike="noStrike">
-                <a:solidFill>
-                  <a:srgbClr val="000000"/>
-                </a:solidFill>
-                <a:latin typeface="EurostileT"/>
+                <a:latin typeface="Arial"/>
               </a:rPr>
               <a:t>4.º nível da estrutura de tópicos</a:t>
             </a:r>
             <a:endParaRPr b="0" lang="pt-BR" sz="2000" spc="-1" strike="noStrike">
-              <a:solidFill>
-                <a:srgbClr val="000000"/>
-              </a:solidFill>
-              <a:latin typeface="EurostileT"/>
+              <a:latin typeface="Arial"/>
             </a:endParaRPr>
           </a:p>
           <a:p>
@@ -3447,18 +3187,12 @@
             </a:pPr>
             <a:r>
               <a:rPr b="0" lang="pt-BR" sz="2000" spc="-1" strike="noStrike">
-                <a:solidFill>
-                  <a:srgbClr val="000000"/>
-                </a:solidFill>
-                <a:latin typeface="EurostileT"/>
+                <a:latin typeface="Arial"/>
               </a:rPr>
               <a:t>5.º nível da estrutura de tópicos</a:t>
             </a:r>
             <a:endParaRPr b="0" lang="pt-BR" sz="2000" spc="-1" strike="noStrike">
-              <a:solidFill>
-                <a:srgbClr val="000000"/>
-              </a:solidFill>
-              <a:latin typeface="EurostileT"/>
+              <a:latin typeface="Arial"/>
             </a:endParaRPr>
           </a:p>
           <a:p>
@@ -3475,18 +3209,12 @@
             </a:pPr>
             <a:r>
               <a:rPr b="0" lang="pt-BR" sz="2000" spc="-1" strike="noStrike">
-                <a:solidFill>
-                  <a:srgbClr val="000000"/>
-                </a:solidFill>
-                <a:latin typeface="EurostileT"/>
+                <a:latin typeface="Arial"/>
               </a:rPr>
               <a:t>6.º nível da estrutura de tópicos</a:t>
             </a:r>
             <a:endParaRPr b="0" lang="pt-BR" sz="2000" spc="-1" strike="noStrike">
-              <a:solidFill>
-                <a:srgbClr val="000000"/>
-              </a:solidFill>
-              <a:latin typeface="EurostileT"/>
+              <a:latin typeface="Arial"/>
             </a:endParaRPr>
           </a:p>
           <a:p>
@@ -3503,18 +3231,12 @@
             </a:pPr>
             <a:r>
               <a:rPr b="0" lang="pt-BR" sz="2000" spc="-1" strike="noStrike">
-                <a:solidFill>
-                  <a:srgbClr val="000000"/>
-                </a:solidFill>
-                <a:latin typeface="EurostileT"/>
+                <a:latin typeface="Arial"/>
               </a:rPr>
               <a:t>7.º nível da estrutura de tópicos</a:t>
             </a:r>
             <a:endParaRPr b="0" lang="pt-BR" sz="2000" spc="-1" strike="noStrike">
-              <a:solidFill>
-                <a:srgbClr val="000000"/>
-              </a:solidFill>
-              <a:latin typeface="EurostileT"/>
+              <a:latin typeface="Arial"/>
             </a:endParaRPr>
           </a:p>
         </p:txBody>
@@ -3565,7 +3287,7 @@
         <p:spPr>
           <a:xfrm>
             <a:off x="0" y="4599000"/>
-            <a:ext cx="9143640" cy="471240"/>
+            <a:ext cx="9143280" cy="470880"/>
           </a:xfrm>
           <a:prstGeom prst="rect">
             <a:avLst/>
@@ -3616,7 +3338,7 @@
         <p:spPr>
           <a:xfrm>
             <a:off x="997560" y="1805040"/>
-            <a:ext cx="7065360" cy="2588400"/>
+            <a:ext cx="7065000" cy="2588040"/>
           </a:xfrm>
           <a:prstGeom prst="roundRect">
             <a:avLst>
@@ -3638,7 +3360,7 @@
             <a:noFill/>
           </a:ln>
           <a:effectLst>
-            <a:outerShdw algn="ctr" blurRad="57785" dir="3180283" dist="32904">
+            <a:outerShdw algn="ctr" blurRad="57785" dir="3187806" dist="32400">
               <a:srgbClr val="000000">
                 <a:alpha val="30000"/>
               </a:srgbClr>
@@ -3686,6 +3408,7 @@
                   <a:srgbClr val="314b4d"/>
                 </a:solidFill>
                 <a:latin typeface="Calibri"/>
+                <a:ea typeface="DejaVu Sans"/>
               </a:rPr>
               <a:t>Descarte de Embalagens e Produtos de Agrotóxicos</a:t>
             </a:r>
@@ -3727,14 +3450,14 @@
       </p:grpSpPr>
       <p:sp>
         <p:nvSpPr>
-          <p:cNvPr id="116" name="CustomShape 1"/>
+          <p:cNvPr id="117" name="CustomShape 1"/>
           <p:cNvSpPr/>
           <p:nvPr/>
         </p:nvSpPr>
         <p:spPr>
           <a:xfrm>
             <a:off x="0" y="1001880"/>
-            <a:ext cx="9143640" cy="664920"/>
+            <a:ext cx="9143280" cy="664560"/>
           </a:xfrm>
           <a:prstGeom prst="rect">
             <a:avLst/>
@@ -3771,14 +3494,14 @@
       </p:sp>
       <p:sp>
         <p:nvSpPr>
-          <p:cNvPr id="117" name="CustomShape 2"/>
+          <p:cNvPr id="118" name="CustomShape 2"/>
           <p:cNvSpPr/>
           <p:nvPr/>
         </p:nvSpPr>
         <p:spPr>
           <a:xfrm>
             <a:off x="206280" y="1100160"/>
-            <a:ext cx="8735760" cy="471240"/>
+            <a:ext cx="8735400" cy="470880"/>
           </a:xfrm>
           <a:prstGeom prst="rect">
             <a:avLst/>
@@ -3822,14 +3545,14 @@
       </p:sp>
       <p:sp>
         <p:nvSpPr>
-          <p:cNvPr id="118" name="CustomShape 3"/>
+          <p:cNvPr id="119" name="CustomShape 3"/>
           <p:cNvSpPr/>
           <p:nvPr/>
         </p:nvSpPr>
         <p:spPr>
           <a:xfrm>
             <a:off x="179280" y="1770120"/>
-            <a:ext cx="8827560" cy="4119120"/>
+            <a:ext cx="8827200" cy="4118760"/>
           </a:xfrm>
           <a:prstGeom prst="rect">
             <a:avLst/>
@@ -3883,6 +3606,7 @@
                   <a:srgbClr val="404040"/>
                 </a:solidFill>
                 <a:latin typeface="Calibri"/>
+                <a:ea typeface="DejaVu Sans"/>
               </a:rPr>
               <a:t> </a:t>
             </a:r>
@@ -3910,14 +3634,14 @@
       </p:sp>
       <p:sp>
         <p:nvSpPr>
-          <p:cNvPr id="119" name="CustomShape 4"/>
+          <p:cNvPr id="120" name="CustomShape 4"/>
           <p:cNvSpPr/>
           <p:nvPr/>
         </p:nvSpPr>
         <p:spPr>
           <a:xfrm>
             <a:off x="228600" y="461880"/>
-            <a:ext cx="8826120" cy="446040"/>
+            <a:ext cx="8825760" cy="445680"/>
           </a:xfrm>
           <a:prstGeom prst="rect">
             <a:avLst/>
@@ -3961,7 +3685,7 @@
       </p:sp>
       <p:pic>
         <p:nvPicPr>
-          <p:cNvPr id="120" name="" descr=""/>
+          <p:cNvPr id="121" name="" descr=""/>
           <p:cNvPicPr/>
           <p:nvPr/>
         </p:nvPicPr>
@@ -3972,7 +3696,7 @@
         <p:spPr>
           <a:xfrm>
             <a:off x="1944000" y="1821960"/>
-            <a:ext cx="4942080" cy="4067280"/>
+            <a:ext cx="4941720" cy="4066920"/>
           </a:xfrm>
           <a:prstGeom prst="rect">
             <a:avLst/>
@@ -4014,14 +3738,14 @@
       </p:grpSpPr>
       <p:sp>
         <p:nvSpPr>
-          <p:cNvPr id="121" name="CustomShape 1"/>
+          <p:cNvPr id="122" name="CustomShape 1"/>
           <p:cNvSpPr/>
           <p:nvPr/>
         </p:nvSpPr>
         <p:spPr>
           <a:xfrm>
             <a:off x="0" y="1001880"/>
-            <a:ext cx="9143640" cy="664920"/>
+            <a:ext cx="9143280" cy="664560"/>
           </a:xfrm>
           <a:prstGeom prst="rect">
             <a:avLst/>
@@ -4058,14 +3782,14 @@
       </p:sp>
       <p:sp>
         <p:nvSpPr>
-          <p:cNvPr id="122" name="CustomShape 2"/>
+          <p:cNvPr id="123" name="CustomShape 2"/>
           <p:cNvSpPr/>
           <p:nvPr/>
         </p:nvSpPr>
         <p:spPr>
           <a:xfrm>
             <a:off x="206280" y="1100160"/>
-            <a:ext cx="8735760" cy="471240"/>
+            <a:ext cx="8735400" cy="470880"/>
           </a:xfrm>
           <a:prstGeom prst="rect">
             <a:avLst/>
@@ -4109,14 +3833,14 @@
       </p:sp>
       <p:sp>
         <p:nvSpPr>
-          <p:cNvPr id="123" name="CustomShape 3"/>
+          <p:cNvPr id="124" name="CustomShape 3"/>
           <p:cNvSpPr/>
           <p:nvPr/>
         </p:nvSpPr>
         <p:spPr>
           <a:xfrm>
             <a:off x="179280" y="1770120"/>
-            <a:ext cx="8827560" cy="4119120"/>
+            <a:ext cx="8827200" cy="4118760"/>
           </a:xfrm>
           <a:prstGeom prst="rect">
             <a:avLst/>
@@ -4148,6 +3872,7 @@
                   <a:srgbClr val="404040"/>
                 </a:solidFill>
                 <a:latin typeface="Calibri"/>
+                <a:ea typeface="DejaVu Sans"/>
               </a:rPr>
               <a:t>Toda lógica de coreografia e orquestração está centrada no roteamento dos tipos de mensagem nos tópicos. Ao receber esta mensagem, a lambda realiza a tarefa e dispara nova mensagem para o tópico que torna a rotear a mensagem e num novo agente (lambda) entra em ação.</a:t>
             </a:r>
@@ -4167,6 +3892,7 @@
                   <a:srgbClr val="404040"/>
                 </a:solidFill>
                 <a:latin typeface="Calibri"/>
+                <a:ea typeface="DejaVu Sans"/>
               </a:rPr>
               <a:t>Fazendo com que seja possível uma transação de longa duração com integridade da informação e prevenção da consistência eventual dos dados.</a:t>
             </a:r>
@@ -4186,6 +3912,7 @@
                   <a:srgbClr val="404040"/>
                 </a:solidFill>
                 <a:latin typeface="Calibri"/>
+                <a:ea typeface="DejaVu Sans"/>
               </a:rPr>
               <a:t>Os pontos fortes desta arquitetura estão na descentralização dos serviços, alta disponibilidade, escalabilidade automática e segurança nas transações de longa duração, bem como na infraestrutura de cloud pública.</a:t>
             </a:r>
@@ -4197,14 +3924,14 @@
       </p:sp>
       <p:sp>
         <p:nvSpPr>
-          <p:cNvPr id="124" name="CustomShape 4"/>
+          <p:cNvPr id="125" name="CustomShape 4"/>
           <p:cNvSpPr/>
           <p:nvPr/>
         </p:nvSpPr>
         <p:spPr>
           <a:xfrm>
             <a:off x="228600" y="461880"/>
-            <a:ext cx="8826120" cy="446040"/>
+            <a:ext cx="8825760" cy="445680"/>
           </a:xfrm>
           <a:prstGeom prst="rect">
             <a:avLst/>
@@ -4285,7 +4012,7 @@
         <p:spPr>
           <a:xfrm>
             <a:off x="0" y="1001880"/>
-            <a:ext cx="9143640" cy="664920"/>
+            <a:ext cx="9143280" cy="664560"/>
           </a:xfrm>
           <a:prstGeom prst="rect">
             <a:avLst/>
@@ -4329,7 +4056,7 @@
         <p:spPr>
           <a:xfrm>
             <a:off x="206280" y="1100160"/>
-            <a:ext cx="8735760" cy="471240"/>
+            <a:ext cx="8735400" cy="470880"/>
           </a:xfrm>
           <a:prstGeom prst="rect">
             <a:avLst/>
@@ -4380,7 +4107,7 @@
         <p:spPr>
           <a:xfrm>
             <a:off x="179280" y="1770120"/>
-            <a:ext cx="8827560" cy="4119120"/>
+            <a:ext cx="8827200" cy="4118760"/>
           </a:xfrm>
           <a:prstGeom prst="rect">
             <a:avLst/>
@@ -4418,6 +4145,7 @@
                   <a:srgbClr val="404040"/>
                 </a:solidFill>
                 <a:latin typeface="Calibri"/>
+                <a:ea typeface="DejaVu Sans"/>
               </a:rPr>
               <a:t>Este trabalho tem como objetivo explicitar o padrão arquitetural Saga na solução da consistência eventual de microserviços em arquitetura distribuída. O case utilizado é de Descarte de produtos e embalagens de agrotóxicos no ramo do agronegócio.</a:t>
             </a:r>
@@ -4452,7 +4180,7 @@
         <p:spPr>
           <a:xfrm>
             <a:off x="228600" y="461880"/>
-            <a:ext cx="8826120" cy="446040"/>
+            <a:ext cx="8825760" cy="445680"/>
           </a:xfrm>
           <a:prstGeom prst="rect">
             <a:avLst/>
@@ -4533,7 +4261,7 @@
         <p:spPr>
           <a:xfrm>
             <a:off x="0" y="1001880"/>
-            <a:ext cx="9143640" cy="664920"/>
+            <a:ext cx="9143280" cy="664560"/>
           </a:xfrm>
           <a:prstGeom prst="rect">
             <a:avLst/>
@@ -4577,7 +4305,7 @@
         <p:spPr>
           <a:xfrm>
             <a:off x="206280" y="1100160"/>
-            <a:ext cx="8735760" cy="471240"/>
+            <a:ext cx="8735400" cy="470880"/>
           </a:xfrm>
           <a:prstGeom prst="rect">
             <a:avLst/>
@@ -4628,7 +4356,7 @@
         <p:spPr>
           <a:xfrm>
             <a:off x="179280" y="1770120"/>
-            <a:ext cx="8827560" cy="4119120"/>
+            <a:ext cx="8827200" cy="4118760"/>
           </a:xfrm>
           <a:prstGeom prst="rect">
             <a:avLst/>
@@ -4682,6 +4410,7 @@
                   <a:srgbClr val="404040"/>
                 </a:solidFill>
                 <a:latin typeface="Calibri"/>
+                <a:ea typeface="DejaVu Sans"/>
               </a:rPr>
               <a:t> </a:t>
             </a:r>
@@ -4700,7 +4429,7 @@
         <p:spPr>
           <a:xfrm>
             <a:off x="228600" y="461880"/>
-            <a:ext cx="8826120" cy="446040"/>
+            <a:ext cx="8825760" cy="445680"/>
           </a:xfrm>
           <a:prstGeom prst="rect">
             <a:avLst/>
@@ -4755,7 +4484,7 @@
         <p:spPr>
           <a:xfrm>
             <a:off x="1440000" y="1849320"/>
-            <a:ext cx="5976000" cy="4126680"/>
+            <a:ext cx="5975640" cy="4126320"/>
           </a:xfrm>
           <a:prstGeom prst="rect">
             <a:avLst/>
@@ -4804,7 +4533,7 @@
         <p:spPr>
           <a:xfrm>
             <a:off x="0" y="1001880"/>
-            <a:ext cx="9143640" cy="664920"/>
+            <a:ext cx="9143280" cy="664560"/>
           </a:xfrm>
           <a:prstGeom prst="rect">
             <a:avLst/>
@@ -4848,7 +4577,7 @@
         <p:spPr>
           <a:xfrm>
             <a:off x="206280" y="1100160"/>
-            <a:ext cx="8735760" cy="471240"/>
+            <a:ext cx="8735400" cy="470880"/>
           </a:xfrm>
           <a:prstGeom prst="rect">
             <a:avLst/>
@@ -4899,7 +4628,7 @@
         <p:spPr>
           <a:xfrm>
             <a:off x="179280" y="1770120"/>
-            <a:ext cx="8827560" cy="4119120"/>
+            <a:ext cx="8827200" cy="4118760"/>
           </a:xfrm>
           <a:prstGeom prst="rect">
             <a:avLst/>
@@ -4953,6 +4682,7 @@
                   <a:srgbClr val="404040"/>
                 </a:solidFill>
                 <a:latin typeface="Calibri"/>
+                <a:ea typeface="DejaVu Sans"/>
               </a:rPr>
               <a:t> </a:t>
             </a:r>
@@ -4971,7 +4701,7 @@
         <p:spPr>
           <a:xfrm>
             <a:off x="228600" y="461880"/>
-            <a:ext cx="8826120" cy="446040"/>
+            <a:ext cx="8825760" cy="445680"/>
           </a:xfrm>
           <a:prstGeom prst="rect">
             <a:avLst/>
@@ -5015,14 +4745,14 @@
       </p:sp>
       <p:sp>
         <p:nvSpPr>
-          <p:cNvPr id="91" name="TextShape 5"/>
-          <p:cNvSpPr txBox="1"/>
+          <p:cNvPr id="91" name="CustomShape 5"/>
+          <p:cNvSpPr/>
           <p:nvPr/>
         </p:nvSpPr>
         <p:spPr>
           <a:xfrm>
             <a:off x="288000" y="1944000"/>
-            <a:ext cx="8280000" cy="4008600"/>
+            <a:ext cx="8279640" cy="4008240"/>
           </a:xfrm>
           <a:prstGeom prst="rect">
             <a:avLst/>
@@ -5032,12 +4762,18 @@
             <a:noFill/>
           </a:ln>
         </p:spPr>
+        <p:style>
+          <a:lnRef idx="0"/>
+          <a:fillRef idx="0"/>
+          <a:effectRef idx="0"/>
+          <a:fontRef idx="minor"/>
+        </p:style>
         <p:txBody>
           <a:bodyPr lIns="90000" rIns="90000" tIns="45000" bIns="45000">
             <a:noAutofit/>
           </a:bodyPr>
           <a:p>
-            <a:pPr marL="216000" indent="-216000">
+            <a:pPr marL="216000" indent="-215640">
               <a:lnSpc>
                 <a:spcPct val="100000"/>
               </a:lnSpc>
@@ -5062,7 +4798,7 @@
             </a:endParaRPr>
           </a:p>
           <a:p>
-            <a:pPr marL="216000" indent="-216000">
+            <a:pPr marL="216000" indent="-215640">
               <a:lnSpc>
                 <a:spcPct val="100000"/>
               </a:lnSpc>
@@ -5087,7 +4823,7 @@
             </a:endParaRPr>
           </a:p>
           <a:p>
-            <a:pPr marL="216000" indent="-216000">
+            <a:pPr marL="216000" indent="-215640">
               <a:lnSpc>
                 <a:spcPct val="100000"/>
               </a:lnSpc>
@@ -5112,7 +4848,7 @@
             </a:endParaRPr>
           </a:p>
           <a:p>
-            <a:pPr marL="216000" indent="-216000">
+            <a:pPr marL="216000" indent="-215640">
               <a:lnSpc>
                 <a:spcPct val="100000"/>
               </a:lnSpc>
@@ -5137,7 +4873,7 @@
             </a:endParaRPr>
           </a:p>
           <a:p>
-            <a:pPr marL="216000" indent="-216000">
+            <a:pPr marL="216000" indent="-215640">
               <a:lnSpc>
                 <a:spcPct val="100000"/>
               </a:lnSpc>
@@ -5162,7 +4898,7 @@
             </a:endParaRPr>
           </a:p>
           <a:p>
-            <a:pPr marL="216000" indent="-216000">
+            <a:pPr marL="216000" indent="-215640">
               <a:lnSpc>
                 <a:spcPct val="100000"/>
               </a:lnSpc>
@@ -5187,7 +4923,7 @@
             </a:endParaRPr>
           </a:p>
           <a:p>
-            <a:pPr marL="216000" indent="-216000">
+            <a:pPr marL="216000" indent="-215640">
               <a:lnSpc>
                 <a:spcPct val="100000"/>
               </a:lnSpc>
@@ -5221,7 +4957,7 @@
             </a:endParaRPr>
           </a:p>
           <a:p>
-            <a:pPr marL="216000" indent="-216000">
+            <a:pPr marL="216000" indent="-215640">
               <a:lnSpc>
                 <a:spcPct val="100000"/>
               </a:lnSpc>
@@ -5246,7 +4982,7 @@
             </a:endParaRPr>
           </a:p>
           <a:p>
-            <a:pPr marL="216000" indent="-216000">
+            <a:pPr marL="216000" indent="-215640">
               <a:lnSpc>
                 <a:spcPct val="100000"/>
               </a:lnSpc>
@@ -5271,7 +5007,7 @@
             </a:endParaRPr>
           </a:p>
           <a:p>
-            <a:pPr marL="216000" indent="-216000">
+            <a:pPr marL="216000" indent="-215640">
               <a:lnSpc>
                 <a:spcPct val="100000"/>
               </a:lnSpc>
@@ -5296,7 +5032,7 @@
             </a:endParaRPr>
           </a:p>
           <a:p>
-            <a:pPr marL="216000" indent="-216000">
+            <a:pPr marL="216000" indent="-215640">
               <a:lnSpc>
                 <a:spcPct val="100000"/>
               </a:lnSpc>
@@ -5321,7 +5057,7 @@
             </a:endParaRPr>
           </a:p>
           <a:p>
-            <a:pPr marL="216000" indent="-216000">
+            <a:pPr marL="216000" indent="-215640">
               <a:lnSpc>
                 <a:spcPct val="100000"/>
               </a:lnSpc>
@@ -5395,7 +5131,7 @@
         <p:spPr>
           <a:xfrm>
             <a:off x="0" y="1001880"/>
-            <a:ext cx="9143640" cy="664920"/>
+            <a:ext cx="9143280" cy="664560"/>
           </a:xfrm>
           <a:prstGeom prst="rect">
             <a:avLst/>
@@ -5439,7 +5175,7 @@
         <p:spPr>
           <a:xfrm>
             <a:off x="206280" y="1100160"/>
-            <a:ext cx="8735760" cy="471240"/>
+            <a:ext cx="8735400" cy="470880"/>
           </a:xfrm>
           <a:prstGeom prst="rect">
             <a:avLst/>
@@ -5490,7 +5226,7 @@
         <p:spPr>
           <a:xfrm>
             <a:off x="179280" y="1770120"/>
-            <a:ext cx="8827560" cy="4119120"/>
+            <a:ext cx="8827200" cy="4118760"/>
           </a:xfrm>
           <a:prstGeom prst="rect">
             <a:avLst/>
@@ -5511,7 +5247,10 @@
             <a:noAutofit/>
           </a:bodyPr>
           <a:p>
-            <a:pPr marL="216000" indent="-216000">
+            <a:pPr marL="216000" indent="-215640">
+              <a:lnSpc>
+                <a:spcPct val="100000"/>
+              </a:lnSpc>
               <a:buClr>
                 <a:srgbClr val="000000"/>
               </a:buClr>
@@ -5525,6 +5264,7 @@
                   <a:srgbClr val="404040"/>
                 </a:solidFill>
                 <a:latin typeface="Calibri"/>
+                <a:ea typeface="DejaVu Sans"/>
               </a:rPr>
               <a:t>A linguagem utilizada deverá ser da tecnologia .NET (core). </a:t>
             </a:r>
@@ -5533,7 +5273,20 @@
             </a:endParaRPr>
           </a:p>
           <a:p>
-            <a:pPr marL="216000" indent="-216000">
+            <a:pPr>
+              <a:lnSpc>
+                <a:spcPct val="100000"/>
+              </a:lnSpc>
+            </a:pPr>
+            <a:endParaRPr b="0" lang="pt-BR" sz="2300" spc="-1" strike="noStrike">
+              <a:latin typeface="Arial"/>
+            </a:endParaRPr>
+          </a:p>
+          <a:p>
+            <a:pPr marL="216000" indent="-215640">
+              <a:lnSpc>
+                <a:spcPct val="100000"/>
+              </a:lnSpc>
               <a:buClr>
                 <a:srgbClr val="000000"/>
               </a:buClr>
@@ -5541,12 +5294,35 @@
               <a:buFont typeface="Wingdings" charset="2"/>
               <a:buChar char=""/>
             </a:pPr>
+            <a:r>
+              <a:rPr b="1" lang="pt-BR" sz="2300" spc="-1" strike="noStrike">
+                <a:solidFill>
+                  <a:srgbClr val="404040"/>
+                </a:solidFill>
+                <a:latin typeface="Calibri"/>
+                <a:ea typeface="DejaVu Sans"/>
+              </a:rPr>
+              <a:t>O sistema deve utilizar o serviço Lambda com SNS e SQS da AWS.</a:t>
+            </a:r>
             <a:endParaRPr b="0" lang="pt-BR" sz="2300" spc="-1" strike="noStrike">
               <a:latin typeface="Arial"/>
             </a:endParaRPr>
           </a:p>
           <a:p>
-            <a:pPr marL="216000" indent="-216000">
+            <a:pPr>
+              <a:lnSpc>
+                <a:spcPct val="100000"/>
+              </a:lnSpc>
+            </a:pPr>
+            <a:endParaRPr b="0" lang="pt-BR" sz="2300" spc="-1" strike="noStrike">
+              <a:latin typeface="Arial"/>
+            </a:endParaRPr>
+          </a:p>
+          <a:p>
+            <a:pPr marL="216000" indent="-215640">
+              <a:lnSpc>
+                <a:spcPct val="100000"/>
+              </a:lnSpc>
               <a:buClr>
                 <a:srgbClr val="000000"/>
               </a:buClr>
@@ -5560,15 +5336,29 @@
                   <a:srgbClr val="404040"/>
                 </a:solidFill>
                 <a:latin typeface="Calibri"/>
+                <a:ea typeface="DejaVu Sans"/>
               </a:rPr>
-              <a:t>O sistema deve utilizar o serviço Lambda com SNS e SQS da AWS.</a:t>
+              <a:t>O sistema deve abrir de forma responsiva em aparelhos menores, como celular e tablet.</a:t>
             </a:r>
             <a:endParaRPr b="0" lang="pt-BR" sz="2300" spc="-1" strike="noStrike">
               <a:latin typeface="Arial"/>
             </a:endParaRPr>
           </a:p>
           <a:p>
-            <a:pPr marL="216000" indent="-216000">
+            <a:pPr>
+              <a:lnSpc>
+                <a:spcPct val="100000"/>
+              </a:lnSpc>
+            </a:pPr>
+            <a:endParaRPr b="0" lang="pt-BR" sz="2300" spc="-1" strike="noStrike">
+              <a:latin typeface="Arial"/>
+            </a:endParaRPr>
+          </a:p>
+          <a:p>
+            <a:pPr marL="216000" indent="-215640">
+              <a:lnSpc>
+                <a:spcPct val="100000"/>
+              </a:lnSpc>
               <a:buClr>
                 <a:srgbClr val="000000"/>
               </a:buClr>
@@ -5576,12 +5366,35 @@
               <a:buFont typeface="Wingdings" charset="2"/>
               <a:buChar char=""/>
             </a:pPr>
+            <a:r>
+              <a:rPr b="1" lang="pt-BR" sz="2300" spc="-1" strike="noStrike">
+                <a:solidFill>
+                  <a:srgbClr val="404040"/>
+                </a:solidFill>
+                <a:latin typeface="Calibri"/>
+                <a:ea typeface="DejaVu Sans"/>
+              </a:rPr>
+              <a:t>O sistema deve ser modular para facilitar a implantação.</a:t>
+            </a:r>
             <a:endParaRPr b="0" lang="pt-BR" sz="2300" spc="-1" strike="noStrike">
               <a:latin typeface="Arial"/>
             </a:endParaRPr>
           </a:p>
           <a:p>
-            <a:pPr marL="216000" indent="-216000">
+            <a:pPr>
+              <a:lnSpc>
+                <a:spcPct val="100000"/>
+              </a:lnSpc>
+            </a:pPr>
+            <a:endParaRPr b="0" lang="pt-BR" sz="2300" spc="-1" strike="noStrike">
+              <a:latin typeface="Arial"/>
+            </a:endParaRPr>
+          </a:p>
+          <a:p>
+            <a:pPr marL="216000" indent="-215640">
+              <a:lnSpc>
+                <a:spcPct val="100000"/>
+              </a:lnSpc>
               <a:buClr>
                 <a:srgbClr val="000000"/>
               </a:buClr>
@@ -5595,76 +5408,7 @@
                   <a:srgbClr val="404040"/>
                 </a:solidFill>
                 <a:latin typeface="Calibri"/>
-              </a:rPr>
-              <a:t>O sistema deve abrir de forma responsiva em aparelhos menores, como celular e tablet.</a:t>
-            </a:r>
-            <a:endParaRPr b="0" lang="pt-BR" sz="2300" spc="-1" strike="noStrike">
-              <a:latin typeface="Arial"/>
-            </a:endParaRPr>
-          </a:p>
-          <a:p>
-            <a:pPr marL="216000" indent="-216000">
-              <a:buClr>
-                <a:srgbClr val="000000"/>
-              </a:buClr>
-              <a:buSzPct val="45000"/>
-              <a:buFont typeface="Wingdings" charset="2"/>
-              <a:buChar char=""/>
-            </a:pPr>
-            <a:endParaRPr b="0" lang="pt-BR" sz="2300" spc="-1" strike="noStrike">
-              <a:latin typeface="Arial"/>
-            </a:endParaRPr>
-          </a:p>
-          <a:p>
-            <a:pPr marL="216000" indent="-216000">
-              <a:buClr>
-                <a:srgbClr val="000000"/>
-              </a:buClr>
-              <a:buSzPct val="45000"/>
-              <a:buFont typeface="Wingdings" charset="2"/>
-              <a:buChar char=""/>
-            </a:pPr>
-            <a:r>
-              <a:rPr b="1" lang="pt-BR" sz="2300" spc="-1" strike="noStrike">
-                <a:solidFill>
-                  <a:srgbClr val="404040"/>
-                </a:solidFill>
-                <a:latin typeface="Calibri"/>
-              </a:rPr>
-              <a:t>O sistema deve ser modular para facilitar a implantação.</a:t>
-            </a:r>
-            <a:endParaRPr b="0" lang="pt-BR" sz="2300" spc="-1" strike="noStrike">
-              <a:latin typeface="Arial"/>
-            </a:endParaRPr>
-          </a:p>
-          <a:p>
-            <a:pPr marL="216000" indent="-216000">
-              <a:buClr>
-                <a:srgbClr val="000000"/>
-              </a:buClr>
-              <a:buSzPct val="45000"/>
-              <a:buFont typeface="Wingdings" charset="2"/>
-              <a:buChar char=""/>
-            </a:pPr>
-            <a:endParaRPr b="0" lang="pt-BR" sz="2300" spc="-1" strike="noStrike">
-              <a:latin typeface="Arial"/>
-            </a:endParaRPr>
-          </a:p>
-          <a:p>
-            <a:pPr marL="216000" indent="-216000">
-              <a:buClr>
-                <a:srgbClr val="000000"/>
-              </a:buClr>
-              <a:buSzPct val="45000"/>
-              <a:buFont typeface="Wingdings" charset="2"/>
-              <a:buChar char=""/>
-            </a:pPr>
-            <a:r>
-              <a:rPr b="1" lang="pt-BR" sz="2300" spc="-1" strike="noStrike">
-                <a:solidFill>
-                  <a:srgbClr val="404040"/>
-                </a:solidFill>
-                <a:latin typeface="Calibri"/>
+                <a:ea typeface="DejaVu Sans"/>
               </a:rPr>
               <a:t>As integrações entre os sistemas legados devem utilizar o padrão ws-security (wss)</a:t>
             </a:r>
@@ -5690,6 +5434,7 @@
                   <a:srgbClr val="404040"/>
                 </a:solidFill>
                 <a:latin typeface="Calibri"/>
+                <a:ea typeface="DejaVu Sans"/>
               </a:rPr>
               <a:t> </a:t>
             </a:r>
@@ -5708,7 +5453,7 @@
         <p:spPr>
           <a:xfrm>
             <a:off x="228600" y="461880"/>
-            <a:ext cx="8826120" cy="446040"/>
+            <a:ext cx="8825760" cy="445680"/>
           </a:xfrm>
           <a:prstGeom prst="rect">
             <a:avLst/>
@@ -5789,7 +5534,7 @@
         <p:spPr>
           <a:xfrm>
             <a:off x="0" y="1001880"/>
-            <a:ext cx="9143640" cy="664920"/>
+            <a:ext cx="9143280" cy="664560"/>
           </a:xfrm>
           <a:prstGeom prst="rect">
             <a:avLst/>
@@ -5833,7 +5578,7 @@
         <p:spPr>
           <a:xfrm>
             <a:off x="206280" y="1100160"/>
-            <a:ext cx="8735760" cy="471240"/>
+            <a:ext cx="8735400" cy="470880"/>
           </a:xfrm>
           <a:prstGeom prst="rect">
             <a:avLst/>
@@ -5884,7 +5629,7 @@
         <p:spPr>
           <a:xfrm>
             <a:off x="179280" y="1770120"/>
-            <a:ext cx="8827560" cy="4119120"/>
+            <a:ext cx="8827200" cy="4118760"/>
           </a:xfrm>
           <a:prstGeom prst="rect">
             <a:avLst/>
@@ -5922,6 +5667,7 @@
                   <a:srgbClr val="404040"/>
                 </a:solidFill>
                 <a:latin typeface="Calibri"/>
+                <a:ea typeface="DejaVu Sans"/>
               </a:rPr>
               <a:t> </a:t>
             </a:r>
@@ -5947,6 +5693,7 @@
                   <a:srgbClr val="404040"/>
                 </a:solidFill>
                 <a:latin typeface="Calibri"/>
+                <a:ea typeface="DejaVu Sans"/>
               </a:rPr>
               <a:t> </a:t>
             </a:r>
@@ -5965,7 +5712,7 @@
         <p:spPr>
           <a:xfrm>
             <a:off x="228600" y="461880"/>
-            <a:ext cx="8826120" cy="446040"/>
+            <a:ext cx="8825760" cy="445680"/>
           </a:xfrm>
           <a:prstGeom prst="rect">
             <a:avLst/>
@@ -6020,7 +5767,7 @@
         <p:spPr>
           <a:xfrm>
             <a:off x="1953000" y="1739520"/>
-            <a:ext cx="4743000" cy="4236480"/>
+            <a:ext cx="4742640" cy="4236120"/>
           </a:xfrm>
           <a:prstGeom prst="rect">
             <a:avLst/>
@@ -6069,7 +5816,7 @@
         <p:spPr>
           <a:xfrm>
             <a:off x="0" y="1001880"/>
-            <a:ext cx="9143640" cy="664920"/>
+            <a:ext cx="9143280" cy="664560"/>
           </a:xfrm>
           <a:prstGeom prst="rect">
             <a:avLst/>
@@ -6113,7 +5860,7 @@
         <p:spPr>
           <a:xfrm>
             <a:off x="206280" y="1100160"/>
-            <a:ext cx="8735760" cy="471240"/>
+            <a:ext cx="8735400" cy="470880"/>
           </a:xfrm>
           <a:prstGeom prst="rect">
             <a:avLst/>
@@ -6164,7 +5911,7 @@
         <p:spPr>
           <a:xfrm>
             <a:off x="179280" y="1770120"/>
-            <a:ext cx="8827560" cy="4119120"/>
+            <a:ext cx="8827200" cy="4118760"/>
           </a:xfrm>
           <a:prstGeom prst="rect">
             <a:avLst/>
@@ -6218,6 +5965,7 @@
                   <a:srgbClr val="404040"/>
                 </a:solidFill>
                 <a:latin typeface="Calibri"/>
+                <a:ea typeface="DejaVu Sans"/>
               </a:rPr>
               <a:t> </a:t>
             </a:r>
@@ -6252,7 +6000,7 @@
         <p:spPr>
           <a:xfrm>
             <a:off x="228600" y="461880"/>
-            <a:ext cx="8826120" cy="446040"/>
+            <a:ext cx="8825760" cy="445680"/>
           </a:xfrm>
           <a:prstGeom prst="rect">
             <a:avLst/>
@@ -6307,7 +6055,7 @@
         <p:spPr>
           <a:xfrm>
             <a:off x="5328000" y="1770120"/>
-            <a:ext cx="3633840" cy="4221000"/>
+            <a:ext cx="3633480" cy="4220640"/>
           </a:xfrm>
           <a:prstGeom prst="rect">
             <a:avLst/>
@@ -6330,7 +6078,7 @@
         <p:spPr>
           <a:xfrm>
             <a:off x="216000" y="1769400"/>
-            <a:ext cx="5054400" cy="4119840"/>
+            <a:ext cx="5054040" cy="4119480"/>
           </a:xfrm>
           <a:prstGeom prst="rect">
             <a:avLst/>
@@ -6379,7 +6127,7 @@
         <p:spPr>
           <a:xfrm>
             <a:off x="0" y="1001880"/>
-            <a:ext cx="9143640" cy="664920"/>
+            <a:ext cx="9143280" cy="664560"/>
           </a:xfrm>
           <a:prstGeom prst="rect">
             <a:avLst/>
@@ -6423,7 +6171,7 @@
         <p:spPr>
           <a:xfrm>
             <a:off x="206280" y="1100160"/>
-            <a:ext cx="8735760" cy="471240"/>
+            <a:ext cx="8735400" cy="470880"/>
           </a:xfrm>
           <a:prstGeom prst="rect">
             <a:avLst/>
@@ -6474,7 +6222,7 @@
         <p:spPr>
           <a:xfrm>
             <a:off x="179280" y="1770120"/>
-            <a:ext cx="8827560" cy="4119120"/>
+            <a:ext cx="8827200" cy="4118760"/>
           </a:xfrm>
           <a:prstGeom prst="rect">
             <a:avLst/>
@@ -6528,6 +6276,7 @@
                   <a:srgbClr val="404040"/>
                 </a:solidFill>
                 <a:latin typeface="Calibri"/>
+                <a:ea typeface="DejaVu Sans"/>
               </a:rPr>
               <a:t> </a:t>
             </a:r>
@@ -6562,7 +6311,7 @@
         <p:spPr>
           <a:xfrm>
             <a:off x="228600" y="461880"/>
-            <a:ext cx="8826120" cy="446040"/>
+            <a:ext cx="8825760" cy="445680"/>
           </a:xfrm>
           <a:prstGeom prst="rect">
             <a:avLst/>
@@ -6617,7 +6366,7 @@
         <p:spPr>
           <a:xfrm>
             <a:off x="792000" y="1944000"/>
-            <a:ext cx="7552800" cy="3933360"/>
+            <a:ext cx="7552440" cy="3933000"/>
           </a:xfrm>
           <a:prstGeom prst="rect">
             <a:avLst/>
@@ -6666,7 +6415,7 @@
         <p:spPr>
           <a:xfrm>
             <a:off x="0" y="1001880"/>
-            <a:ext cx="9143640" cy="664920"/>
+            <a:ext cx="9143280" cy="664560"/>
           </a:xfrm>
           <a:prstGeom prst="rect">
             <a:avLst/>
@@ -6710,7 +6459,7 @@
         <p:spPr>
           <a:xfrm>
             <a:off x="206280" y="1100160"/>
-            <a:ext cx="8735760" cy="471240"/>
+            <a:ext cx="8735400" cy="470880"/>
           </a:xfrm>
           <a:prstGeom prst="rect">
             <a:avLst/>
@@ -6761,7 +6510,7 @@
         <p:spPr>
           <a:xfrm>
             <a:off x="179280" y="1770120"/>
-            <a:ext cx="8827560" cy="4119120"/>
+            <a:ext cx="8827200" cy="4118760"/>
           </a:xfrm>
           <a:prstGeom prst="rect">
             <a:avLst/>
@@ -6799,87 +6548,9 @@
                   <a:srgbClr val="404040"/>
                 </a:solidFill>
                 <a:latin typeface="Calibri"/>
+                <a:ea typeface="DejaVu Sans"/>
               </a:rPr>
-              <a:t>Vídeo (</a:t>
-            </a:r>
-            <a:r>
-              <a:rPr b="1" i="1" lang="pt-BR" sz="2300" spc="-1" strike="noStrike">
-                <a:solidFill>
-                  <a:srgbClr val="404040"/>
-                </a:solidFill>
-                <a:latin typeface="Calibri"/>
-              </a:rPr>
-              <a:t>screencast</a:t>
-            </a:r>
-            <a:r>
-              <a:rPr b="1" lang="pt-BR" sz="2300" spc="-1" strike="noStrike">
-                <a:solidFill>
-                  <a:srgbClr val="404040"/>
-                </a:solidFill>
-                <a:latin typeface="Calibri"/>
-              </a:rPr>
-              <a:t>) de apresentação da aplicação web.</a:t>
-            </a:r>
-            <a:endParaRPr b="0" lang="pt-BR" sz="2300" spc="-1" strike="noStrike">
-              <a:latin typeface="Arial"/>
-            </a:endParaRPr>
-          </a:p>
-          <a:p>
-            <a:pPr>
-              <a:lnSpc>
-                <a:spcPts val="2801"/>
-              </a:lnSpc>
-              <a:spcBef>
-                <a:spcPts val="400"/>
-              </a:spcBef>
-              <a:spcAft>
-                <a:spcPts val="400"/>
-              </a:spcAft>
-            </a:pPr>
-            <a:r>
-              <a:rPr b="1" lang="pt-BR" sz="2300" spc="-1" strike="noStrike">
-                <a:solidFill>
-                  <a:srgbClr val="404040"/>
-                </a:solidFill>
-                <a:latin typeface="Calibri"/>
-              </a:rPr>
-              <a:t>Sugestão de gravador de tela: </a:t>
-            </a:r>
-            <a:r>
-              <a:rPr b="1" lang="pt-BR" sz="2300" spc="-1" strike="noStrike" u="sng">
-                <a:solidFill>
-                  <a:srgbClr val="00f2f2"/>
-                </a:solidFill>
-                <a:uFillTx/>
-                <a:latin typeface="Calibri"/>
-                <a:hlinkClick r:id="rId1"/>
-              </a:rPr>
-              <a:t>http://www.screenr.com</a:t>
-            </a:r>
-            <a:endParaRPr b="0" lang="pt-BR" sz="2300" spc="-1" strike="noStrike">
-              <a:latin typeface="Arial"/>
-            </a:endParaRPr>
-          </a:p>
-          <a:p>
-            <a:pPr>
-              <a:lnSpc>
-                <a:spcPts val="2801"/>
-              </a:lnSpc>
-              <a:spcBef>
-                <a:spcPts val="400"/>
-              </a:spcBef>
-              <a:spcAft>
-                <a:spcPts val="400"/>
-              </a:spcAft>
-            </a:pPr>
-            <a:r>
-              <a:rPr b="1" lang="pt-BR" sz="2300" spc="-1" strike="noStrike">
-                <a:solidFill>
-                  <a:srgbClr val="404040"/>
-                </a:solidFill>
-                <a:latin typeface="Calibri"/>
-              </a:rPr>
-              <a:t>Duração: 2’00” </a:t>
+              <a:t> </a:t>
             </a:r>
             <a:endParaRPr b="0" lang="pt-BR" sz="2300" spc="-1" strike="noStrike">
               <a:latin typeface="Arial"/>
@@ -6928,7 +6599,7 @@
         <p:spPr>
           <a:xfrm>
             <a:off x="228600" y="461880"/>
-            <a:ext cx="8826120" cy="446040"/>
+            <a:ext cx="8825760" cy="445680"/>
           </a:xfrm>
           <a:prstGeom prst="rect">
             <a:avLst/>
@@ -6970,6 +6641,29 @@
           </a:p>
         </p:txBody>
       </p:sp>
+      <p:pic>
+        <p:nvPicPr>
+          <p:cNvPr id="116" name="" descr=""/>
+          <p:cNvPicPr/>
+          <p:nvPr/>
+        </p:nvPicPr>
+        <p:blipFill>
+          <a:blip r:embed="rId1"/>
+          <a:stretch/>
+        </p:blipFill>
+        <p:spPr>
+          <a:xfrm>
+            <a:off x="1402200" y="1770120"/>
+            <a:ext cx="6085800" cy="4169520"/>
+          </a:xfrm>
+          <a:prstGeom prst="rect">
+            <a:avLst/>
+          </a:prstGeom>
+          <a:ln>
+            <a:noFill/>
+          </a:ln>
+        </p:spPr>
+      </p:pic>
     </p:spTree>
   </p:cSld>
   <mc:AlternateContent>

</xml_diff>

<commit_message>
ajuste de tcc e documento
</commit_message>
<xml_diff>
--- a/docs_tcc/apresentacao_projeto_arquitetural_TCC.pptx
+++ b/docs_tcc/apresentacao_projeto_arquitetural_TCC.pptx
@@ -17,6 +17,8 @@
     <p:sldId id="264" r:id="rId12"/>
     <p:sldId id="265" r:id="rId13"/>
     <p:sldId id="266" r:id="rId14"/>
+    <p:sldId id="267" r:id="rId15"/>
+    <p:sldId id="268" r:id="rId16"/>
   </p:sldIdLst>
   <p:sldSz cx="9144000" cy="6858000"/>
   <p:notesSz cx="7559675" cy="10691812"/>
@@ -3695,8 +3697,8 @@
         </p:blipFill>
         <p:spPr>
           <a:xfrm>
-            <a:off x="1944000" y="1821960"/>
-            <a:ext cx="4941720" cy="4066920"/>
+            <a:off x="1512000" y="1872000"/>
+            <a:ext cx="5979600" cy="3944160"/>
           </a:xfrm>
           <a:prstGeom prst="rect">
             <a:avLst/>
@@ -3968,6 +3970,368 @@
               <a:t>Descarte de Embalagens e Produtos de Agrotóxicos</a:t>
             </a:r>
             <a:endParaRPr b="0" lang="pt-BR" sz="2800" spc="-1" strike="noStrike">
+              <a:latin typeface="Arial"/>
+            </a:endParaRPr>
+          </a:p>
+        </p:txBody>
+      </p:sp>
+    </p:spTree>
+  </p:cSld>
+  <mc:AlternateContent>
+    <mc:Choice Requires="p14">
+      <p:transition spd="slow" p14:dur="2000"/>
+    </mc:Choice>
+    <mc:Fallback>
+      <p:transition spd="slow"/>
+    </mc:Fallback>
+  </mc:AlternateContent>
+</p:sld>
+</file>
+
+<file path=ppt/slides/slide12.xml><?xml version="1.0" encoding="utf-8"?>
+<p:sld xmlns:a="http://schemas.openxmlformats.org/drawingml/2006/main" xmlns:p="http://schemas.openxmlformats.org/presentationml/2006/main" xmlns:r="http://schemas.openxmlformats.org/officeDocument/2006/relationships" xmlns:p14="http://schemas.microsoft.com/office/powerpoint/2010/main" xmlns:p15="http://schemas.microsoft.com/office/powerpoint/2012/main" xmlns:mc="http://schemas.openxmlformats.org/markup-compatibility/2006">
+  <p:cSld>
+    <p:spTree>
+      <p:nvGrpSpPr>
+        <p:cNvPr id="1" name=""/>
+        <p:cNvGrpSpPr/>
+        <p:nvPr/>
+      </p:nvGrpSpPr>
+      <p:grpSpPr>
+        <a:xfrm>
+          <a:off x="0" y="0"/>
+          <a:ext cx="0" cy="0"/>
+          <a:chOff x="0" y="0"/>
+          <a:chExt cx="0" cy="0"/>
+        </a:xfrm>
+      </p:grpSpPr>
+      <p:sp>
+        <p:nvSpPr>
+          <p:cNvPr id="126" name="CustomShape 1"/>
+          <p:cNvSpPr/>
+          <p:nvPr/>
+        </p:nvSpPr>
+        <p:spPr>
+          <a:xfrm>
+            <a:off x="0" y="1001880"/>
+            <a:ext cx="9143280" cy="664560"/>
+          </a:xfrm>
+          <a:prstGeom prst="rect">
+            <a:avLst/>
+          </a:prstGeom>
+          <a:gradFill rotWithShape="0">
+            <a:gsLst>
+              <a:gs pos="0">
+                <a:srgbClr val="95b8bb"/>
+              </a:gs>
+              <a:gs pos="100000">
+                <a:srgbClr val="5d8d91"/>
+              </a:gs>
+            </a:gsLst>
+            <a:lin ang="16200000"/>
+          </a:gradFill>
+          <a:ln>
+            <a:noFill/>
+          </a:ln>
+        </p:spPr>
+        <p:style>
+          <a:lnRef idx="2">
+            <a:schemeClr val="accent1">
+              <a:shade val="50000"/>
+            </a:schemeClr>
+          </a:lnRef>
+          <a:fillRef idx="1">
+            <a:schemeClr val="accent1"/>
+          </a:fillRef>
+          <a:effectRef idx="0">
+            <a:schemeClr val="accent1"/>
+          </a:effectRef>
+          <a:fontRef idx="minor"/>
+        </p:style>
+      </p:sp>
+      <p:sp>
+        <p:nvSpPr>
+          <p:cNvPr id="127" name="CustomShape 2"/>
+          <p:cNvSpPr/>
+          <p:nvPr/>
+        </p:nvSpPr>
+        <p:spPr>
+          <a:xfrm>
+            <a:off x="206280" y="1100160"/>
+            <a:ext cx="8735400" cy="470880"/>
+          </a:xfrm>
+          <a:prstGeom prst="rect">
+            <a:avLst/>
+          </a:prstGeom>
+          <a:noFill/>
+          <a:ln>
+            <a:noFill/>
+          </a:ln>
+        </p:spPr>
+        <p:style>
+          <a:lnRef idx="0"/>
+          <a:fillRef idx="0"/>
+          <a:effectRef idx="0"/>
+          <a:fontRef idx="minor"/>
+        </p:style>
+        <p:txBody>
+          <a:bodyPr lIns="90000" rIns="90000" tIns="45000" bIns="45000">
+            <a:spAutoFit/>
+          </a:bodyPr>
+          <a:p>
+            <a:pPr>
+              <a:lnSpc>
+                <a:spcPct val="100000"/>
+              </a:lnSpc>
+            </a:pPr>
+            <a:r>
+              <a:rPr b="1" lang="pt-BR" sz="2500" spc="-1" strike="noStrike">
+                <a:solidFill>
+                  <a:srgbClr val="000000"/>
+                </a:solidFill>
+                <a:latin typeface="Calibri"/>
+                <a:ea typeface="Calibri"/>
+              </a:rPr>
+              <a:t>Implementação</a:t>
+            </a:r>
+            <a:endParaRPr b="0" lang="pt-BR" sz="2500" spc="-1" strike="noStrike">
+              <a:latin typeface="Arial"/>
+            </a:endParaRPr>
+          </a:p>
+        </p:txBody>
+      </p:sp>
+      <p:sp>
+        <p:nvSpPr>
+          <p:cNvPr id="128" name="CustomShape 3"/>
+          <p:cNvSpPr/>
+          <p:nvPr/>
+        </p:nvSpPr>
+        <p:spPr>
+          <a:xfrm>
+            <a:off x="179280" y="1770120"/>
+            <a:ext cx="8827200" cy="4118760"/>
+          </a:xfrm>
+          <a:prstGeom prst="rect">
+            <a:avLst/>
+          </a:prstGeom>
+          <a:noFill/>
+          <a:ln>
+            <a:noFill/>
+          </a:ln>
+        </p:spPr>
+        <p:style>
+          <a:lnRef idx="0"/>
+          <a:fillRef idx="0"/>
+          <a:effectRef idx="0"/>
+          <a:fontRef idx="minor"/>
+        </p:style>
+      </p:sp>
+      <p:sp>
+        <p:nvSpPr>
+          <p:cNvPr id="129" name="CustomShape 4"/>
+          <p:cNvSpPr/>
+          <p:nvPr/>
+        </p:nvSpPr>
+        <p:spPr>
+          <a:xfrm>
+            <a:off x="228600" y="461880"/>
+            <a:ext cx="8825760" cy="445680"/>
+          </a:xfrm>
+          <a:prstGeom prst="rect">
+            <a:avLst/>
+          </a:prstGeom>
+          <a:noFill/>
+          <a:ln>
+            <a:noFill/>
+          </a:ln>
+        </p:spPr>
+        <p:style>
+          <a:lnRef idx="0"/>
+          <a:fillRef idx="0"/>
+          <a:effectRef idx="0"/>
+          <a:fontRef idx="minor"/>
+        </p:style>
+        <p:txBody>
+          <a:bodyPr lIns="90000" rIns="90000" tIns="45000" bIns="45000">
+            <a:spAutoFit/>
+          </a:bodyPr>
+          <a:p>
+            <a:pPr>
+              <a:lnSpc>
+                <a:spcPts val="2801"/>
+              </a:lnSpc>
+            </a:pPr>
+            <a:r>
+              <a:rPr b="1" lang="pt-BR" sz="2800" spc="-1" strike="noStrike">
+                <a:solidFill>
+                  <a:srgbClr val="000000"/>
+                </a:solidFill>
+                <a:latin typeface="Calibri"/>
+                <a:ea typeface="Calibri"/>
+              </a:rPr>
+              <a:t>Descarte de Embalagens e Produtos de Agrotóxicos</a:t>
+            </a:r>
+            <a:endParaRPr b="0" lang="pt-BR" sz="2800" spc="-1" strike="noStrike">
+              <a:latin typeface="Arial"/>
+            </a:endParaRPr>
+          </a:p>
+        </p:txBody>
+      </p:sp>
+      <p:sp>
+        <p:nvSpPr>
+          <p:cNvPr id="130" name="TextShape 5"/>
+          <p:cNvSpPr txBox="1"/>
+          <p:nvPr/>
+        </p:nvSpPr>
+        <p:spPr>
+          <a:xfrm>
+            <a:off x="432000" y="2520000"/>
+            <a:ext cx="6624000" cy="2394000"/>
+          </a:xfrm>
+          <a:prstGeom prst="rect">
+            <a:avLst/>
+          </a:prstGeom>
+          <a:noFill/>
+          <a:ln>
+            <a:noFill/>
+          </a:ln>
+        </p:spPr>
+        <p:txBody>
+          <a:bodyPr lIns="90000" rIns="90000" tIns="45000" bIns="45000">
+            <a:noAutofit/>
+          </a:bodyPr>
+          <a:p>
+            <a:r>
+              <a:rPr b="0" lang="pt-BR" sz="1800" spc="-1" strike="noStrike">
+                <a:latin typeface="Arial"/>
+              </a:rPr>
+              <a:t>Parte 1 - </a:t>
+            </a:r>
+            <a:r>
+              <a:rPr b="0" lang="pt-BR" sz="1800" spc="-1" strike="noStrike">
+                <a:latin typeface="Arial"/>
+                <a:hlinkClick r:id="rId1"/>
+              </a:rPr>
+              <a:t>https://www.youtube.com/watch?v=LoC8igz9V4s</a:t>
+            </a:r>
+            <a:endParaRPr b="0" lang="pt-BR" sz="1800" spc="-1" strike="noStrike">
+              <a:latin typeface="Arial"/>
+            </a:endParaRPr>
+          </a:p>
+          <a:p>
+            <a:endParaRPr b="0" lang="pt-BR" sz="1800" spc="-1" strike="noStrike">
+              <a:latin typeface="Arial"/>
+            </a:endParaRPr>
+          </a:p>
+          <a:p>
+            <a:r>
+              <a:rPr b="0" lang="pt-BR" sz="1800" spc="-1" strike="noStrike">
+                <a:latin typeface="Arial"/>
+              </a:rPr>
+              <a:t>Parte 2 - </a:t>
+            </a:r>
+            <a:r>
+              <a:rPr b="0" lang="pt-BR" sz="1800" spc="-1" strike="noStrike">
+                <a:latin typeface="Arial"/>
+                <a:hlinkClick r:id="rId2"/>
+              </a:rPr>
+              <a:t>https://www.youtube.com/watch?v=P7K7ErxjQHM</a:t>
+            </a:r>
+            <a:endParaRPr b="0" lang="pt-BR" sz="1800" spc="-1" strike="noStrike">
+              <a:latin typeface="Arial"/>
+            </a:endParaRPr>
+          </a:p>
+          <a:p>
+            <a:endParaRPr b="0" lang="pt-BR" sz="1800" spc="-1" strike="noStrike">
+              <a:latin typeface="Arial"/>
+            </a:endParaRPr>
+          </a:p>
+          <a:p>
+            <a:r>
+              <a:rPr b="0" lang="pt-BR" sz="1800" spc="-1" strike="noStrike">
+                <a:latin typeface="Arial"/>
+              </a:rPr>
+              <a:t>Parte 3 - </a:t>
+            </a:r>
+            <a:r>
+              <a:rPr b="0" lang="pt-BR" sz="1800" spc="-1" strike="noStrike">
+                <a:latin typeface="Arial"/>
+                <a:hlinkClick r:id="rId3"/>
+              </a:rPr>
+              <a:t>https://www.youtube.com/watch?v=gi21hSRmZI0</a:t>
+            </a:r>
+            <a:endParaRPr b="0" lang="pt-BR" sz="1800" spc="-1" strike="noStrike">
+              <a:latin typeface="Arial"/>
+            </a:endParaRPr>
+          </a:p>
+          <a:p>
+            <a:endParaRPr b="0" lang="pt-BR" sz="1800" spc="-1" strike="noStrike">
+              <a:latin typeface="Arial"/>
+            </a:endParaRPr>
+          </a:p>
+        </p:txBody>
+      </p:sp>
+    </p:spTree>
+  </p:cSld>
+  <mc:AlternateContent>
+    <mc:Choice Requires="p14">
+      <p:transition spd="slow" p14:dur="2000"/>
+    </mc:Choice>
+    <mc:Fallback>
+      <p:transition spd="slow"/>
+    </mc:Fallback>
+  </mc:AlternateContent>
+</p:sld>
+</file>
+
+<file path=ppt/slides/slide13.xml><?xml version="1.0" encoding="utf-8"?>
+<p:sld xmlns:a="http://schemas.openxmlformats.org/drawingml/2006/main" xmlns:p="http://schemas.openxmlformats.org/presentationml/2006/main" xmlns:r="http://schemas.openxmlformats.org/officeDocument/2006/relationships" xmlns:p14="http://schemas.microsoft.com/office/powerpoint/2010/main" xmlns:p15="http://schemas.microsoft.com/office/powerpoint/2012/main" xmlns:mc="http://schemas.openxmlformats.org/markup-compatibility/2006">
+  <p:cSld>
+    <p:spTree>
+      <p:nvGrpSpPr>
+        <p:cNvPr id="1" name=""/>
+        <p:cNvGrpSpPr/>
+        <p:nvPr/>
+      </p:nvGrpSpPr>
+      <p:grpSpPr>
+        <a:xfrm>
+          <a:off x="0" y="0"/>
+          <a:ext cx="0" cy="0"/>
+          <a:chOff x="0" y="0"/>
+          <a:chExt cx="0" cy="0"/>
+        </a:xfrm>
+      </p:grpSpPr>
+      <p:sp>
+        <p:nvSpPr>
+          <p:cNvPr id="131" name="TextShape 1"/>
+          <p:cNvSpPr txBox="1"/>
+          <p:nvPr/>
+        </p:nvSpPr>
+        <p:spPr>
+          <a:xfrm>
+            <a:off x="3642120" y="3240000"/>
+            <a:ext cx="3269880" cy="1858320"/>
+          </a:xfrm>
+          <a:prstGeom prst="rect">
+            <a:avLst/>
+          </a:prstGeom>
+          <a:noFill/>
+          <a:ln>
+            <a:noFill/>
+          </a:ln>
+        </p:spPr>
+        <p:txBody>
+          <a:bodyPr lIns="90000" rIns="90000" tIns="45000" bIns="45000">
+            <a:noAutofit/>
+          </a:bodyPr>
+          <a:p>
+            <a:r>
+              <a:rPr b="0" lang="pt-BR" sz="1800" spc="-1" strike="noStrike">
+                <a:latin typeface="Arial"/>
+              </a:rPr>
+              <a:t>Obrigada!</a:t>
+            </a:r>
+            <a:endParaRPr b="0" lang="pt-BR" sz="1800" spc="-1" strike="noStrike">
               <a:latin typeface="Arial"/>
             </a:endParaRPr>
           </a:p>

</xml_diff>

<commit_message>
ajustes solicitados no .doc e apresentação
</commit_message>
<xml_diff>
--- a/docs_tcc/apresentacao_projeto_arquitetural_TCC.pptx
+++ b/docs_tcc/apresentacao_projeto_arquitetural_TCC.pptx
@@ -19,6 +19,13 @@
     <p:sldId id="266" r:id="rId14"/>
     <p:sldId id="267" r:id="rId15"/>
     <p:sldId id="268" r:id="rId16"/>
+    <p:sldId id="269" r:id="rId17"/>
+    <p:sldId id="270" r:id="rId18"/>
+    <p:sldId id="271" r:id="rId19"/>
+    <p:sldId id="272" r:id="rId20"/>
+    <p:sldId id="273" r:id="rId21"/>
+    <p:sldId id="274" r:id="rId22"/>
+    <p:sldId id="275" r:id="rId23"/>
   </p:sldIdLst>
   <p:sldSz cx="9144000" cy="6858000"/>
   <p:notesSz cx="7559675" cy="10691812"/>
@@ -3289,7 +3296,7 @@
         <p:spPr>
           <a:xfrm>
             <a:off x="0" y="4599000"/>
-            <a:ext cx="9143280" cy="470880"/>
+            <a:ext cx="9142920" cy="470520"/>
           </a:xfrm>
           <a:prstGeom prst="rect">
             <a:avLst/>
@@ -3340,7 +3347,7 @@
         <p:spPr>
           <a:xfrm>
             <a:off x="997560" y="1805040"/>
-            <a:ext cx="7065000" cy="2588040"/>
+            <a:ext cx="7064640" cy="2587680"/>
           </a:xfrm>
           <a:prstGeom prst="roundRect">
             <a:avLst>
@@ -3362,7 +3369,7 @@
             <a:noFill/>
           </a:ln>
           <a:effectLst>
-            <a:outerShdw algn="ctr" blurRad="57785" dir="3187806" dist="32400">
+            <a:outerShdw algn="ctr" blurRad="57785" dir="3164682" dist="32112">
               <a:srgbClr val="000000">
                 <a:alpha val="30000"/>
               </a:srgbClr>
@@ -3459,7 +3466,7 @@
         <p:spPr>
           <a:xfrm>
             <a:off x="0" y="1001880"/>
-            <a:ext cx="9143280" cy="664560"/>
+            <a:ext cx="9142920" cy="664200"/>
           </a:xfrm>
           <a:prstGeom prst="rect">
             <a:avLst/>
@@ -3503,7 +3510,7 @@
         <p:spPr>
           <a:xfrm>
             <a:off x="206280" y="1100160"/>
-            <a:ext cx="8735400" cy="470880"/>
+            <a:ext cx="8735040" cy="470520"/>
           </a:xfrm>
           <a:prstGeom prst="rect">
             <a:avLst/>
@@ -3537,7 +3544,17 @@
                 <a:latin typeface="Calibri"/>
                 <a:ea typeface="Calibri"/>
               </a:rPr>
-              <a:t>Avaliação da Arquitetura</a:t>
+              <a:t> </a:t>
+            </a:r>
+            <a:r>
+              <a:rPr b="1" lang="pt-BR" sz="2500" spc="-1" strike="noStrike">
+                <a:solidFill>
+                  <a:srgbClr val="000000"/>
+                </a:solidFill>
+                <a:latin typeface="Calibri"/>
+                <a:ea typeface="Calibri"/>
+              </a:rPr>
+              <a:t>Cenários de avaliação</a:t>
             </a:r>
             <a:endParaRPr b="0" lang="pt-BR" sz="2500" spc="-1" strike="noStrike">
               <a:latin typeface="Arial"/>
@@ -3554,7 +3571,7 @@
         <p:spPr>
           <a:xfrm>
             <a:off x="179280" y="1770120"/>
-            <a:ext cx="8827200" cy="4118760"/>
+            <a:ext cx="8826840" cy="4118400"/>
           </a:xfrm>
           <a:prstGeom prst="rect">
             <a:avLst/>
@@ -3643,7 +3660,7 @@
         <p:spPr>
           <a:xfrm>
             <a:off x="228600" y="461880"/>
-            <a:ext cx="8825760" cy="445680"/>
+            <a:ext cx="8825400" cy="445320"/>
           </a:xfrm>
           <a:prstGeom prst="rect">
             <a:avLst/>
@@ -3698,7 +3715,7 @@
         <p:spPr>
           <a:xfrm>
             <a:off x="1512000" y="1872000"/>
-            <a:ext cx="5979600" cy="3944160"/>
+            <a:ext cx="5979240" cy="3943800"/>
           </a:xfrm>
           <a:prstGeom prst="rect">
             <a:avLst/>
@@ -3747,7 +3764,7 @@
         <p:spPr>
           <a:xfrm>
             <a:off x="0" y="1001880"/>
-            <a:ext cx="9143280" cy="664560"/>
+            <a:ext cx="9142920" cy="664200"/>
           </a:xfrm>
           <a:prstGeom prst="rect">
             <a:avLst/>
@@ -3791,7 +3808,7 @@
         <p:spPr>
           <a:xfrm>
             <a:off x="206280" y="1100160"/>
-            <a:ext cx="8735400" cy="470880"/>
+            <a:ext cx="8735040" cy="470520"/>
           </a:xfrm>
           <a:prstGeom prst="rect">
             <a:avLst/>
@@ -3812,11 +3829,6 @@
             <a:spAutoFit/>
           </a:bodyPr>
           <a:p>
-            <a:pPr>
-              <a:lnSpc>
-                <a:spcPct val="100000"/>
-              </a:lnSpc>
-            </a:pPr>
             <a:r>
               <a:rPr b="1" lang="pt-BR" sz="2500" spc="-1" strike="noStrike">
                 <a:solidFill>
@@ -3825,7 +3837,27 @@
                 <a:latin typeface="Calibri"/>
                 <a:ea typeface="Calibri"/>
               </a:rPr>
-              <a:t>Conclusões</a:t>
+              <a:t> </a:t>
+            </a:r>
+            <a:r>
+              <a:rPr b="1" lang="pt-BR" sz="2500" spc="-1" strike="noStrike">
+                <a:solidFill>
+                  <a:srgbClr val="000000"/>
+                </a:solidFill>
+                <a:latin typeface="Calibri"/>
+                <a:ea typeface="Calibri"/>
+              </a:rPr>
+              <a:t>A</a:t>
+            </a:r>
+            <a:r>
+              <a:rPr b="1" lang="pt-BR" sz="2500" spc="-1" strike="noStrike">
+                <a:solidFill>
+                  <a:srgbClr val="000000"/>
+                </a:solidFill>
+                <a:latin typeface="Calibri"/>
+                <a:ea typeface="Calibri"/>
+              </a:rPr>
+              <a:t>valiação da Arquitetura</a:t>
             </a:r>
             <a:endParaRPr b="0" lang="pt-BR" sz="2500" spc="-1" strike="noStrike">
               <a:latin typeface="Arial"/>
@@ -3842,7 +3874,7 @@
         <p:spPr>
           <a:xfrm>
             <a:off x="179280" y="1770120"/>
-            <a:ext cx="8827200" cy="4118760"/>
+            <a:ext cx="8826840" cy="4118400"/>
           </a:xfrm>
           <a:prstGeom prst="rect">
             <a:avLst/>
@@ -3863,10 +3895,32 @@
             <a:noAutofit/>
           </a:bodyPr>
           <a:p>
-            <a:pPr algn="just">
-              <a:lnSpc>
-                <a:spcPct val="150000"/>
-              </a:lnSpc>
+            <a:pPr>
+              <a:lnSpc>
+                <a:spcPts val="2801"/>
+              </a:lnSpc>
+              <a:spcBef>
+                <a:spcPts val="400"/>
+              </a:spcBef>
+              <a:spcAft>
+                <a:spcPts val="400"/>
+              </a:spcAft>
+            </a:pPr>
+            <a:endParaRPr b="0" lang="pt-BR" sz="1800" spc="-1" strike="noStrike">
+              <a:latin typeface="Arial"/>
+            </a:endParaRPr>
+          </a:p>
+          <a:p>
+            <a:pPr>
+              <a:lnSpc>
+                <a:spcPts val="2401"/>
+              </a:lnSpc>
+              <a:spcBef>
+                <a:spcPts val="400"/>
+              </a:spcBef>
+              <a:spcAft>
+                <a:spcPts val="1199"/>
+              </a:spcAft>
             </a:pPr>
             <a:r>
               <a:rPr b="1" lang="pt-BR" sz="2000" spc="-1" strike="noStrike">
@@ -3876,48 +3930,24 @@
                 <a:latin typeface="Calibri"/>
                 <a:ea typeface="DejaVu Sans"/>
               </a:rPr>
-              <a:t>Toda lógica de coreografia e orquestração está centrada no roteamento dos tipos de mensagem nos tópicos. Ao receber esta mensagem, a lambda realiza a tarefa e dispara nova mensagem para o tópico que torna a rotear a mensagem e num novo agente (lambda) entra em ação.</a:t>
+              <a:t> </a:t>
             </a:r>
             <a:endParaRPr b="0" lang="pt-BR" sz="2000" spc="-1" strike="noStrike">
               <a:latin typeface="Arial"/>
             </a:endParaRPr>
           </a:p>
           <a:p>
-            <a:pPr algn="just">
-              <a:lnSpc>
-                <a:spcPct val="150000"/>
-              </a:lnSpc>
-            </a:pPr>
-            <a:r>
-              <a:rPr b="1" lang="pt-BR" sz="2000" spc="-1" strike="noStrike">
-                <a:solidFill>
-                  <a:srgbClr val="404040"/>
-                </a:solidFill>
-                <a:latin typeface="Calibri"/>
-                <a:ea typeface="DejaVu Sans"/>
-              </a:rPr>
-              <a:t>Fazendo com que seja possível uma transação de longa duração com integridade da informação e prevenção da consistência eventual dos dados.</a:t>
-            </a:r>
-            <a:endParaRPr b="0" lang="pt-BR" sz="2000" spc="-1" strike="noStrike">
-              <a:latin typeface="Arial"/>
-            </a:endParaRPr>
-          </a:p>
-          <a:p>
-            <a:pPr algn="just">
-              <a:lnSpc>
-                <a:spcPct val="150000"/>
-              </a:lnSpc>
-            </a:pPr>
-            <a:r>
-              <a:rPr b="1" lang="pt-BR" sz="2000" spc="-1" strike="noStrike">
-                <a:solidFill>
-                  <a:srgbClr val="404040"/>
-                </a:solidFill>
-                <a:latin typeface="Calibri"/>
-                <a:ea typeface="DejaVu Sans"/>
-              </a:rPr>
-              <a:t>Os pontos fortes desta arquitetura estão na descentralização dos serviços, alta disponibilidade, escalabilidade automática e segurança nas transações de longa duração, bem como na infraestrutura de cloud pública.</a:t>
-            </a:r>
+            <a:pPr>
+              <a:lnSpc>
+                <a:spcPts val="2401"/>
+              </a:lnSpc>
+              <a:spcBef>
+                <a:spcPts val="400"/>
+              </a:spcBef>
+              <a:spcAft>
+                <a:spcPts val="1199"/>
+              </a:spcAft>
+            </a:pPr>
             <a:endParaRPr b="0" lang="pt-BR" sz="2000" spc="-1" strike="noStrike">
               <a:latin typeface="Arial"/>
             </a:endParaRPr>
@@ -3933,7 +3963,7 @@
         <p:spPr>
           <a:xfrm>
             <a:off x="228600" y="461880"/>
-            <a:ext cx="8825760" cy="445680"/>
+            <a:ext cx="8825400" cy="445320"/>
           </a:xfrm>
           <a:prstGeom prst="rect">
             <a:avLst/>
@@ -3970,6 +4000,136 @@
               <a:t>Descarte de Embalagens e Produtos de Agrotóxicos</a:t>
             </a:r>
             <a:endParaRPr b="0" lang="pt-BR" sz="2800" spc="-1" strike="noStrike">
+              <a:latin typeface="Arial"/>
+            </a:endParaRPr>
+          </a:p>
+        </p:txBody>
+      </p:sp>
+      <p:sp>
+        <p:nvSpPr>
+          <p:cNvPr id="126" name="TextShape 5"/>
+          <p:cNvSpPr txBox="1"/>
+          <p:nvPr/>
+        </p:nvSpPr>
+        <p:spPr>
+          <a:xfrm>
+            <a:off x="6408000" y="2041920"/>
+            <a:ext cx="2520000" cy="3790080"/>
+          </a:xfrm>
+          <a:prstGeom prst="rect">
+            <a:avLst/>
+          </a:prstGeom>
+          <a:noFill/>
+          <a:ln>
+            <a:noFill/>
+          </a:ln>
+        </p:spPr>
+        <p:txBody>
+          <a:bodyPr lIns="90000" rIns="90000" tIns="45000" bIns="45000">
+            <a:noAutofit/>
+          </a:bodyPr>
+          <a:p>
+            <a:pPr algn="just">
+              <a:lnSpc>
+                <a:spcPct val="150000"/>
+              </a:lnSpc>
+            </a:pPr>
+            <a:endParaRPr b="0" lang="pt-BR" sz="1800" spc="-1" strike="noStrike">
+              <a:latin typeface="Arial"/>
+            </a:endParaRPr>
+          </a:p>
+          <a:p>
+            <a:pPr algn="just">
+              <a:lnSpc>
+                <a:spcPct val="150000"/>
+              </a:lnSpc>
+            </a:pPr>
+            <a:endParaRPr b="0" lang="pt-BR" sz="1800" spc="-1" strike="noStrike">
+              <a:latin typeface="Arial"/>
+            </a:endParaRPr>
+          </a:p>
+          <a:p>
+            <a:pPr algn="just">
+              <a:lnSpc>
+                <a:spcPct val="150000"/>
+              </a:lnSpc>
+            </a:pPr>
+            <a:endParaRPr b="0" lang="pt-BR" sz="1800" spc="-1" strike="noStrike">
+              <a:latin typeface="Arial"/>
+            </a:endParaRPr>
+          </a:p>
+          <a:p>
+            <a:pPr algn="just">
+              <a:lnSpc>
+                <a:spcPct val="150000"/>
+              </a:lnSpc>
+            </a:pPr>
+            <a:r>
+              <a:rPr b="0" i="1" lang="pt-BR" sz="1400" spc="-1" strike="noStrike">
+                <a:latin typeface="Arial"/>
+              </a:rPr>
+              <a:t>O Uso de Lambdas (serverless) facilita a manutenção, dada a sua natureza de tratar apenas de um contexto por vez. Sendo assim, é um código especializado que tem um objetivo claro e de fácil manutenção.</a:t>
+            </a:r>
+            <a:endParaRPr b="0" lang="pt-BR" sz="1400" spc="-1" strike="noStrike">
+              <a:latin typeface="Arial"/>
+            </a:endParaRPr>
+          </a:p>
+        </p:txBody>
+      </p:sp>
+      <p:pic>
+        <p:nvPicPr>
+          <p:cNvPr id="127" name="" descr=""/>
+          <p:cNvPicPr/>
+          <p:nvPr/>
+        </p:nvPicPr>
+        <p:blipFill>
+          <a:blip r:embed="rId1"/>
+          <a:stretch/>
+        </p:blipFill>
+        <p:spPr>
+          <a:xfrm>
+            <a:off x="216000" y="2376000"/>
+            <a:ext cx="6047280" cy="3591360"/>
+          </a:xfrm>
+          <a:prstGeom prst="rect">
+            <a:avLst/>
+          </a:prstGeom>
+          <a:ln>
+            <a:noFill/>
+          </a:ln>
+        </p:spPr>
+      </p:pic>
+      <p:sp>
+        <p:nvSpPr>
+          <p:cNvPr id="128" name="TextShape 6"/>
+          <p:cNvSpPr txBox="1"/>
+          <p:nvPr/>
+        </p:nvSpPr>
+        <p:spPr>
+          <a:xfrm>
+            <a:off x="288000" y="1813320"/>
+            <a:ext cx="6413760" cy="346680"/>
+          </a:xfrm>
+          <a:prstGeom prst="rect">
+            <a:avLst/>
+          </a:prstGeom>
+          <a:noFill/>
+          <a:ln>
+            <a:noFill/>
+          </a:ln>
+        </p:spPr>
+        <p:txBody>
+          <a:bodyPr lIns="90000" rIns="90000" tIns="45000" bIns="45000">
+            <a:noAutofit/>
+          </a:bodyPr>
+          <a:p>
+            <a:r>
+              <a:rPr b="1" lang="pt-BR" sz="1800" spc="-1" strike="noStrike">
+                <a:latin typeface="Arial"/>
+              </a:rPr>
+              <a:t>RNF5 - O sistema deve apresentar manutenção facilitada </a:t>
+            </a:r>
+            <a:endParaRPr b="0" lang="pt-BR" sz="1800" spc="-1" strike="noStrike">
               <a:latin typeface="Arial"/>
             </a:endParaRPr>
           </a:p>
@@ -4007,14 +4167,14 @@
       </p:grpSpPr>
       <p:sp>
         <p:nvSpPr>
-          <p:cNvPr id="126" name="CustomShape 1"/>
+          <p:cNvPr id="129" name="CustomShape 1"/>
           <p:cNvSpPr/>
           <p:nvPr/>
         </p:nvSpPr>
         <p:spPr>
           <a:xfrm>
             <a:off x="0" y="1001880"/>
-            <a:ext cx="9143280" cy="664560"/>
+            <a:ext cx="9142920" cy="664200"/>
           </a:xfrm>
           <a:prstGeom prst="rect">
             <a:avLst/>
@@ -4051,14 +4211,14 @@
       </p:sp>
       <p:sp>
         <p:nvSpPr>
-          <p:cNvPr id="127" name="CustomShape 2"/>
+          <p:cNvPr id="130" name="CustomShape 2"/>
           <p:cNvSpPr/>
           <p:nvPr/>
         </p:nvSpPr>
         <p:spPr>
           <a:xfrm>
             <a:off x="206280" y="1100160"/>
-            <a:ext cx="8735400" cy="470880"/>
+            <a:ext cx="8735040" cy="470520"/>
           </a:xfrm>
           <a:prstGeom prst="rect">
             <a:avLst/>
@@ -4079,11 +4239,6 @@
             <a:spAutoFit/>
           </a:bodyPr>
           <a:p>
-            <a:pPr>
-              <a:lnSpc>
-                <a:spcPct val="100000"/>
-              </a:lnSpc>
-            </a:pPr>
             <a:r>
               <a:rPr b="1" lang="pt-BR" sz="2500" spc="-1" strike="noStrike">
                 <a:solidFill>
@@ -4092,7 +4247,27 @@
                 <a:latin typeface="Calibri"/>
                 <a:ea typeface="Calibri"/>
               </a:rPr>
-              <a:t>Implementação</a:t>
+              <a:t> </a:t>
+            </a:r>
+            <a:r>
+              <a:rPr b="1" lang="pt-BR" sz="2500" spc="-1" strike="noStrike">
+                <a:solidFill>
+                  <a:srgbClr val="000000"/>
+                </a:solidFill>
+                <a:latin typeface="Calibri"/>
+                <a:ea typeface="Calibri"/>
+              </a:rPr>
+              <a:t>A</a:t>
+            </a:r>
+            <a:r>
+              <a:rPr b="1" lang="pt-BR" sz="2500" spc="-1" strike="noStrike">
+                <a:solidFill>
+                  <a:srgbClr val="000000"/>
+                </a:solidFill>
+                <a:latin typeface="Calibri"/>
+                <a:ea typeface="Calibri"/>
+              </a:rPr>
+              <a:t>valiação da Arquitetura</a:t>
             </a:r>
             <a:endParaRPr b="0" lang="pt-BR" sz="2500" spc="-1" strike="noStrike">
               <a:latin typeface="Arial"/>
@@ -4102,14 +4277,14 @@
       </p:sp>
       <p:sp>
         <p:nvSpPr>
-          <p:cNvPr id="128" name="CustomShape 3"/>
+          <p:cNvPr id="131" name="CustomShape 3"/>
           <p:cNvSpPr/>
           <p:nvPr/>
         </p:nvSpPr>
         <p:spPr>
           <a:xfrm>
             <a:off x="179280" y="1770120"/>
-            <a:ext cx="8827200" cy="4118760"/>
+            <a:ext cx="8826840" cy="4118400"/>
           </a:xfrm>
           <a:prstGeom prst="rect">
             <a:avLst/>
@@ -4125,17 +4300,80 @@
           <a:effectRef idx="0"/>
           <a:fontRef idx="minor"/>
         </p:style>
-      </p:sp>
-      <p:sp>
-        <p:nvSpPr>
-          <p:cNvPr id="129" name="CustomShape 4"/>
+        <p:txBody>
+          <a:bodyPr lIns="90000" rIns="90000" tIns="45000" bIns="45000">
+            <a:noAutofit/>
+          </a:bodyPr>
+          <a:p>
+            <a:pPr>
+              <a:lnSpc>
+                <a:spcPts val="2801"/>
+              </a:lnSpc>
+              <a:spcBef>
+                <a:spcPts val="400"/>
+              </a:spcBef>
+              <a:spcAft>
+                <a:spcPts val="400"/>
+              </a:spcAft>
+            </a:pPr>
+            <a:endParaRPr b="0" lang="pt-BR" sz="1800" spc="-1" strike="noStrike">
+              <a:latin typeface="Arial"/>
+            </a:endParaRPr>
+          </a:p>
+          <a:p>
+            <a:pPr>
+              <a:lnSpc>
+                <a:spcPts val="2401"/>
+              </a:lnSpc>
+              <a:spcBef>
+                <a:spcPts val="400"/>
+              </a:spcBef>
+              <a:spcAft>
+                <a:spcPts val="1199"/>
+              </a:spcAft>
+            </a:pPr>
+            <a:r>
+              <a:rPr b="1" lang="pt-BR" sz="2000" spc="-1" strike="noStrike">
+                <a:solidFill>
+                  <a:srgbClr val="404040"/>
+                </a:solidFill>
+                <a:latin typeface="Calibri"/>
+                <a:ea typeface="DejaVu Sans"/>
+              </a:rPr>
+              <a:t> </a:t>
+            </a:r>
+            <a:endParaRPr b="0" lang="pt-BR" sz="2000" spc="-1" strike="noStrike">
+              <a:latin typeface="Arial"/>
+            </a:endParaRPr>
+          </a:p>
+          <a:p>
+            <a:pPr>
+              <a:lnSpc>
+                <a:spcPts val="2401"/>
+              </a:lnSpc>
+              <a:spcBef>
+                <a:spcPts val="400"/>
+              </a:spcBef>
+              <a:spcAft>
+                <a:spcPts val="1199"/>
+              </a:spcAft>
+            </a:pPr>
+            <a:endParaRPr b="0" lang="pt-BR" sz="2000" spc="-1" strike="noStrike">
+              <a:latin typeface="Arial"/>
+            </a:endParaRPr>
+          </a:p>
+        </p:txBody>
+      </p:sp>
+      <p:sp>
+        <p:nvSpPr>
+          <p:cNvPr id="132" name="CustomShape 4"/>
           <p:cNvSpPr/>
           <p:nvPr/>
         </p:nvSpPr>
         <p:spPr>
           <a:xfrm>
             <a:off x="228600" y="461880"/>
-            <a:ext cx="8825760" cy="445680"/>
+            <a:ext cx="8825400" cy="445320"/>
           </a:xfrm>
           <a:prstGeom prst="rect">
             <a:avLst/>
@@ -4179,14 +4417,14 @@
       </p:sp>
       <p:sp>
         <p:nvSpPr>
-          <p:cNvPr id="130" name="TextShape 5"/>
+          <p:cNvPr id="133" name="TextShape 5"/>
           <p:cNvSpPr txBox="1"/>
           <p:nvPr/>
         </p:nvSpPr>
         <p:spPr>
           <a:xfrm>
-            <a:off x="432000" y="2520000"/>
-            <a:ext cx="6624000" cy="2394000"/>
+            <a:off x="6408000" y="2041920"/>
+            <a:ext cx="2520000" cy="2950200"/>
           </a:xfrm>
           <a:prstGeom prst="rect">
             <a:avLst/>
@@ -4201,76 +4439,119 @@
             <a:noAutofit/>
           </a:bodyPr>
           <a:p>
-            <a:r>
-              <a:rPr b="0" lang="pt-BR" sz="1800" spc="-1" strike="noStrike">
+            <a:pPr algn="just">
+              <a:lnSpc>
+                <a:spcPct val="150000"/>
+              </a:lnSpc>
+            </a:pPr>
+            <a:endParaRPr b="0" lang="pt-BR" sz="1800" spc="-1" strike="noStrike">
+              <a:latin typeface="Arial"/>
+            </a:endParaRPr>
+          </a:p>
+          <a:p>
+            <a:pPr algn="just">
+              <a:lnSpc>
+                <a:spcPct val="150000"/>
+              </a:lnSpc>
+            </a:pPr>
+            <a:endParaRPr b="0" lang="pt-BR" sz="1800" spc="-1" strike="noStrike">
+              <a:latin typeface="Arial"/>
+            </a:endParaRPr>
+          </a:p>
+          <a:p>
+            <a:pPr algn="just">
+              <a:lnSpc>
+                <a:spcPct val="150000"/>
+              </a:lnSpc>
+            </a:pPr>
+            <a:endParaRPr b="0" lang="pt-BR" sz="1800" spc="-1" strike="noStrike">
+              <a:latin typeface="Arial"/>
+            </a:endParaRPr>
+          </a:p>
+          <a:p>
+            <a:pPr>
+              <a:lnSpc>
+                <a:spcPct val="150000"/>
+              </a:lnSpc>
+            </a:pPr>
+            <a:r>
+              <a:rPr b="0" i="1" lang="pt-BR" sz="1400" spc="-1" strike="noStrike">
                 <a:latin typeface="Arial"/>
-              </a:rPr>
-              <a:t>Parte 1 - </a:t>
-            </a:r>
-            <a:r>
-              <a:rPr b="0" lang="pt-BR" sz="1800" spc="-1" strike="noStrike">
+                <a:ea typeface="Microsoft YaHei"/>
+              </a:rPr>
+              <a:t>Ao lado um print da monitoração da SagaApiLambda com resposta em média de 2s por requisição;</a:t>
+            </a:r>
+            <a:endParaRPr b="0" lang="pt-BR" sz="1400" spc="-1" strike="noStrike">
+              <a:latin typeface="Arial"/>
+            </a:endParaRPr>
+          </a:p>
+        </p:txBody>
+      </p:sp>
+      <p:sp>
+        <p:nvSpPr>
+          <p:cNvPr id="134" name="TextShape 6"/>
+          <p:cNvSpPr txBox="1"/>
+          <p:nvPr/>
+        </p:nvSpPr>
+        <p:spPr>
+          <a:xfrm>
+            <a:off x="216000" y="1813320"/>
+            <a:ext cx="7776000" cy="857880"/>
+          </a:xfrm>
+          <a:prstGeom prst="rect">
+            <a:avLst/>
+          </a:prstGeom>
+          <a:noFill/>
+          <a:ln>
+            <a:noFill/>
+          </a:ln>
+        </p:spPr>
+        <p:txBody>
+          <a:bodyPr lIns="90000" rIns="90000" tIns="45000" bIns="45000">
+            <a:noAutofit/>
+          </a:bodyPr>
+          <a:p>
+            <a:pPr>
+              <a:lnSpc>
+                <a:spcPct val="150000"/>
+              </a:lnSpc>
+            </a:pPr>
+            <a:r>
+              <a:rPr b="1" lang="pt-BR" sz="1800" spc="-1" strike="noStrike">
                 <a:latin typeface="Arial"/>
-                <a:hlinkClick r:id="rId1"/>
-              </a:rPr>
-              <a:t>https://www.youtube.com/watch?v=LoC8igz9V4s</a:t>
+                <a:ea typeface="Microsoft YaHei"/>
+              </a:rPr>
+              <a:t>RNF4 - O sistema deve ser rápido – microsserviços e mensageria</a:t>
             </a:r>
             <a:endParaRPr b="0" lang="pt-BR" sz="1800" spc="-1" strike="noStrike">
               <a:latin typeface="Arial"/>
             </a:endParaRPr>
           </a:p>
-          <a:p>
-            <a:endParaRPr b="0" lang="pt-BR" sz="1800" spc="-1" strike="noStrike">
-              <a:latin typeface="Arial"/>
-            </a:endParaRPr>
-          </a:p>
-          <a:p>
-            <a:r>
-              <a:rPr b="0" lang="pt-BR" sz="1800" spc="-1" strike="noStrike">
-                <a:latin typeface="Arial"/>
-              </a:rPr>
-              <a:t>Parte 2 - </a:t>
-            </a:r>
-            <a:r>
-              <a:rPr b="0" lang="pt-BR" sz="1800" spc="-1" strike="noStrike">
-                <a:latin typeface="Arial"/>
-                <a:hlinkClick r:id="rId2"/>
-              </a:rPr>
-              <a:t>https://www.youtube.com/watch?v=P7K7ErxjQHM</a:t>
-            </a:r>
-            <a:endParaRPr b="0" lang="pt-BR" sz="1800" spc="-1" strike="noStrike">
-              <a:latin typeface="Arial"/>
-            </a:endParaRPr>
-          </a:p>
-          <a:p>
-            <a:endParaRPr b="0" lang="pt-BR" sz="1800" spc="-1" strike="noStrike">
-              <a:latin typeface="Arial"/>
-            </a:endParaRPr>
-          </a:p>
-          <a:p>
-            <a:r>
-              <a:rPr b="0" lang="pt-BR" sz="1800" spc="-1" strike="noStrike">
-                <a:latin typeface="Arial"/>
-              </a:rPr>
-              <a:t>Parte 3 - </a:t>
-            </a:r>
-            <a:r>
-              <a:rPr b="0" lang="pt-BR" sz="1800" spc="-1" strike="noStrike">
-                <a:latin typeface="Arial"/>
-                <a:hlinkClick r:id="rId3"/>
-              </a:rPr>
-              <a:t>https://www.youtube.com/watch?v=gi21hSRmZI0</a:t>
-            </a:r>
-            <a:endParaRPr b="0" lang="pt-BR" sz="1800" spc="-1" strike="noStrike">
-              <a:latin typeface="Arial"/>
-            </a:endParaRPr>
-          </a:p>
-          <a:p>
-            <a:endParaRPr b="0" lang="pt-BR" sz="1800" spc="-1" strike="noStrike">
-              <a:latin typeface="Arial"/>
-            </a:endParaRPr>
-          </a:p>
-        </p:txBody>
-      </p:sp>
+        </p:txBody>
+      </p:sp>
+      <p:pic>
+        <p:nvPicPr>
+          <p:cNvPr id="135" name="" descr=""/>
+          <p:cNvPicPr/>
+          <p:nvPr/>
+        </p:nvPicPr>
+        <p:blipFill>
+          <a:blip r:embed="rId1"/>
+          <a:stretch/>
+        </p:blipFill>
+        <p:spPr>
+          <a:xfrm>
+            <a:off x="238320" y="2470680"/>
+            <a:ext cx="6097680" cy="3217320"/>
+          </a:xfrm>
+          <a:prstGeom prst="rect">
+            <a:avLst/>
+          </a:prstGeom>
+          <a:ln>
+            <a:noFill/>
+          </a:ln>
+        </p:spPr>
+      </p:pic>
     </p:spTree>
   </p:cSld>
   <mc:AlternateContent>
@@ -4303,14 +4584,58 @@
       </p:grpSpPr>
       <p:sp>
         <p:nvSpPr>
-          <p:cNvPr id="131" name="TextShape 1"/>
-          <p:cNvSpPr txBox="1"/>
+          <p:cNvPr id="136" name="CustomShape 1"/>
+          <p:cNvSpPr/>
           <p:nvPr/>
         </p:nvSpPr>
         <p:spPr>
           <a:xfrm>
-            <a:off x="3642120" y="3240000"/>
-            <a:ext cx="3269880" cy="1858320"/>
+            <a:off x="0" y="1001880"/>
+            <a:ext cx="9142920" cy="664200"/>
+          </a:xfrm>
+          <a:prstGeom prst="rect">
+            <a:avLst/>
+          </a:prstGeom>
+          <a:gradFill rotWithShape="0">
+            <a:gsLst>
+              <a:gs pos="0">
+                <a:srgbClr val="95b8bb"/>
+              </a:gs>
+              <a:gs pos="100000">
+                <a:srgbClr val="5d8d91"/>
+              </a:gs>
+            </a:gsLst>
+            <a:lin ang="16200000"/>
+          </a:gradFill>
+          <a:ln>
+            <a:noFill/>
+          </a:ln>
+        </p:spPr>
+        <p:style>
+          <a:lnRef idx="2">
+            <a:schemeClr val="accent1">
+              <a:shade val="50000"/>
+            </a:schemeClr>
+          </a:lnRef>
+          <a:fillRef idx="1">
+            <a:schemeClr val="accent1"/>
+          </a:fillRef>
+          <a:effectRef idx="0">
+            <a:schemeClr val="accent1"/>
+          </a:effectRef>
+          <a:fontRef idx="minor"/>
+        </p:style>
+      </p:sp>
+      <p:sp>
+        <p:nvSpPr>
+          <p:cNvPr id="137" name="CustomShape 2"/>
+          <p:cNvSpPr/>
+          <p:nvPr/>
+        </p:nvSpPr>
+        <p:spPr>
+          <a:xfrm>
+            <a:off x="206280" y="1100160"/>
+            <a:ext cx="8735040" cy="470520"/>
           </a:xfrm>
           <a:prstGeom prst="rect">
             <a:avLst/>
@@ -4320,17 +4645,2318 @@
             <a:noFill/>
           </a:ln>
         </p:spPr>
+        <p:style>
+          <a:lnRef idx="0"/>
+          <a:fillRef idx="0"/>
+          <a:effectRef idx="0"/>
+          <a:fontRef idx="minor"/>
+        </p:style>
+        <p:txBody>
+          <a:bodyPr lIns="90000" rIns="90000" tIns="45000" bIns="45000">
+            <a:spAutoFit/>
+          </a:bodyPr>
+          <a:p>
+            <a:r>
+              <a:rPr b="1" lang="pt-BR" sz="2500" spc="-1" strike="noStrike">
+                <a:solidFill>
+                  <a:srgbClr val="000000"/>
+                </a:solidFill>
+                <a:latin typeface="Calibri"/>
+                <a:ea typeface="Calibri"/>
+              </a:rPr>
+              <a:t> </a:t>
+            </a:r>
+            <a:r>
+              <a:rPr b="1" lang="pt-BR" sz="2500" spc="-1" strike="noStrike">
+                <a:solidFill>
+                  <a:srgbClr val="000000"/>
+                </a:solidFill>
+                <a:latin typeface="Calibri"/>
+                <a:ea typeface="Calibri"/>
+              </a:rPr>
+              <a:t>A</a:t>
+            </a:r>
+            <a:r>
+              <a:rPr b="1" lang="pt-BR" sz="2500" spc="-1" strike="noStrike">
+                <a:solidFill>
+                  <a:srgbClr val="000000"/>
+                </a:solidFill>
+                <a:latin typeface="Calibri"/>
+                <a:ea typeface="Calibri"/>
+              </a:rPr>
+              <a:t>valiação da Arquitetura</a:t>
+            </a:r>
+            <a:endParaRPr b="0" lang="pt-BR" sz="2500" spc="-1" strike="noStrike">
+              <a:latin typeface="Arial"/>
+            </a:endParaRPr>
+          </a:p>
+        </p:txBody>
+      </p:sp>
+      <p:sp>
+        <p:nvSpPr>
+          <p:cNvPr id="138" name="CustomShape 3"/>
+          <p:cNvSpPr/>
+          <p:nvPr/>
+        </p:nvSpPr>
+        <p:spPr>
+          <a:xfrm>
+            <a:off x="179280" y="1770120"/>
+            <a:ext cx="8826840" cy="4118400"/>
+          </a:xfrm>
+          <a:prstGeom prst="rect">
+            <a:avLst/>
+          </a:prstGeom>
+          <a:noFill/>
+          <a:ln>
+            <a:noFill/>
+          </a:ln>
+        </p:spPr>
+        <p:style>
+          <a:lnRef idx="0"/>
+          <a:fillRef idx="0"/>
+          <a:effectRef idx="0"/>
+          <a:fontRef idx="minor"/>
+        </p:style>
         <p:txBody>
           <a:bodyPr lIns="90000" rIns="90000" tIns="45000" bIns="45000">
             <a:noAutofit/>
           </a:bodyPr>
           <a:p>
+            <a:pPr>
+              <a:lnSpc>
+                <a:spcPts val="2801"/>
+              </a:lnSpc>
+              <a:spcBef>
+                <a:spcPts val="400"/>
+              </a:spcBef>
+              <a:spcAft>
+                <a:spcPts val="400"/>
+              </a:spcAft>
+            </a:pPr>
+            <a:endParaRPr b="0" lang="pt-BR" sz="1800" spc="-1" strike="noStrike">
+              <a:latin typeface="Arial"/>
+            </a:endParaRPr>
+          </a:p>
+          <a:p>
+            <a:pPr>
+              <a:lnSpc>
+                <a:spcPts val="2401"/>
+              </a:lnSpc>
+              <a:spcBef>
+                <a:spcPts val="400"/>
+              </a:spcBef>
+              <a:spcAft>
+                <a:spcPts val="1199"/>
+              </a:spcAft>
+            </a:pPr>
+            <a:r>
+              <a:rPr b="1" lang="pt-BR" sz="2000" spc="-1" strike="noStrike">
+                <a:solidFill>
+                  <a:srgbClr val="404040"/>
+                </a:solidFill>
+                <a:latin typeface="Calibri"/>
+                <a:ea typeface="DejaVu Sans"/>
+              </a:rPr>
+              <a:t> </a:t>
+            </a:r>
+            <a:endParaRPr b="0" lang="pt-BR" sz="2000" spc="-1" strike="noStrike">
+              <a:latin typeface="Arial"/>
+            </a:endParaRPr>
+          </a:p>
+          <a:p>
+            <a:pPr>
+              <a:lnSpc>
+                <a:spcPts val="2401"/>
+              </a:lnSpc>
+              <a:spcBef>
+                <a:spcPts val="400"/>
+              </a:spcBef>
+              <a:spcAft>
+                <a:spcPts val="1199"/>
+              </a:spcAft>
+            </a:pPr>
+            <a:endParaRPr b="0" lang="pt-BR" sz="2000" spc="-1" strike="noStrike">
+              <a:latin typeface="Arial"/>
+            </a:endParaRPr>
+          </a:p>
+        </p:txBody>
+      </p:sp>
+      <p:sp>
+        <p:nvSpPr>
+          <p:cNvPr id="139" name="CustomShape 4"/>
+          <p:cNvSpPr/>
+          <p:nvPr/>
+        </p:nvSpPr>
+        <p:spPr>
+          <a:xfrm>
+            <a:off x="228600" y="461880"/>
+            <a:ext cx="8825400" cy="445320"/>
+          </a:xfrm>
+          <a:prstGeom prst="rect">
+            <a:avLst/>
+          </a:prstGeom>
+          <a:noFill/>
+          <a:ln>
+            <a:noFill/>
+          </a:ln>
+        </p:spPr>
+        <p:style>
+          <a:lnRef idx="0"/>
+          <a:fillRef idx="0"/>
+          <a:effectRef idx="0"/>
+          <a:fontRef idx="minor"/>
+        </p:style>
+        <p:txBody>
+          <a:bodyPr lIns="90000" rIns="90000" tIns="45000" bIns="45000">
+            <a:spAutoFit/>
+          </a:bodyPr>
+          <a:p>
+            <a:pPr>
+              <a:lnSpc>
+                <a:spcPts val="2801"/>
+              </a:lnSpc>
+            </a:pPr>
+            <a:r>
+              <a:rPr b="1" lang="pt-BR" sz="2800" spc="-1" strike="noStrike">
+                <a:solidFill>
+                  <a:srgbClr val="000000"/>
+                </a:solidFill>
+                <a:latin typeface="Calibri"/>
+                <a:ea typeface="Calibri"/>
+              </a:rPr>
+              <a:t>Descarte de Embalagens e Produtos de Agrotóxicos</a:t>
+            </a:r>
+            <a:endParaRPr b="0" lang="pt-BR" sz="2800" spc="-1" strike="noStrike">
+              <a:latin typeface="Arial"/>
+            </a:endParaRPr>
+          </a:p>
+        </p:txBody>
+      </p:sp>
+      <p:sp>
+        <p:nvSpPr>
+          <p:cNvPr id="140" name="TextShape 5"/>
+          <p:cNvSpPr txBox="1"/>
+          <p:nvPr/>
+        </p:nvSpPr>
+        <p:spPr>
+          <a:xfrm>
+            <a:off x="6408000" y="2448000"/>
+            <a:ext cx="2520000" cy="3240000"/>
+          </a:xfrm>
+          <a:prstGeom prst="rect">
+            <a:avLst/>
+          </a:prstGeom>
+          <a:noFill/>
+          <a:ln>
+            <a:noFill/>
+          </a:ln>
+        </p:spPr>
+        <p:txBody>
+          <a:bodyPr lIns="90000" rIns="90000" tIns="45000" bIns="45000">
+            <a:noAutofit/>
+          </a:bodyPr>
+          <a:p>
+            <a:pPr algn="just">
+              <a:lnSpc>
+                <a:spcPct val="150000"/>
+              </a:lnSpc>
+            </a:pPr>
+            <a:endParaRPr b="0" lang="pt-BR" sz="1800" spc="-1" strike="noStrike">
+              <a:latin typeface="Arial"/>
+            </a:endParaRPr>
+          </a:p>
+          <a:p>
+            <a:pPr algn="just">
+              <a:lnSpc>
+                <a:spcPct val="150000"/>
+              </a:lnSpc>
+            </a:pPr>
+            <a:endParaRPr b="0" lang="pt-BR" sz="1800" spc="-1" strike="noStrike">
+              <a:latin typeface="Arial"/>
+            </a:endParaRPr>
+          </a:p>
+          <a:p>
+            <a:pPr algn="just">
+              <a:lnSpc>
+                <a:spcPct val="150000"/>
+              </a:lnSpc>
+            </a:pPr>
+            <a:endParaRPr b="0" lang="pt-BR" sz="1800" spc="-1" strike="noStrike">
+              <a:latin typeface="Arial"/>
+            </a:endParaRPr>
+          </a:p>
+          <a:p>
+            <a:pPr>
+              <a:lnSpc>
+                <a:spcPct val="150000"/>
+              </a:lnSpc>
+            </a:pPr>
+            <a:r>
+              <a:rPr b="0" i="1" lang="pt-BR" sz="1400" spc="-1" strike="noStrike">
+                <a:latin typeface="Arial"/>
+                <a:ea typeface="Microsoft YaHei"/>
+              </a:rPr>
+              <a:t>Por utilizar as Lambdas, a cloud pública AWS oferece um painel para teste individual de cada Lambda, facilitando os testes. Além do código de teste unitário presente no repositório</a:t>
+            </a:r>
+            <a:endParaRPr b="0" lang="pt-BR" sz="1400" spc="-1" strike="noStrike">
+              <a:latin typeface="Arial"/>
+            </a:endParaRPr>
+          </a:p>
+        </p:txBody>
+      </p:sp>
+      <p:sp>
+        <p:nvSpPr>
+          <p:cNvPr id="141" name="TextShape 6"/>
+          <p:cNvSpPr txBox="1"/>
+          <p:nvPr/>
+        </p:nvSpPr>
+        <p:spPr>
+          <a:xfrm>
+            <a:off x="216000" y="1813320"/>
+            <a:ext cx="7776000" cy="857880"/>
+          </a:xfrm>
+          <a:prstGeom prst="rect">
+            <a:avLst/>
+          </a:prstGeom>
+          <a:noFill/>
+          <a:ln>
+            <a:noFill/>
+          </a:ln>
+        </p:spPr>
+        <p:txBody>
+          <a:bodyPr lIns="90000" rIns="90000" tIns="45000" bIns="45000">
+            <a:noAutofit/>
+          </a:bodyPr>
+          <a:p>
+            <a:pPr>
+              <a:lnSpc>
+                <a:spcPct val="150000"/>
+              </a:lnSpc>
+            </a:pPr>
+            <a:r>
+              <a:rPr b="1" lang="pt-BR" sz="1800" spc="-1" strike="noStrike">
+                <a:latin typeface="Arial"/>
+                <a:ea typeface="Microsoft YaHei"/>
+              </a:rPr>
+              <a:t>RNF6 - O sistema deve ser simples para testar - uso de Lambdas</a:t>
+            </a:r>
+            <a:endParaRPr b="0" lang="pt-BR" sz="1800" spc="-1" strike="noStrike">
+              <a:latin typeface="Arial"/>
+            </a:endParaRPr>
+          </a:p>
+        </p:txBody>
+      </p:sp>
+      <p:pic>
+        <p:nvPicPr>
+          <p:cNvPr id="142" name="" descr=""/>
+          <p:cNvPicPr/>
+          <p:nvPr/>
+        </p:nvPicPr>
+        <p:blipFill>
+          <a:blip r:embed="rId1"/>
+          <a:stretch/>
+        </p:blipFill>
+        <p:spPr>
+          <a:xfrm>
+            <a:off x="72000" y="2376000"/>
+            <a:ext cx="6286320" cy="3476880"/>
+          </a:xfrm>
+          <a:prstGeom prst="rect">
+            <a:avLst/>
+          </a:prstGeom>
+          <a:ln>
+            <a:noFill/>
+          </a:ln>
+        </p:spPr>
+      </p:pic>
+    </p:spTree>
+  </p:cSld>
+  <mc:AlternateContent>
+    <mc:Choice Requires="p14">
+      <p:transition spd="slow" p14:dur="2000"/>
+    </mc:Choice>
+    <mc:Fallback>
+      <p:transition spd="slow"/>
+    </mc:Fallback>
+  </mc:AlternateContent>
+</p:sld>
+</file>
+
+<file path=ppt/slides/slide14.xml><?xml version="1.0" encoding="utf-8"?>
+<p:sld xmlns:a="http://schemas.openxmlformats.org/drawingml/2006/main" xmlns:p="http://schemas.openxmlformats.org/presentationml/2006/main" xmlns:r="http://schemas.openxmlformats.org/officeDocument/2006/relationships" xmlns:p14="http://schemas.microsoft.com/office/powerpoint/2010/main" xmlns:p15="http://schemas.microsoft.com/office/powerpoint/2012/main" xmlns:mc="http://schemas.openxmlformats.org/markup-compatibility/2006">
+  <p:cSld>
+    <p:spTree>
+      <p:nvGrpSpPr>
+        <p:cNvPr id="1" name=""/>
+        <p:cNvGrpSpPr/>
+        <p:nvPr/>
+      </p:nvGrpSpPr>
+      <p:grpSpPr>
+        <a:xfrm>
+          <a:off x="0" y="0"/>
+          <a:ext cx="0" cy="0"/>
+          <a:chOff x="0" y="0"/>
+          <a:chExt cx="0" cy="0"/>
+        </a:xfrm>
+      </p:grpSpPr>
+      <p:sp>
+        <p:nvSpPr>
+          <p:cNvPr id="143" name="CustomShape 1"/>
+          <p:cNvSpPr/>
+          <p:nvPr/>
+        </p:nvSpPr>
+        <p:spPr>
+          <a:xfrm>
+            <a:off x="0" y="1001880"/>
+            <a:ext cx="9142920" cy="664200"/>
+          </a:xfrm>
+          <a:prstGeom prst="rect">
+            <a:avLst/>
+          </a:prstGeom>
+          <a:gradFill rotWithShape="0">
+            <a:gsLst>
+              <a:gs pos="0">
+                <a:srgbClr val="95b8bb"/>
+              </a:gs>
+              <a:gs pos="100000">
+                <a:srgbClr val="5d8d91"/>
+              </a:gs>
+            </a:gsLst>
+            <a:lin ang="16200000"/>
+          </a:gradFill>
+          <a:ln>
+            <a:noFill/>
+          </a:ln>
+        </p:spPr>
+        <p:style>
+          <a:lnRef idx="2">
+            <a:schemeClr val="accent1">
+              <a:shade val="50000"/>
+            </a:schemeClr>
+          </a:lnRef>
+          <a:fillRef idx="1">
+            <a:schemeClr val="accent1"/>
+          </a:fillRef>
+          <a:effectRef idx="0">
+            <a:schemeClr val="accent1"/>
+          </a:effectRef>
+          <a:fontRef idx="minor"/>
+        </p:style>
+      </p:sp>
+      <p:sp>
+        <p:nvSpPr>
+          <p:cNvPr id="144" name="CustomShape 2"/>
+          <p:cNvSpPr/>
+          <p:nvPr/>
+        </p:nvSpPr>
+        <p:spPr>
+          <a:xfrm>
+            <a:off x="206280" y="1100160"/>
+            <a:ext cx="8735040" cy="470520"/>
+          </a:xfrm>
+          <a:prstGeom prst="rect">
+            <a:avLst/>
+          </a:prstGeom>
+          <a:noFill/>
+          <a:ln>
+            <a:noFill/>
+          </a:ln>
+        </p:spPr>
+        <p:style>
+          <a:lnRef idx="0"/>
+          <a:fillRef idx="0"/>
+          <a:effectRef idx="0"/>
+          <a:fontRef idx="minor"/>
+        </p:style>
+        <p:txBody>
+          <a:bodyPr lIns="90000" rIns="90000" tIns="45000" bIns="45000">
+            <a:spAutoFit/>
+          </a:bodyPr>
+          <a:p>
+            <a:r>
+              <a:rPr b="1" lang="pt-BR" sz="2500" spc="-1" strike="noStrike">
+                <a:solidFill>
+                  <a:srgbClr val="000000"/>
+                </a:solidFill>
+                <a:latin typeface="Calibri"/>
+                <a:ea typeface="Calibri"/>
+              </a:rPr>
+              <a:t> </a:t>
+            </a:r>
+            <a:r>
+              <a:rPr b="1" lang="pt-BR" sz="2500" spc="-1" strike="noStrike">
+                <a:solidFill>
+                  <a:srgbClr val="000000"/>
+                </a:solidFill>
+                <a:latin typeface="Calibri"/>
+                <a:ea typeface="Calibri"/>
+              </a:rPr>
+              <a:t>A</a:t>
+            </a:r>
+            <a:r>
+              <a:rPr b="1" lang="pt-BR" sz="2500" spc="-1" strike="noStrike">
+                <a:solidFill>
+                  <a:srgbClr val="000000"/>
+                </a:solidFill>
+                <a:latin typeface="Calibri"/>
+                <a:ea typeface="Calibri"/>
+              </a:rPr>
+              <a:t>valiação da Arquitetura</a:t>
+            </a:r>
+            <a:endParaRPr b="0" lang="pt-BR" sz="2500" spc="-1" strike="noStrike">
+              <a:latin typeface="Arial"/>
+            </a:endParaRPr>
+          </a:p>
+        </p:txBody>
+      </p:sp>
+      <p:sp>
+        <p:nvSpPr>
+          <p:cNvPr id="145" name="CustomShape 3"/>
+          <p:cNvSpPr/>
+          <p:nvPr/>
+        </p:nvSpPr>
+        <p:spPr>
+          <a:xfrm>
+            <a:off x="179280" y="1770120"/>
+            <a:ext cx="8826840" cy="4118400"/>
+          </a:xfrm>
+          <a:prstGeom prst="rect">
+            <a:avLst/>
+          </a:prstGeom>
+          <a:noFill/>
+          <a:ln>
+            <a:noFill/>
+          </a:ln>
+        </p:spPr>
+        <p:style>
+          <a:lnRef idx="0"/>
+          <a:fillRef idx="0"/>
+          <a:effectRef idx="0"/>
+          <a:fontRef idx="minor"/>
+        </p:style>
+        <p:txBody>
+          <a:bodyPr lIns="90000" rIns="90000" tIns="45000" bIns="45000">
+            <a:noAutofit/>
+          </a:bodyPr>
+          <a:p>
+            <a:pPr>
+              <a:lnSpc>
+                <a:spcPts val="2801"/>
+              </a:lnSpc>
+              <a:spcBef>
+                <a:spcPts val="400"/>
+              </a:spcBef>
+              <a:spcAft>
+                <a:spcPts val="400"/>
+              </a:spcAft>
+            </a:pPr>
+            <a:endParaRPr b="0" lang="pt-BR" sz="1800" spc="-1" strike="noStrike">
+              <a:latin typeface="Arial"/>
+            </a:endParaRPr>
+          </a:p>
+          <a:p>
+            <a:pPr>
+              <a:lnSpc>
+                <a:spcPts val="2401"/>
+              </a:lnSpc>
+              <a:spcBef>
+                <a:spcPts val="400"/>
+              </a:spcBef>
+              <a:spcAft>
+                <a:spcPts val="1199"/>
+              </a:spcAft>
+            </a:pPr>
+            <a:r>
+              <a:rPr b="1" lang="pt-BR" sz="2000" spc="-1" strike="noStrike">
+                <a:solidFill>
+                  <a:srgbClr val="404040"/>
+                </a:solidFill>
+                <a:latin typeface="Calibri"/>
+                <a:ea typeface="DejaVu Sans"/>
+              </a:rPr>
+              <a:t> </a:t>
+            </a:r>
+            <a:endParaRPr b="0" lang="pt-BR" sz="2000" spc="-1" strike="noStrike">
+              <a:latin typeface="Arial"/>
+            </a:endParaRPr>
+          </a:p>
+          <a:p>
+            <a:pPr>
+              <a:lnSpc>
+                <a:spcPts val="2401"/>
+              </a:lnSpc>
+              <a:spcBef>
+                <a:spcPts val="400"/>
+              </a:spcBef>
+              <a:spcAft>
+                <a:spcPts val="1199"/>
+              </a:spcAft>
+            </a:pPr>
+            <a:endParaRPr b="0" lang="pt-BR" sz="2000" spc="-1" strike="noStrike">
+              <a:latin typeface="Arial"/>
+            </a:endParaRPr>
+          </a:p>
+        </p:txBody>
+      </p:sp>
+      <p:sp>
+        <p:nvSpPr>
+          <p:cNvPr id="146" name="CustomShape 4"/>
+          <p:cNvSpPr/>
+          <p:nvPr/>
+        </p:nvSpPr>
+        <p:spPr>
+          <a:xfrm>
+            <a:off x="228600" y="461880"/>
+            <a:ext cx="8825400" cy="445320"/>
+          </a:xfrm>
+          <a:prstGeom prst="rect">
+            <a:avLst/>
+          </a:prstGeom>
+          <a:noFill/>
+          <a:ln>
+            <a:noFill/>
+          </a:ln>
+        </p:spPr>
+        <p:style>
+          <a:lnRef idx="0"/>
+          <a:fillRef idx="0"/>
+          <a:effectRef idx="0"/>
+          <a:fontRef idx="minor"/>
+        </p:style>
+        <p:txBody>
+          <a:bodyPr lIns="90000" rIns="90000" tIns="45000" bIns="45000">
+            <a:spAutoFit/>
+          </a:bodyPr>
+          <a:p>
+            <a:pPr>
+              <a:lnSpc>
+                <a:spcPts val="2801"/>
+              </a:lnSpc>
+            </a:pPr>
+            <a:r>
+              <a:rPr b="1" lang="pt-BR" sz="2800" spc="-1" strike="noStrike">
+                <a:solidFill>
+                  <a:srgbClr val="000000"/>
+                </a:solidFill>
+                <a:latin typeface="Calibri"/>
+                <a:ea typeface="Calibri"/>
+              </a:rPr>
+              <a:t>Descarte de Embalagens e Produtos de Agrotóxicos</a:t>
+            </a:r>
+            <a:endParaRPr b="0" lang="pt-BR" sz="2800" spc="-1" strike="noStrike">
+              <a:latin typeface="Arial"/>
+            </a:endParaRPr>
+          </a:p>
+        </p:txBody>
+      </p:sp>
+      <p:sp>
+        <p:nvSpPr>
+          <p:cNvPr id="147" name="TextShape 5"/>
+          <p:cNvSpPr txBox="1"/>
+          <p:nvPr/>
+        </p:nvSpPr>
+        <p:spPr>
+          <a:xfrm>
+            <a:off x="6408000" y="2448000"/>
+            <a:ext cx="2520000" cy="3658680"/>
+          </a:xfrm>
+          <a:prstGeom prst="rect">
+            <a:avLst/>
+          </a:prstGeom>
+          <a:noFill/>
+          <a:ln>
+            <a:noFill/>
+          </a:ln>
+        </p:spPr>
+        <p:txBody>
+          <a:bodyPr lIns="90000" rIns="90000" tIns="45000" bIns="45000">
+            <a:noAutofit/>
+          </a:bodyPr>
+          <a:p>
+            <a:pPr>
+              <a:lnSpc>
+                <a:spcPct val="150000"/>
+              </a:lnSpc>
+            </a:pPr>
+            <a:r>
+              <a:rPr b="0" i="1" lang="pt-BR" sz="1400" spc="-1" strike="noStrike">
+                <a:latin typeface="Arial"/>
+                <a:ea typeface="Microsoft YaHei"/>
+              </a:rPr>
+              <a:t>Alta disponibilidade - o Lambda executa sua função em várias zonas de disponibilidade para garantir que esteja disponível para processar eventos em caso de interrupção do serviço em uma única zona. </a:t>
+            </a:r>
+            <a:endParaRPr b="0" lang="pt-BR" sz="1400" spc="-1" strike="noStrike">
+              <a:latin typeface="Arial"/>
+            </a:endParaRPr>
+          </a:p>
+          <a:p>
+            <a:pPr>
+              <a:lnSpc>
+                <a:spcPct val="150000"/>
+              </a:lnSpc>
+            </a:pPr>
+            <a:r>
+              <a:rPr b="0" i="1" lang="pt-BR" sz="1400" spc="-1" strike="noStrike">
+                <a:latin typeface="Arial"/>
+                <a:ea typeface="Microsoft YaHei"/>
+              </a:rPr>
+              <a:t>O lado um exemplo de implantação de duas Api’s em diferentes Zonas de Disponibilidade.</a:t>
+            </a:r>
+            <a:endParaRPr b="0" lang="pt-BR" sz="1400" spc="-1" strike="noStrike">
+              <a:latin typeface="Arial"/>
+            </a:endParaRPr>
+          </a:p>
+        </p:txBody>
+      </p:sp>
+      <p:sp>
+        <p:nvSpPr>
+          <p:cNvPr id="148" name="TextShape 6"/>
+          <p:cNvSpPr txBox="1"/>
+          <p:nvPr/>
+        </p:nvSpPr>
+        <p:spPr>
+          <a:xfrm>
+            <a:off x="179280" y="1666080"/>
+            <a:ext cx="8826840" cy="857880"/>
+          </a:xfrm>
+          <a:prstGeom prst="rect">
+            <a:avLst/>
+          </a:prstGeom>
+          <a:noFill/>
+          <a:ln>
+            <a:noFill/>
+          </a:ln>
+        </p:spPr>
+        <p:txBody>
+          <a:bodyPr lIns="90000" rIns="90000" tIns="45000" bIns="45000">
+            <a:noAutofit/>
+          </a:bodyPr>
+          <a:p>
+            <a:pPr>
+              <a:lnSpc>
+                <a:spcPct val="150000"/>
+              </a:lnSpc>
+            </a:pPr>
+            <a:r>
+              <a:rPr b="1" lang="pt-BR" sz="1800" spc="-1" strike="noStrike">
+                <a:latin typeface="Arial"/>
+                <a:ea typeface="Microsoft YaHei"/>
+              </a:rPr>
+              <a:t>RNF8 - O sistema deve operar em qualquer período do dia e da noite – </a:t>
+            </a:r>
+            <a:r>
+              <a:rPr b="1" lang="pt-BR" sz="1800" spc="-1" strike="noStrike">
+                <a:latin typeface="Arial"/>
+                <a:ea typeface="Microsoft YaHei"/>
+              </a:rPr>
+              <a:t>auto</a:t>
+            </a:r>
+            <a:r>
+              <a:rPr b="1" lang="pt-BR" sz="1800" spc="-1" strike="noStrike">
+                <a:latin typeface="Arial"/>
+                <a:ea typeface="Microsoft YaHei"/>
+              </a:rPr>
+              <a:t> escalabilidade da cloud Pública no uso de Lambdas</a:t>
+            </a:r>
+            <a:endParaRPr b="0" lang="pt-BR" sz="1800" spc="-1" strike="noStrike">
+              <a:latin typeface="Arial"/>
+            </a:endParaRPr>
+          </a:p>
+        </p:txBody>
+      </p:sp>
+      <p:pic>
+        <p:nvPicPr>
+          <p:cNvPr id="149" name="" descr=""/>
+          <p:cNvPicPr/>
+          <p:nvPr/>
+        </p:nvPicPr>
+        <p:blipFill>
+          <a:blip r:embed="rId1"/>
+          <a:stretch/>
+        </p:blipFill>
+        <p:spPr>
+          <a:xfrm>
+            <a:off x="144000" y="2523960"/>
+            <a:ext cx="6156720" cy="3459960"/>
+          </a:xfrm>
+          <a:prstGeom prst="rect">
+            <a:avLst/>
+          </a:prstGeom>
+          <a:ln>
+            <a:noFill/>
+          </a:ln>
+        </p:spPr>
+      </p:pic>
+    </p:spTree>
+  </p:cSld>
+  <mc:AlternateContent>
+    <mc:Choice Requires="p14">
+      <p:transition spd="slow" p14:dur="2000"/>
+    </mc:Choice>
+    <mc:Fallback>
+      <p:transition spd="slow"/>
+    </mc:Fallback>
+  </mc:AlternateContent>
+</p:sld>
+</file>
+
+<file path=ppt/slides/slide15.xml><?xml version="1.0" encoding="utf-8"?>
+<p:sld xmlns:a="http://schemas.openxmlformats.org/drawingml/2006/main" xmlns:p="http://schemas.openxmlformats.org/presentationml/2006/main" xmlns:r="http://schemas.openxmlformats.org/officeDocument/2006/relationships" xmlns:p14="http://schemas.microsoft.com/office/powerpoint/2010/main" xmlns:p15="http://schemas.microsoft.com/office/powerpoint/2012/main" xmlns:mc="http://schemas.openxmlformats.org/markup-compatibility/2006">
+  <p:cSld>
+    <p:spTree>
+      <p:nvGrpSpPr>
+        <p:cNvPr id="1" name=""/>
+        <p:cNvGrpSpPr/>
+        <p:nvPr/>
+      </p:nvGrpSpPr>
+      <p:grpSpPr>
+        <a:xfrm>
+          <a:off x="0" y="0"/>
+          <a:ext cx="0" cy="0"/>
+          <a:chOff x="0" y="0"/>
+          <a:chExt cx="0" cy="0"/>
+        </a:xfrm>
+      </p:grpSpPr>
+      <p:sp>
+        <p:nvSpPr>
+          <p:cNvPr id="150" name="CustomShape 1"/>
+          <p:cNvSpPr/>
+          <p:nvPr/>
+        </p:nvSpPr>
+        <p:spPr>
+          <a:xfrm>
+            <a:off x="0" y="1001880"/>
+            <a:ext cx="9142920" cy="664200"/>
+          </a:xfrm>
+          <a:prstGeom prst="rect">
+            <a:avLst/>
+          </a:prstGeom>
+          <a:gradFill rotWithShape="0">
+            <a:gsLst>
+              <a:gs pos="0">
+                <a:srgbClr val="95b8bb"/>
+              </a:gs>
+              <a:gs pos="100000">
+                <a:srgbClr val="5d8d91"/>
+              </a:gs>
+            </a:gsLst>
+            <a:lin ang="16200000"/>
+          </a:gradFill>
+          <a:ln>
+            <a:noFill/>
+          </a:ln>
+        </p:spPr>
+        <p:style>
+          <a:lnRef idx="2">
+            <a:schemeClr val="accent1">
+              <a:shade val="50000"/>
+            </a:schemeClr>
+          </a:lnRef>
+          <a:fillRef idx="1">
+            <a:schemeClr val="accent1"/>
+          </a:fillRef>
+          <a:effectRef idx="0">
+            <a:schemeClr val="accent1"/>
+          </a:effectRef>
+          <a:fontRef idx="minor"/>
+        </p:style>
+      </p:sp>
+      <p:sp>
+        <p:nvSpPr>
+          <p:cNvPr id="151" name="CustomShape 2"/>
+          <p:cNvSpPr/>
+          <p:nvPr/>
+        </p:nvSpPr>
+        <p:spPr>
+          <a:xfrm>
+            <a:off x="206280" y="1100160"/>
+            <a:ext cx="8735040" cy="470520"/>
+          </a:xfrm>
+          <a:prstGeom prst="rect">
+            <a:avLst/>
+          </a:prstGeom>
+          <a:noFill/>
+          <a:ln>
+            <a:noFill/>
+          </a:ln>
+        </p:spPr>
+        <p:style>
+          <a:lnRef idx="0"/>
+          <a:fillRef idx="0"/>
+          <a:effectRef idx="0"/>
+          <a:fontRef idx="minor"/>
+        </p:style>
+        <p:txBody>
+          <a:bodyPr lIns="90000" rIns="90000" tIns="45000" bIns="45000">
+            <a:spAutoFit/>
+          </a:bodyPr>
+          <a:p>
+            <a:r>
+              <a:rPr b="1" lang="pt-BR" sz="2500" spc="-1" strike="noStrike">
+                <a:solidFill>
+                  <a:srgbClr val="000000"/>
+                </a:solidFill>
+                <a:latin typeface="Calibri"/>
+                <a:ea typeface="Calibri"/>
+              </a:rPr>
+              <a:t> </a:t>
+            </a:r>
+            <a:r>
+              <a:rPr b="1" lang="pt-BR" sz="2500" spc="-1" strike="noStrike">
+                <a:solidFill>
+                  <a:srgbClr val="000000"/>
+                </a:solidFill>
+                <a:latin typeface="Calibri"/>
+                <a:ea typeface="Calibri"/>
+              </a:rPr>
+              <a:t>A</a:t>
+            </a:r>
+            <a:r>
+              <a:rPr b="1" lang="pt-BR" sz="2500" spc="-1" strike="noStrike">
+                <a:solidFill>
+                  <a:srgbClr val="000000"/>
+                </a:solidFill>
+                <a:latin typeface="Calibri"/>
+                <a:ea typeface="Calibri"/>
+              </a:rPr>
+              <a:t>valiação da Arquitetura</a:t>
+            </a:r>
+            <a:endParaRPr b="0" lang="pt-BR" sz="2500" spc="-1" strike="noStrike">
+              <a:latin typeface="Arial"/>
+            </a:endParaRPr>
+          </a:p>
+        </p:txBody>
+      </p:sp>
+      <p:sp>
+        <p:nvSpPr>
+          <p:cNvPr id="152" name="CustomShape 3"/>
+          <p:cNvSpPr/>
+          <p:nvPr/>
+        </p:nvSpPr>
+        <p:spPr>
+          <a:xfrm>
+            <a:off x="179280" y="1770120"/>
+            <a:ext cx="8826840" cy="4118400"/>
+          </a:xfrm>
+          <a:prstGeom prst="rect">
+            <a:avLst/>
+          </a:prstGeom>
+          <a:noFill/>
+          <a:ln>
+            <a:noFill/>
+          </a:ln>
+        </p:spPr>
+        <p:style>
+          <a:lnRef idx="0"/>
+          <a:fillRef idx="0"/>
+          <a:effectRef idx="0"/>
+          <a:fontRef idx="minor"/>
+        </p:style>
+        <p:txBody>
+          <a:bodyPr lIns="90000" rIns="90000" tIns="45000" bIns="45000">
+            <a:noAutofit/>
+          </a:bodyPr>
+          <a:p>
+            <a:pPr>
+              <a:lnSpc>
+                <a:spcPts val="2801"/>
+              </a:lnSpc>
+              <a:spcBef>
+                <a:spcPts val="400"/>
+              </a:spcBef>
+              <a:spcAft>
+                <a:spcPts val="400"/>
+              </a:spcAft>
+            </a:pPr>
+            <a:endParaRPr b="0" lang="pt-BR" sz="1800" spc="-1" strike="noStrike">
+              <a:latin typeface="Arial"/>
+            </a:endParaRPr>
+          </a:p>
+          <a:p>
+            <a:pPr>
+              <a:lnSpc>
+                <a:spcPts val="2401"/>
+              </a:lnSpc>
+              <a:spcBef>
+                <a:spcPts val="400"/>
+              </a:spcBef>
+              <a:spcAft>
+                <a:spcPts val="1199"/>
+              </a:spcAft>
+            </a:pPr>
+            <a:r>
+              <a:rPr b="1" lang="pt-BR" sz="2000" spc="-1" strike="noStrike">
+                <a:solidFill>
+                  <a:srgbClr val="404040"/>
+                </a:solidFill>
+                <a:latin typeface="Calibri"/>
+                <a:ea typeface="DejaVu Sans"/>
+              </a:rPr>
+              <a:t> </a:t>
+            </a:r>
+            <a:endParaRPr b="0" lang="pt-BR" sz="2000" spc="-1" strike="noStrike">
+              <a:latin typeface="Arial"/>
+            </a:endParaRPr>
+          </a:p>
+          <a:p>
+            <a:pPr>
+              <a:lnSpc>
+                <a:spcPts val="2401"/>
+              </a:lnSpc>
+              <a:spcBef>
+                <a:spcPts val="400"/>
+              </a:spcBef>
+              <a:spcAft>
+                <a:spcPts val="1199"/>
+              </a:spcAft>
+            </a:pPr>
+            <a:endParaRPr b="0" lang="pt-BR" sz="2000" spc="-1" strike="noStrike">
+              <a:latin typeface="Arial"/>
+            </a:endParaRPr>
+          </a:p>
+        </p:txBody>
+      </p:sp>
+      <p:sp>
+        <p:nvSpPr>
+          <p:cNvPr id="153" name="CustomShape 4"/>
+          <p:cNvSpPr/>
+          <p:nvPr/>
+        </p:nvSpPr>
+        <p:spPr>
+          <a:xfrm>
+            <a:off x="228600" y="461880"/>
+            <a:ext cx="8825400" cy="445320"/>
+          </a:xfrm>
+          <a:prstGeom prst="rect">
+            <a:avLst/>
+          </a:prstGeom>
+          <a:noFill/>
+          <a:ln>
+            <a:noFill/>
+          </a:ln>
+        </p:spPr>
+        <p:style>
+          <a:lnRef idx="0"/>
+          <a:fillRef idx="0"/>
+          <a:effectRef idx="0"/>
+          <a:fontRef idx="minor"/>
+        </p:style>
+        <p:txBody>
+          <a:bodyPr lIns="90000" rIns="90000" tIns="45000" bIns="45000">
+            <a:spAutoFit/>
+          </a:bodyPr>
+          <a:p>
+            <a:pPr>
+              <a:lnSpc>
+                <a:spcPts val="2801"/>
+              </a:lnSpc>
+            </a:pPr>
+            <a:r>
+              <a:rPr b="1" lang="pt-BR" sz="2800" spc="-1" strike="noStrike">
+                <a:solidFill>
+                  <a:srgbClr val="000000"/>
+                </a:solidFill>
+                <a:latin typeface="Calibri"/>
+                <a:ea typeface="Calibri"/>
+              </a:rPr>
+              <a:t>Descarte de Embalagens e Produtos de Agrotóxicos</a:t>
+            </a:r>
+            <a:endParaRPr b="0" lang="pt-BR" sz="2800" spc="-1" strike="noStrike">
+              <a:latin typeface="Arial"/>
+            </a:endParaRPr>
+          </a:p>
+        </p:txBody>
+      </p:sp>
+      <p:sp>
+        <p:nvSpPr>
+          <p:cNvPr id="154" name="TextShape 5"/>
+          <p:cNvSpPr txBox="1"/>
+          <p:nvPr/>
+        </p:nvSpPr>
+        <p:spPr>
+          <a:xfrm>
+            <a:off x="3528000" y="2523960"/>
+            <a:ext cx="5400000" cy="3318120"/>
+          </a:xfrm>
+          <a:prstGeom prst="rect">
+            <a:avLst/>
+          </a:prstGeom>
+          <a:noFill/>
+          <a:ln>
+            <a:noFill/>
+          </a:ln>
+        </p:spPr>
+        <p:txBody>
+          <a:bodyPr lIns="0" rIns="0" tIns="0" bIns="0">
+            <a:noAutofit/>
+          </a:bodyPr>
+          <a:p>
+            <a:pPr>
+              <a:lnSpc>
+                <a:spcPct val="150000"/>
+              </a:lnSpc>
+            </a:pPr>
+            <a:r>
+              <a:rPr b="0" i="1" lang="pt-BR" sz="1300" spc="-1" strike="noStrike">
+                <a:latin typeface="Arial"/>
+              </a:rPr>
+              <a:t>Para acessar a aplicação, a cloud pública conta com várias camadas de segurança, além de multifator de acesso na VPC , passando pelos Securities Groups e usuários IAM.</a:t>
+            </a:r>
+            <a:endParaRPr b="0" i="1" lang="pt-BR" sz="1300" spc="-1" strike="noStrike">
+              <a:latin typeface="Arial"/>
+              <a:ea typeface="Microsoft YaHei"/>
+            </a:endParaRPr>
+          </a:p>
+          <a:p>
+            <a:pPr>
+              <a:lnSpc>
+                <a:spcPct val="150000"/>
+              </a:lnSpc>
+            </a:pPr>
+            <a:r>
+              <a:rPr b="0" i="1" lang="pt-BR" sz="1300" spc="-1" strike="noStrike">
+                <a:latin typeface="Arial"/>
+              </a:rPr>
+              <a:t>Toda segurança é gerenciada pela aws nos mais altos padrões requisitados.</a:t>
+            </a:r>
+            <a:endParaRPr b="0" i="1" lang="pt-BR" sz="1300" spc="-1" strike="noStrike">
+              <a:latin typeface="Arial"/>
+              <a:ea typeface="Microsoft YaHei"/>
+            </a:endParaRPr>
+          </a:p>
+          <a:p>
+            <a:pPr>
+              <a:lnSpc>
+                <a:spcPct val="150000"/>
+              </a:lnSpc>
+            </a:pPr>
+            <a:r>
+              <a:rPr b="0" i="1" lang="pt-BR" sz="1300" spc="-1" strike="noStrike">
+                <a:latin typeface="Arial"/>
+              </a:rPr>
+              <a:t>O diagrama a seguir mostra as camadas de segurança fornecidas por grupos de segurança e Network ACLs. Por exemplo, o tráfego para e proveniente de um gateway da Internet é roteado para a sub-rede apropriada usando as rotas apresentadas na tabela de rotas. As regras da Network ACL associadas à sub-rede controlam qual tráfego é permitido à sub-rede. As regras do grupo de segurança associadas à instância controlam qual tráfego é permitido à instância. </a:t>
+            </a:r>
+            <a:endParaRPr b="0" i="1" lang="pt-BR" sz="1300" spc="-1" strike="noStrike">
+              <a:latin typeface="Arial"/>
+              <a:ea typeface="Microsoft YaHei"/>
+            </a:endParaRPr>
+          </a:p>
+        </p:txBody>
+      </p:sp>
+      <p:sp>
+        <p:nvSpPr>
+          <p:cNvPr id="155" name="TextShape 6"/>
+          <p:cNvSpPr txBox="1"/>
+          <p:nvPr/>
+        </p:nvSpPr>
+        <p:spPr>
+          <a:xfrm>
+            <a:off x="179280" y="1666080"/>
+            <a:ext cx="8826840" cy="857880"/>
+          </a:xfrm>
+          <a:prstGeom prst="rect">
+            <a:avLst/>
+          </a:prstGeom>
+          <a:noFill/>
+          <a:ln>
+            <a:noFill/>
+          </a:ln>
+        </p:spPr>
+        <p:txBody>
+          <a:bodyPr lIns="90000" rIns="90000" tIns="45000" bIns="45000">
+            <a:noAutofit/>
+          </a:bodyPr>
+          <a:p>
+            <a:pPr>
+              <a:lnSpc>
+                <a:spcPct val="150000"/>
+              </a:lnSpc>
+            </a:pPr>
+            <a:r>
+              <a:rPr b="1" lang="pt-BR" sz="1800" spc="-1" strike="noStrike">
+                <a:latin typeface="Arial"/>
+                <a:ea typeface="Microsoft YaHei"/>
+              </a:rPr>
+              <a:t>RNF9 - O sistema deve apresentar altos padrões de segurança.  (VPC da Cloud Pública)</a:t>
+            </a:r>
+            <a:endParaRPr b="0" lang="pt-BR" sz="1800" spc="-1" strike="noStrike">
+              <a:latin typeface="Arial"/>
+            </a:endParaRPr>
+          </a:p>
+        </p:txBody>
+      </p:sp>
+      <p:pic>
+        <p:nvPicPr>
+          <p:cNvPr id="156" name="" descr=""/>
+          <p:cNvPicPr/>
+          <p:nvPr/>
+        </p:nvPicPr>
+        <p:blipFill>
+          <a:blip r:embed="rId1"/>
+          <a:stretch/>
+        </p:blipFill>
+        <p:spPr>
+          <a:xfrm>
+            <a:off x="288000" y="2612160"/>
+            <a:ext cx="3137760" cy="3363840"/>
+          </a:xfrm>
+          <a:prstGeom prst="rect">
+            <a:avLst/>
+          </a:prstGeom>
+          <a:ln>
+            <a:noFill/>
+          </a:ln>
+        </p:spPr>
+      </p:pic>
+    </p:spTree>
+  </p:cSld>
+  <mc:AlternateContent>
+    <mc:Choice Requires="p14">
+      <p:transition spd="slow" p14:dur="2000"/>
+    </mc:Choice>
+    <mc:Fallback>
+      <p:transition spd="slow"/>
+    </mc:Fallback>
+  </mc:AlternateContent>
+</p:sld>
+</file>
+
+<file path=ppt/slides/slide16.xml><?xml version="1.0" encoding="utf-8"?>
+<p:sld xmlns:a="http://schemas.openxmlformats.org/drawingml/2006/main" xmlns:p="http://schemas.openxmlformats.org/presentationml/2006/main" xmlns:r="http://schemas.openxmlformats.org/officeDocument/2006/relationships" xmlns:p14="http://schemas.microsoft.com/office/powerpoint/2010/main" xmlns:p15="http://schemas.microsoft.com/office/powerpoint/2012/main" xmlns:mc="http://schemas.openxmlformats.org/markup-compatibility/2006">
+  <p:cSld>
+    <p:spTree>
+      <p:nvGrpSpPr>
+        <p:cNvPr id="1" name=""/>
+        <p:cNvGrpSpPr/>
+        <p:nvPr/>
+      </p:nvGrpSpPr>
+      <p:grpSpPr>
+        <a:xfrm>
+          <a:off x="0" y="0"/>
+          <a:ext cx="0" cy="0"/>
+          <a:chOff x="0" y="0"/>
+          <a:chExt cx="0" cy="0"/>
+        </a:xfrm>
+      </p:grpSpPr>
+      <p:sp>
+        <p:nvSpPr>
+          <p:cNvPr id="157" name="CustomShape 1"/>
+          <p:cNvSpPr/>
+          <p:nvPr/>
+        </p:nvSpPr>
+        <p:spPr>
+          <a:xfrm>
+            <a:off x="0" y="1001880"/>
+            <a:ext cx="9142920" cy="664200"/>
+          </a:xfrm>
+          <a:prstGeom prst="rect">
+            <a:avLst/>
+          </a:prstGeom>
+          <a:gradFill rotWithShape="0">
+            <a:gsLst>
+              <a:gs pos="0">
+                <a:srgbClr val="95b8bb"/>
+              </a:gs>
+              <a:gs pos="100000">
+                <a:srgbClr val="5d8d91"/>
+              </a:gs>
+            </a:gsLst>
+            <a:lin ang="16200000"/>
+          </a:gradFill>
+          <a:ln>
+            <a:noFill/>
+          </a:ln>
+        </p:spPr>
+        <p:style>
+          <a:lnRef idx="2">
+            <a:schemeClr val="accent1">
+              <a:shade val="50000"/>
+            </a:schemeClr>
+          </a:lnRef>
+          <a:fillRef idx="1">
+            <a:schemeClr val="accent1"/>
+          </a:fillRef>
+          <a:effectRef idx="0">
+            <a:schemeClr val="accent1"/>
+          </a:effectRef>
+          <a:fontRef idx="minor"/>
+        </p:style>
+      </p:sp>
+      <p:sp>
+        <p:nvSpPr>
+          <p:cNvPr id="158" name="CustomShape 2"/>
+          <p:cNvSpPr/>
+          <p:nvPr/>
+        </p:nvSpPr>
+        <p:spPr>
+          <a:xfrm>
+            <a:off x="206280" y="1100160"/>
+            <a:ext cx="8735040" cy="470520"/>
+          </a:xfrm>
+          <a:prstGeom prst="rect">
+            <a:avLst/>
+          </a:prstGeom>
+          <a:noFill/>
+          <a:ln>
+            <a:noFill/>
+          </a:ln>
+        </p:spPr>
+        <p:style>
+          <a:lnRef idx="0"/>
+          <a:fillRef idx="0"/>
+          <a:effectRef idx="0"/>
+          <a:fontRef idx="minor"/>
+        </p:style>
+        <p:txBody>
+          <a:bodyPr lIns="90000" rIns="90000" tIns="45000" bIns="45000">
+            <a:spAutoFit/>
+          </a:bodyPr>
+          <a:p>
+            <a:r>
+              <a:rPr b="1" lang="pt-BR" sz="2500" spc="-1" strike="noStrike">
+                <a:solidFill>
+                  <a:srgbClr val="000000"/>
+                </a:solidFill>
+                <a:latin typeface="Calibri"/>
+                <a:ea typeface="Calibri"/>
+              </a:rPr>
+              <a:t> </a:t>
+            </a:r>
+            <a:r>
+              <a:rPr b="1" lang="pt-BR" sz="2500" spc="-1" strike="noStrike">
+                <a:solidFill>
+                  <a:srgbClr val="000000"/>
+                </a:solidFill>
+                <a:latin typeface="Calibri"/>
+                <a:ea typeface="Calibri"/>
+              </a:rPr>
+              <a:t>A</a:t>
+            </a:r>
+            <a:r>
+              <a:rPr b="1" lang="pt-BR" sz="2500" spc="-1" strike="noStrike">
+                <a:solidFill>
+                  <a:srgbClr val="000000"/>
+                </a:solidFill>
+                <a:latin typeface="Calibri"/>
+                <a:ea typeface="Calibri"/>
+              </a:rPr>
+              <a:t>valiação da Arquitetura</a:t>
+            </a:r>
+            <a:endParaRPr b="0" lang="pt-BR" sz="2500" spc="-1" strike="noStrike">
+              <a:latin typeface="Arial"/>
+            </a:endParaRPr>
+          </a:p>
+        </p:txBody>
+      </p:sp>
+      <p:sp>
+        <p:nvSpPr>
+          <p:cNvPr id="159" name="CustomShape 3"/>
+          <p:cNvSpPr/>
+          <p:nvPr/>
+        </p:nvSpPr>
+        <p:spPr>
+          <a:xfrm>
+            <a:off x="179280" y="1770120"/>
+            <a:ext cx="8826840" cy="4118400"/>
+          </a:xfrm>
+          <a:prstGeom prst="rect">
+            <a:avLst/>
+          </a:prstGeom>
+          <a:noFill/>
+          <a:ln>
+            <a:noFill/>
+          </a:ln>
+        </p:spPr>
+        <p:style>
+          <a:lnRef idx="0"/>
+          <a:fillRef idx="0"/>
+          <a:effectRef idx="0"/>
+          <a:fontRef idx="minor"/>
+        </p:style>
+        <p:txBody>
+          <a:bodyPr lIns="90000" rIns="90000" tIns="45000" bIns="45000">
+            <a:noAutofit/>
+          </a:bodyPr>
+          <a:p>
+            <a:pPr>
+              <a:lnSpc>
+                <a:spcPts val="2801"/>
+              </a:lnSpc>
+              <a:spcBef>
+                <a:spcPts val="400"/>
+              </a:spcBef>
+              <a:spcAft>
+                <a:spcPts val="400"/>
+              </a:spcAft>
+            </a:pPr>
+            <a:endParaRPr b="0" lang="pt-BR" sz="1800" spc="-1" strike="noStrike">
+              <a:latin typeface="Arial"/>
+            </a:endParaRPr>
+          </a:p>
+          <a:p>
+            <a:pPr>
+              <a:lnSpc>
+                <a:spcPts val="2401"/>
+              </a:lnSpc>
+              <a:spcBef>
+                <a:spcPts val="400"/>
+              </a:spcBef>
+              <a:spcAft>
+                <a:spcPts val="1199"/>
+              </a:spcAft>
+            </a:pPr>
+            <a:r>
+              <a:rPr b="1" lang="pt-BR" sz="2000" spc="-1" strike="noStrike">
+                <a:solidFill>
+                  <a:srgbClr val="404040"/>
+                </a:solidFill>
+                <a:latin typeface="Calibri"/>
+                <a:ea typeface="DejaVu Sans"/>
+              </a:rPr>
+              <a:t> </a:t>
+            </a:r>
+            <a:endParaRPr b="0" lang="pt-BR" sz="2000" spc="-1" strike="noStrike">
+              <a:latin typeface="Arial"/>
+            </a:endParaRPr>
+          </a:p>
+          <a:p>
+            <a:pPr>
+              <a:lnSpc>
+                <a:spcPts val="2401"/>
+              </a:lnSpc>
+              <a:spcBef>
+                <a:spcPts val="400"/>
+              </a:spcBef>
+              <a:spcAft>
+                <a:spcPts val="1199"/>
+              </a:spcAft>
+            </a:pPr>
+            <a:endParaRPr b="0" lang="pt-BR" sz="2000" spc="-1" strike="noStrike">
+              <a:latin typeface="Arial"/>
+            </a:endParaRPr>
+          </a:p>
+        </p:txBody>
+      </p:sp>
+      <p:sp>
+        <p:nvSpPr>
+          <p:cNvPr id="160" name="CustomShape 4"/>
+          <p:cNvSpPr/>
+          <p:nvPr/>
+        </p:nvSpPr>
+        <p:spPr>
+          <a:xfrm>
+            <a:off x="228600" y="461880"/>
+            <a:ext cx="8825400" cy="445320"/>
+          </a:xfrm>
+          <a:prstGeom prst="rect">
+            <a:avLst/>
+          </a:prstGeom>
+          <a:noFill/>
+          <a:ln>
+            <a:noFill/>
+          </a:ln>
+        </p:spPr>
+        <p:style>
+          <a:lnRef idx="0"/>
+          <a:fillRef idx="0"/>
+          <a:effectRef idx="0"/>
+          <a:fontRef idx="minor"/>
+        </p:style>
+        <p:txBody>
+          <a:bodyPr lIns="90000" rIns="90000" tIns="45000" bIns="45000">
+            <a:spAutoFit/>
+          </a:bodyPr>
+          <a:p>
+            <a:pPr>
+              <a:lnSpc>
+                <a:spcPts val="2801"/>
+              </a:lnSpc>
+            </a:pPr>
+            <a:r>
+              <a:rPr b="1" lang="pt-BR" sz="2800" spc="-1" strike="noStrike">
+                <a:solidFill>
+                  <a:srgbClr val="000000"/>
+                </a:solidFill>
+                <a:latin typeface="Calibri"/>
+                <a:ea typeface="Calibri"/>
+              </a:rPr>
+              <a:t>Descarte de Embalagens e Produtos de Agrotóxicos</a:t>
+            </a:r>
+            <a:endParaRPr b="0" lang="pt-BR" sz="2800" spc="-1" strike="noStrike">
+              <a:latin typeface="Arial"/>
+            </a:endParaRPr>
+          </a:p>
+        </p:txBody>
+      </p:sp>
+      <p:sp>
+        <p:nvSpPr>
+          <p:cNvPr id="161" name="TextShape 5"/>
+          <p:cNvSpPr txBox="1"/>
+          <p:nvPr/>
+        </p:nvSpPr>
+        <p:spPr>
+          <a:xfrm>
+            <a:off x="179280" y="2479320"/>
+            <a:ext cx="8748720" cy="3568680"/>
+          </a:xfrm>
+          <a:prstGeom prst="rect">
+            <a:avLst/>
+          </a:prstGeom>
+          <a:noFill/>
+          <a:ln>
+            <a:noFill/>
+          </a:ln>
+        </p:spPr>
+        <p:txBody>
+          <a:bodyPr lIns="0" rIns="0" tIns="0" bIns="0">
+            <a:noAutofit/>
+          </a:bodyPr>
+          <a:p>
+            <a:pPr>
+              <a:lnSpc>
+                <a:spcPct val="150000"/>
+              </a:lnSpc>
+            </a:pPr>
+            <a:r>
+              <a:rPr b="0" i="1" lang="pt-BR" sz="1400" spc="-1" strike="noStrike">
+                <a:solidFill>
+                  <a:srgbClr val="16191f"/>
+                </a:solidFill>
+                <a:latin typeface="Arial"/>
+              </a:rPr>
+              <a:t>O Uso de Lambdas provê alta disponibilidade para a aplicação, pois possui o recurso de AutoScaling.</a:t>
+            </a:r>
+            <a:endParaRPr b="0" i="1" lang="pt-BR" sz="1400" spc="-1" strike="noStrike">
+              <a:solidFill>
+                <a:srgbClr val="16191f"/>
+              </a:solidFill>
+              <a:latin typeface="Arial"/>
+              <a:ea typeface="Microsoft YaHei"/>
+            </a:endParaRPr>
+          </a:p>
+          <a:p>
+            <a:pPr>
+              <a:lnSpc>
+                <a:spcPct val="150000"/>
+              </a:lnSpc>
+            </a:pPr>
+            <a:r>
+              <a:rPr b="0" i="1" lang="pt-BR" sz="1400" spc="-1" strike="noStrike">
+                <a:solidFill>
+                  <a:srgbClr val="16191f"/>
+                </a:solidFill>
+                <a:latin typeface="Arial"/>
+              </a:rPr>
+              <a:t>Uma função lambda dimensiona entre um valor mínimo e máximo da simultaneidade provisionada com base na utilização. Quando o número de solicitações abertas aumenta, o Aplicativo Auto Scaling aumenta a simultaneidade provisionada em grande escala até que alcance a configuração máxima. A função continua a ser dimensionada na simultaneidade padrão até que a utilização comece a ser reduzida. Quando a utilização é consistentemente baixa, o Aplicativo Auto </a:t>
+            </a:r>
+            <a:endParaRPr b="0" i="1" lang="pt-BR" sz="1400" spc="-1" strike="noStrike">
+              <a:solidFill>
+                <a:srgbClr val="16191f"/>
+              </a:solidFill>
+              <a:latin typeface="Arial"/>
+              <a:ea typeface="Microsoft YaHei"/>
+            </a:endParaRPr>
+          </a:p>
+          <a:p>
+            <a:pPr>
+              <a:lnSpc>
+                <a:spcPct val="150000"/>
+              </a:lnSpc>
+            </a:pPr>
+            <a:r>
+              <a:rPr b="0" i="1" lang="pt-BR" sz="1400" spc="-1" strike="noStrike">
+                <a:solidFill>
+                  <a:srgbClr val="16191f"/>
+                </a:solidFill>
+                <a:latin typeface="Arial"/>
+              </a:rPr>
+              <a:t>Scaling reduz a simultaneida de provisiona</a:t>
+            </a:r>
+            <a:endParaRPr b="0" i="1" lang="pt-BR" sz="1400" spc="-1" strike="noStrike">
+              <a:solidFill>
+                <a:srgbClr val="16191f"/>
+              </a:solidFill>
+              <a:latin typeface="Arial"/>
+              <a:ea typeface="Microsoft YaHei"/>
+            </a:endParaRPr>
+          </a:p>
+          <a:p>
+            <a:pPr>
+              <a:lnSpc>
+                <a:spcPct val="150000"/>
+              </a:lnSpc>
+            </a:pPr>
+            <a:r>
+              <a:rPr b="0" i="1" lang="pt-BR" sz="1400" spc="-1" strike="noStrike">
+                <a:solidFill>
+                  <a:srgbClr val="16191f"/>
+                </a:solidFill>
+                <a:latin typeface="Arial"/>
+              </a:rPr>
+              <a:t>da em escalas periódicas menores. </a:t>
+            </a:r>
+            <a:endParaRPr b="0" i="1" lang="pt-BR" sz="1400" spc="-1" strike="noStrike">
+              <a:solidFill>
+                <a:srgbClr val="16191f"/>
+              </a:solidFill>
+              <a:latin typeface="Arial"/>
+              <a:ea typeface="Microsoft YaHei"/>
+            </a:endParaRPr>
+          </a:p>
+          <a:p>
+            <a:pPr>
+              <a:lnSpc>
+                <a:spcPct val="150000"/>
+              </a:lnSpc>
+            </a:pPr>
+            <a:r>
+              <a:rPr b="0" i="1" lang="pt-BR" sz="1400" spc="-1" strike="noStrike">
+                <a:solidFill>
+                  <a:srgbClr val="16191f"/>
+                </a:solidFill>
+                <a:latin typeface="Arial"/>
+              </a:rPr>
+              <a:t>Isso provê a auto escalabilidade e alta </a:t>
+            </a:r>
+            <a:endParaRPr b="0" i="1" lang="pt-BR" sz="1400" spc="-1" strike="noStrike">
+              <a:solidFill>
+                <a:srgbClr val="16191f"/>
+              </a:solidFill>
+              <a:latin typeface="Arial"/>
+              <a:ea typeface="Microsoft YaHei"/>
+            </a:endParaRPr>
+          </a:p>
+          <a:p>
+            <a:pPr>
+              <a:lnSpc>
+                <a:spcPct val="150000"/>
+              </a:lnSpc>
+            </a:pPr>
+            <a:r>
+              <a:rPr b="0" i="1" lang="pt-BR" sz="1400" spc="-1" strike="noStrike">
+                <a:solidFill>
+                  <a:srgbClr val="16191f"/>
+                </a:solidFill>
+                <a:latin typeface="Arial"/>
+              </a:rPr>
+              <a:t>disponibilidade</a:t>
+            </a:r>
+            <a:endParaRPr b="0" i="1" lang="pt-BR" sz="1400" spc="-1" strike="noStrike">
+              <a:solidFill>
+                <a:srgbClr val="16191f"/>
+              </a:solidFill>
+              <a:latin typeface="Arial"/>
+              <a:ea typeface="Microsoft YaHei"/>
+            </a:endParaRPr>
+          </a:p>
+        </p:txBody>
+      </p:sp>
+      <p:sp>
+        <p:nvSpPr>
+          <p:cNvPr id="162" name="TextShape 6"/>
+          <p:cNvSpPr txBox="1"/>
+          <p:nvPr/>
+        </p:nvSpPr>
+        <p:spPr>
+          <a:xfrm>
+            <a:off x="179280" y="1666080"/>
+            <a:ext cx="8826840" cy="857880"/>
+          </a:xfrm>
+          <a:prstGeom prst="rect">
+            <a:avLst/>
+          </a:prstGeom>
+          <a:noFill/>
+          <a:ln>
+            <a:noFill/>
+          </a:ln>
+        </p:spPr>
+        <p:txBody>
+          <a:bodyPr lIns="90000" rIns="90000" tIns="45000" bIns="45000">
+            <a:noAutofit/>
+          </a:bodyPr>
+          <a:p>
+            <a:pPr>
+              <a:lnSpc>
+                <a:spcPct val="150000"/>
+              </a:lnSpc>
+            </a:pPr>
+            <a:r>
+              <a:rPr b="1" lang="pt-BR" sz="1800" spc="-1" strike="noStrike">
+                <a:latin typeface="Arial"/>
+                <a:ea typeface="Microsoft YaHei"/>
+              </a:rPr>
+              <a:t>RNF12- O sistema deve prover alta disponibilidade  - alta disponibilidade das Lambdas.</a:t>
+            </a:r>
+            <a:endParaRPr b="0" lang="pt-BR" sz="1800" spc="-1" strike="noStrike">
+              <a:latin typeface="Arial"/>
+            </a:endParaRPr>
+          </a:p>
+        </p:txBody>
+      </p:sp>
+      <p:pic>
+        <p:nvPicPr>
+          <p:cNvPr id="163" name="" descr=""/>
+          <p:cNvPicPr/>
+          <p:nvPr/>
+        </p:nvPicPr>
+        <p:blipFill>
+          <a:blip r:embed="rId1"/>
+          <a:stretch/>
+        </p:blipFill>
+        <p:spPr>
+          <a:xfrm>
+            <a:off x="3600000" y="4032000"/>
+            <a:ext cx="5286240" cy="1859760"/>
+          </a:xfrm>
+          <a:prstGeom prst="rect">
+            <a:avLst/>
+          </a:prstGeom>
+          <a:ln>
+            <a:noFill/>
+          </a:ln>
+        </p:spPr>
+      </p:pic>
+    </p:spTree>
+  </p:cSld>
+  <mc:AlternateContent>
+    <mc:Choice Requires="p14">
+      <p:transition spd="slow" p14:dur="2000"/>
+    </mc:Choice>
+    <mc:Fallback>
+      <p:transition spd="slow"/>
+    </mc:Fallback>
+  </mc:AlternateContent>
+</p:sld>
+</file>
+
+<file path=ppt/slides/slide17.xml><?xml version="1.0" encoding="utf-8"?>
+<p:sld xmlns:a="http://schemas.openxmlformats.org/drawingml/2006/main" xmlns:p="http://schemas.openxmlformats.org/presentationml/2006/main" xmlns:r="http://schemas.openxmlformats.org/officeDocument/2006/relationships" xmlns:p14="http://schemas.microsoft.com/office/powerpoint/2010/main" xmlns:p15="http://schemas.microsoft.com/office/powerpoint/2012/main" xmlns:mc="http://schemas.openxmlformats.org/markup-compatibility/2006">
+  <p:cSld>
+    <p:spTree>
+      <p:nvGrpSpPr>
+        <p:cNvPr id="1" name=""/>
+        <p:cNvGrpSpPr/>
+        <p:nvPr/>
+      </p:nvGrpSpPr>
+      <p:grpSpPr>
+        <a:xfrm>
+          <a:off x="0" y="0"/>
+          <a:ext cx="0" cy="0"/>
+          <a:chOff x="0" y="0"/>
+          <a:chExt cx="0" cy="0"/>
+        </a:xfrm>
+      </p:grpSpPr>
+    </p:spTree>
+  </p:cSld>
+  <mc:AlternateContent>
+    <mc:Choice Requires="p14">
+      <p:transition spd="slow" p14:dur="2000"/>
+    </mc:Choice>
+    <mc:Fallback>
+      <p:transition spd="slow"/>
+    </mc:Fallback>
+  </mc:AlternateContent>
+</p:sld>
+</file>
+
+<file path=ppt/slides/slide18.xml><?xml version="1.0" encoding="utf-8"?>
+<p:sld xmlns:a="http://schemas.openxmlformats.org/drawingml/2006/main" xmlns:p="http://schemas.openxmlformats.org/presentationml/2006/main" xmlns:r="http://schemas.openxmlformats.org/officeDocument/2006/relationships" xmlns:p14="http://schemas.microsoft.com/office/powerpoint/2010/main" xmlns:p15="http://schemas.microsoft.com/office/powerpoint/2012/main" xmlns:mc="http://schemas.openxmlformats.org/markup-compatibility/2006">
+  <p:cSld>
+    <p:spTree>
+      <p:nvGrpSpPr>
+        <p:cNvPr id="1" name=""/>
+        <p:cNvGrpSpPr/>
+        <p:nvPr/>
+      </p:nvGrpSpPr>
+      <p:grpSpPr>
+        <a:xfrm>
+          <a:off x="0" y="0"/>
+          <a:ext cx="0" cy="0"/>
+          <a:chOff x="0" y="0"/>
+          <a:chExt cx="0" cy="0"/>
+        </a:xfrm>
+      </p:grpSpPr>
+      <p:sp>
+        <p:nvSpPr>
+          <p:cNvPr id="164" name="CustomShape 1"/>
+          <p:cNvSpPr/>
+          <p:nvPr/>
+        </p:nvSpPr>
+        <p:spPr>
+          <a:xfrm>
+            <a:off x="0" y="1001880"/>
+            <a:ext cx="9142920" cy="664200"/>
+          </a:xfrm>
+          <a:prstGeom prst="rect">
+            <a:avLst/>
+          </a:prstGeom>
+          <a:gradFill rotWithShape="0">
+            <a:gsLst>
+              <a:gs pos="0">
+                <a:srgbClr val="95b8bb"/>
+              </a:gs>
+              <a:gs pos="100000">
+                <a:srgbClr val="5d8d91"/>
+              </a:gs>
+            </a:gsLst>
+            <a:lin ang="16200000"/>
+          </a:gradFill>
+          <a:ln>
+            <a:noFill/>
+          </a:ln>
+        </p:spPr>
+        <p:style>
+          <a:lnRef idx="2">
+            <a:schemeClr val="accent1">
+              <a:shade val="50000"/>
+            </a:schemeClr>
+          </a:lnRef>
+          <a:fillRef idx="1">
+            <a:schemeClr val="accent1"/>
+          </a:fillRef>
+          <a:effectRef idx="0">
+            <a:schemeClr val="accent1"/>
+          </a:effectRef>
+          <a:fontRef idx="minor"/>
+        </p:style>
+      </p:sp>
+      <p:sp>
+        <p:nvSpPr>
+          <p:cNvPr id="165" name="CustomShape 2"/>
+          <p:cNvSpPr/>
+          <p:nvPr/>
+        </p:nvSpPr>
+        <p:spPr>
+          <a:xfrm>
+            <a:off x="206280" y="1100160"/>
+            <a:ext cx="8735040" cy="470520"/>
+          </a:xfrm>
+          <a:prstGeom prst="rect">
+            <a:avLst/>
+          </a:prstGeom>
+          <a:noFill/>
+          <a:ln>
+            <a:noFill/>
+          </a:ln>
+        </p:spPr>
+        <p:style>
+          <a:lnRef idx="0"/>
+          <a:fillRef idx="0"/>
+          <a:effectRef idx="0"/>
+          <a:fontRef idx="minor"/>
+        </p:style>
+        <p:txBody>
+          <a:bodyPr lIns="90000" rIns="90000" tIns="45000" bIns="45000">
+            <a:spAutoFit/>
+          </a:bodyPr>
+          <a:p>
+            <a:pPr>
+              <a:lnSpc>
+                <a:spcPct val="100000"/>
+              </a:lnSpc>
+            </a:pPr>
+            <a:r>
+              <a:rPr b="1" lang="pt-BR" sz="2500" spc="-1" strike="noStrike">
+                <a:solidFill>
+                  <a:srgbClr val="000000"/>
+                </a:solidFill>
+                <a:latin typeface="Calibri"/>
+                <a:ea typeface="Calibri"/>
+              </a:rPr>
+              <a:t>Conclusões</a:t>
+            </a:r>
+            <a:endParaRPr b="0" lang="pt-BR" sz="2500" spc="-1" strike="noStrike">
+              <a:latin typeface="Arial"/>
+            </a:endParaRPr>
+          </a:p>
+        </p:txBody>
+      </p:sp>
+      <p:sp>
+        <p:nvSpPr>
+          <p:cNvPr id="166" name="CustomShape 3"/>
+          <p:cNvSpPr/>
+          <p:nvPr/>
+        </p:nvSpPr>
+        <p:spPr>
+          <a:xfrm>
+            <a:off x="179280" y="1770120"/>
+            <a:ext cx="8826840" cy="4118400"/>
+          </a:xfrm>
+          <a:prstGeom prst="rect">
+            <a:avLst/>
+          </a:prstGeom>
+          <a:noFill/>
+          <a:ln>
+            <a:noFill/>
+          </a:ln>
+        </p:spPr>
+        <p:style>
+          <a:lnRef idx="0"/>
+          <a:fillRef idx="0"/>
+          <a:effectRef idx="0"/>
+          <a:fontRef idx="minor"/>
+        </p:style>
+        <p:txBody>
+          <a:bodyPr lIns="90000" rIns="90000" tIns="45000" bIns="45000">
+            <a:noAutofit/>
+          </a:bodyPr>
+          <a:p>
+            <a:pPr algn="just">
+              <a:lnSpc>
+                <a:spcPct val="150000"/>
+              </a:lnSpc>
+            </a:pPr>
+            <a:r>
+              <a:rPr b="1" lang="pt-BR" sz="2000" spc="-1" strike="noStrike">
+                <a:solidFill>
+                  <a:srgbClr val="404040"/>
+                </a:solidFill>
+                <a:latin typeface="Calibri"/>
+                <a:ea typeface="DejaVu Sans"/>
+              </a:rPr>
+              <a:t>Toda lógica de coreografia e orquestração está centrada no roteamento dos tipos de mensagem nos tópicos. Ao receber esta mensagem, a lambda realiza a tarefa e dispara nova mensagem para o tópico que torna a rotear a mensagem e num novo agente (lambda) entra em ação.</a:t>
+            </a:r>
+            <a:endParaRPr b="0" lang="pt-BR" sz="2000" spc="-1" strike="noStrike">
+              <a:latin typeface="Arial"/>
+            </a:endParaRPr>
+          </a:p>
+          <a:p>
+            <a:pPr algn="just">
+              <a:lnSpc>
+                <a:spcPct val="150000"/>
+              </a:lnSpc>
+            </a:pPr>
+            <a:r>
+              <a:rPr b="1" lang="pt-BR" sz="2000" spc="-1" strike="noStrike">
+                <a:solidFill>
+                  <a:srgbClr val="404040"/>
+                </a:solidFill>
+                <a:latin typeface="Calibri"/>
+                <a:ea typeface="DejaVu Sans"/>
+              </a:rPr>
+              <a:t>Fazendo com que seja possível uma transação de longa duração com integridade da informação e prevenção da consistência eventual dos dados.</a:t>
+            </a:r>
+            <a:endParaRPr b="0" lang="pt-BR" sz="2000" spc="-1" strike="noStrike">
+              <a:latin typeface="Arial"/>
+            </a:endParaRPr>
+          </a:p>
+          <a:p>
+            <a:pPr algn="just">
+              <a:lnSpc>
+                <a:spcPct val="150000"/>
+              </a:lnSpc>
+            </a:pPr>
+            <a:r>
+              <a:rPr b="1" lang="pt-BR" sz="2000" spc="-1" strike="noStrike">
+                <a:solidFill>
+                  <a:srgbClr val="404040"/>
+                </a:solidFill>
+                <a:latin typeface="Calibri"/>
+                <a:ea typeface="DejaVu Sans"/>
+              </a:rPr>
+              <a:t>Os pontos fortes desta arquitetura estão na descentralização dos serviços, alta disponibilidade, escalabilidade automática e segurança nas transações de longa duração, bem como na infraestrutura de cloud pública.</a:t>
+            </a:r>
+            <a:endParaRPr b="0" lang="pt-BR" sz="2000" spc="-1" strike="noStrike">
+              <a:latin typeface="Arial"/>
+            </a:endParaRPr>
+          </a:p>
+        </p:txBody>
+      </p:sp>
+      <p:sp>
+        <p:nvSpPr>
+          <p:cNvPr id="167" name="CustomShape 4"/>
+          <p:cNvSpPr/>
+          <p:nvPr/>
+        </p:nvSpPr>
+        <p:spPr>
+          <a:xfrm>
+            <a:off x="228600" y="461880"/>
+            <a:ext cx="8825400" cy="445320"/>
+          </a:xfrm>
+          <a:prstGeom prst="rect">
+            <a:avLst/>
+          </a:prstGeom>
+          <a:noFill/>
+          <a:ln>
+            <a:noFill/>
+          </a:ln>
+        </p:spPr>
+        <p:style>
+          <a:lnRef idx="0"/>
+          <a:fillRef idx="0"/>
+          <a:effectRef idx="0"/>
+          <a:fontRef idx="minor"/>
+        </p:style>
+        <p:txBody>
+          <a:bodyPr lIns="90000" rIns="90000" tIns="45000" bIns="45000">
+            <a:spAutoFit/>
+          </a:bodyPr>
+          <a:p>
+            <a:pPr>
+              <a:lnSpc>
+                <a:spcPts val="2801"/>
+              </a:lnSpc>
+            </a:pPr>
+            <a:r>
+              <a:rPr b="1" lang="pt-BR" sz="2800" spc="-1" strike="noStrike">
+                <a:solidFill>
+                  <a:srgbClr val="000000"/>
+                </a:solidFill>
+                <a:latin typeface="Calibri"/>
+                <a:ea typeface="Calibri"/>
+              </a:rPr>
+              <a:t>Descarte de Embalagens e Produtos de Agrotóxicos</a:t>
+            </a:r>
+            <a:endParaRPr b="0" lang="pt-BR" sz="2800" spc="-1" strike="noStrike">
+              <a:latin typeface="Arial"/>
+            </a:endParaRPr>
+          </a:p>
+        </p:txBody>
+      </p:sp>
+    </p:spTree>
+  </p:cSld>
+  <mc:AlternateContent>
+    <mc:Choice Requires="p14">
+      <p:transition spd="slow" p14:dur="2000"/>
+    </mc:Choice>
+    <mc:Fallback>
+      <p:transition spd="slow"/>
+    </mc:Fallback>
+  </mc:AlternateContent>
+</p:sld>
+</file>
+
+<file path=ppt/slides/slide19.xml><?xml version="1.0" encoding="utf-8"?>
+<p:sld xmlns:a="http://schemas.openxmlformats.org/drawingml/2006/main" xmlns:p="http://schemas.openxmlformats.org/presentationml/2006/main" xmlns:r="http://schemas.openxmlformats.org/officeDocument/2006/relationships" xmlns:p14="http://schemas.microsoft.com/office/powerpoint/2010/main" xmlns:p15="http://schemas.microsoft.com/office/powerpoint/2012/main" xmlns:mc="http://schemas.openxmlformats.org/markup-compatibility/2006">
+  <p:cSld>
+    <p:spTree>
+      <p:nvGrpSpPr>
+        <p:cNvPr id="1" name=""/>
+        <p:cNvGrpSpPr/>
+        <p:nvPr/>
+      </p:nvGrpSpPr>
+      <p:grpSpPr>
+        <a:xfrm>
+          <a:off x="0" y="0"/>
+          <a:ext cx="0" cy="0"/>
+          <a:chOff x="0" y="0"/>
+          <a:chExt cx="0" cy="0"/>
+        </a:xfrm>
+      </p:grpSpPr>
+      <p:sp>
+        <p:nvSpPr>
+          <p:cNvPr id="168" name="CustomShape 1"/>
+          <p:cNvSpPr/>
+          <p:nvPr/>
+        </p:nvSpPr>
+        <p:spPr>
+          <a:xfrm>
+            <a:off x="0" y="1001880"/>
+            <a:ext cx="9142920" cy="664200"/>
+          </a:xfrm>
+          <a:prstGeom prst="rect">
+            <a:avLst/>
+          </a:prstGeom>
+          <a:gradFill rotWithShape="0">
+            <a:gsLst>
+              <a:gs pos="0">
+                <a:srgbClr val="95b8bb"/>
+              </a:gs>
+              <a:gs pos="100000">
+                <a:srgbClr val="5d8d91"/>
+              </a:gs>
+            </a:gsLst>
+            <a:lin ang="16200000"/>
+          </a:gradFill>
+          <a:ln>
+            <a:noFill/>
+          </a:ln>
+        </p:spPr>
+        <p:style>
+          <a:lnRef idx="2">
+            <a:schemeClr val="accent1">
+              <a:shade val="50000"/>
+            </a:schemeClr>
+          </a:lnRef>
+          <a:fillRef idx="1">
+            <a:schemeClr val="accent1"/>
+          </a:fillRef>
+          <a:effectRef idx="0">
+            <a:schemeClr val="accent1"/>
+          </a:effectRef>
+          <a:fontRef idx="minor"/>
+        </p:style>
+      </p:sp>
+      <p:sp>
+        <p:nvSpPr>
+          <p:cNvPr id="169" name="CustomShape 2"/>
+          <p:cNvSpPr/>
+          <p:nvPr/>
+        </p:nvSpPr>
+        <p:spPr>
+          <a:xfrm>
+            <a:off x="206280" y="1100160"/>
+            <a:ext cx="8735040" cy="470520"/>
+          </a:xfrm>
+          <a:prstGeom prst="rect">
+            <a:avLst/>
+          </a:prstGeom>
+          <a:noFill/>
+          <a:ln>
+            <a:noFill/>
+          </a:ln>
+        </p:spPr>
+        <p:style>
+          <a:lnRef idx="0"/>
+          <a:fillRef idx="0"/>
+          <a:effectRef idx="0"/>
+          <a:fontRef idx="minor"/>
+        </p:style>
+        <p:txBody>
+          <a:bodyPr lIns="90000" rIns="90000" tIns="45000" bIns="45000">
+            <a:spAutoFit/>
+          </a:bodyPr>
+          <a:p>
+            <a:pPr>
+              <a:lnSpc>
+                <a:spcPct val="100000"/>
+              </a:lnSpc>
+            </a:pPr>
+            <a:r>
+              <a:rPr b="1" lang="pt-BR" sz="2500" spc="-1" strike="noStrike">
+                <a:solidFill>
+                  <a:srgbClr val="000000"/>
+                </a:solidFill>
+                <a:latin typeface="Calibri"/>
+                <a:ea typeface="Calibri"/>
+              </a:rPr>
+              <a:t>Implementação</a:t>
+            </a:r>
+            <a:endParaRPr b="0" lang="pt-BR" sz="2500" spc="-1" strike="noStrike">
+              <a:latin typeface="Arial"/>
+            </a:endParaRPr>
+          </a:p>
+        </p:txBody>
+      </p:sp>
+      <p:sp>
+        <p:nvSpPr>
+          <p:cNvPr id="170" name="CustomShape 3"/>
+          <p:cNvSpPr/>
+          <p:nvPr/>
+        </p:nvSpPr>
+        <p:spPr>
+          <a:xfrm>
+            <a:off x="179280" y="1770120"/>
+            <a:ext cx="8826840" cy="4118400"/>
+          </a:xfrm>
+          <a:prstGeom prst="rect">
+            <a:avLst/>
+          </a:prstGeom>
+          <a:noFill/>
+          <a:ln>
+            <a:noFill/>
+          </a:ln>
+        </p:spPr>
+        <p:style>
+          <a:lnRef idx="0"/>
+          <a:fillRef idx="0"/>
+          <a:effectRef idx="0"/>
+          <a:fontRef idx="minor"/>
+        </p:style>
+      </p:sp>
+      <p:sp>
+        <p:nvSpPr>
+          <p:cNvPr id="171" name="CustomShape 4"/>
+          <p:cNvSpPr/>
+          <p:nvPr/>
+        </p:nvSpPr>
+        <p:spPr>
+          <a:xfrm>
+            <a:off x="228600" y="461880"/>
+            <a:ext cx="8825400" cy="445320"/>
+          </a:xfrm>
+          <a:prstGeom prst="rect">
+            <a:avLst/>
+          </a:prstGeom>
+          <a:noFill/>
+          <a:ln>
+            <a:noFill/>
+          </a:ln>
+        </p:spPr>
+        <p:style>
+          <a:lnRef idx="0"/>
+          <a:fillRef idx="0"/>
+          <a:effectRef idx="0"/>
+          <a:fontRef idx="minor"/>
+        </p:style>
+        <p:txBody>
+          <a:bodyPr lIns="90000" rIns="90000" tIns="45000" bIns="45000">
+            <a:spAutoFit/>
+          </a:bodyPr>
+          <a:p>
+            <a:pPr>
+              <a:lnSpc>
+                <a:spcPts val="2801"/>
+              </a:lnSpc>
+            </a:pPr>
+            <a:r>
+              <a:rPr b="1" lang="pt-BR" sz="2800" spc="-1" strike="noStrike">
+                <a:solidFill>
+                  <a:srgbClr val="000000"/>
+                </a:solidFill>
+                <a:latin typeface="Calibri"/>
+                <a:ea typeface="Calibri"/>
+              </a:rPr>
+              <a:t>Descarte de Embalagens e Produtos de Agrotóxicos</a:t>
+            </a:r>
+            <a:endParaRPr b="0" lang="pt-BR" sz="2800" spc="-1" strike="noStrike">
+              <a:latin typeface="Arial"/>
+            </a:endParaRPr>
+          </a:p>
+        </p:txBody>
+      </p:sp>
+      <p:sp>
+        <p:nvSpPr>
+          <p:cNvPr id="172" name="CustomShape 5"/>
+          <p:cNvSpPr/>
+          <p:nvPr/>
+        </p:nvSpPr>
+        <p:spPr>
+          <a:xfrm>
+            <a:off x="432000" y="2520000"/>
+            <a:ext cx="6623640" cy="2393640"/>
+          </a:xfrm>
+          <a:prstGeom prst="rect">
+            <a:avLst/>
+          </a:prstGeom>
+          <a:noFill/>
+          <a:ln>
+            <a:noFill/>
+          </a:ln>
+        </p:spPr>
+        <p:style>
+          <a:lnRef idx="0"/>
+          <a:fillRef idx="0"/>
+          <a:effectRef idx="0"/>
+          <a:fontRef idx="minor"/>
+        </p:style>
+        <p:txBody>
+          <a:bodyPr lIns="90000" rIns="90000" tIns="45000" bIns="45000">
+            <a:noAutofit/>
+          </a:bodyPr>
+          <a:p>
+            <a:pPr>
+              <a:lnSpc>
+                <a:spcPct val="100000"/>
+              </a:lnSpc>
+            </a:pPr>
             <a:r>
               <a:rPr b="0" lang="pt-BR" sz="1800" spc="-1" strike="noStrike">
                 <a:latin typeface="Arial"/>
               </a:rPr>
-              <a:t>Obrigada!</a:t>
-            </a:r>
+              <a:t>Parte 1 - </a:t>
+            </a:r>
+            <a:r>
+              <a:rPr b="0" lang="pt-BR" sz="1800" spc="-1" strike="noStrike" u="sng">
+                <a:solidFill>
+                  <a:srgbClr val="009999"/>
+                </a:solidFill>
+                <a:uFillTx/>
+                <a:latin typeface="Arial"/>
+                <a:hlinkClick r:id="rId1"/>
+              </a:rPr>
+              <a:t>https://www.youtube.com/watch?v=LoC8igz9V4s</a:t>
+            </a:r>
+            <a:endParaRPr b="0" lang="pt-BR" sz="1800" spc="-1" strike="noStrike">
+              <a:latin typeface="Arial"/>
+            </a:endParaRPr>
+          </a:p>
+          <a:p>
+            <a:pPr>
+              <a:lnSpc>
+                <a:spcPct val="100000"/>
+              </a:lnSpc>
+            </a:pPr>
+            <a:endParaRPr b="0" lang="pt-BR" sz="1800" spc="-1" strike="noStrike">
+              <a:latin typeface="Arial"/>
+            </a:endParaRPr>
+          </a:p>
+          <a:p>
+            <a:pPr>
+              <a:lnSpc>
+                <a:spcPct val="100000"/>
+              </a:lnSpc>
+            </a:pPr>
+            <a:r>
+              <a:rPr b="0" lang="pt-BR" sz="1800" spc="-1" strike="noStrike">
+                <a:solidFill>
+                  <a:srgbClr val="009999"/>
+                </a:solidFill>
+                <a:latin typeface="Arial"/>
+              </a:rPr>
+              <a:t>Parte 2 - </a:t>
+            </a:r>
+            <a:r>
+              <a:rPr b="0" lang="pt-BR" sz="1800" spc="-1" strike="noStrike" u="sng">
+                <a:solidFill>
+                  <a:srgbClr val="009999"/>
+                </a:solidFill>
+                <a:uFillTx/>
+                <a:latin typeface="Arial"/>
+                <a:hlinkClick r:id="rId2"/>
+              </a:rPr>
+              <a:t>https://www.youtube.com/watch?v=P7K7ErxjQHM</a:t>
+            </a:r>
+            <a:endParaRPr b="0" lang="pt-BR" sz="1800" spc="-1" strike="noStrike">
+              <a:latin typeface="Arial"/>
+            </a:endParaRPr>
+          </a:p>
+          <a:p>
+            <a:pPr>
+              <a:lnSpc>
+                <a:spcPct val="100000"/>
+              </a:lnSpc>
+            </a:pPr>
+            <a:endParaRPr b="0" lang="pt-BR" sz="1800" spc="-1" strike="noStrike">
+              <a:latin typeface="Arial"/>
+            </a:endParaRPr>
+          </a:p>
+          <a:p>
+            <a:pPr>
+              <a:lnSpc>
+                <a:spcPct val="100000"/>
+              </a:lnSpc>
+            </a:pPr>
+            <a:r>
+              <a:rPr b="0" lang="pt-BR" sz="1800" spc="-1" strike="noStrike">
+                <a:solidFill>
+                  <a:srgbClr val="009999"/>
+                </a:solidFill>
+                <a:latin typeface="Arial"/>
+              </a:rPr>
+              <a:t>Parte 3 - </a:t>
+            </a:r>
+            <a:r>
+              <a:rPr b="0" lang="pt-BR" sz="1800" spc="-1" strike="noStrike" u="sng">
+                <a:solidFill>
+                  <a:srgbClr val="009999"/>
+                </a:solidFill>
+                <a:uFillTx/>
+                <a:latin typeface="Arial"/>
+                <a:hlinkClick r:id="rId3"/>
+              </a:rPr>
+              <a:t>https://www.youtube.com/watch?v=gi21hSRmZI0</a:t>
+            </a:r>
+            <a:endParaRPr b="0" lang="pt-BR" sz="1800" spc="-1" strike="noStrike">
+              <a:latin typeface="Arial"/>
+            </a:endParaRPr>
+          </a:p>
+          <a:p>
+            <a:pPr>
+              <a:lnSpc>
+                <a:spcPct val="100000"/>
+              </a:lnSpc>
+            </a:pPr>
             <a:endParaRPr b="0" lang="pt-BR" sz="1800" spc="-1" strike="noStrike">
               <a:latin typeface="Arial"/>
             </a:endParaRPr>
@@ -4376,7 +7002,7 @@
         <p:spPr>
           <a:xfrm>
             <a:off x="0" y="1001880"/>
-            <a:ext cx="9143280" cy="664560"/>
+            <a:ext cx="9142920" cy="664200"/>
           </a:xfrm>
           <a:prstGeom prst="rect">
             <a:avLst/>
@@ -4420,7 +7046,7 @@
         <p:spPr>
           <a:xfrm>
             <a:off x="206280" y="1100160"/>
-            <a:ext cx="8735400" cy="470880"/>
+            <a:ext cx="8735040" cy="470520"/>
           </a:xfrm>
           <a:prstGeom prst="rect">
             <a:avLst/>
@@ -4471,7 +7097,7 @@
         <p:spPr>
           <a:xfrm>
             <a:off x="179280" y="1770120"/>
-            <a:ext cx="8827200" cy="4118760"/>
+            <a:ext cx="8826840" cy="4118400"/>
           </a:xfrm>
           <a:prstGeom prst="rect">
             <a:avLst/>
@@ -4544,7 +7170,7 @@
         <p:spPr>
           <a:xfrm>
             <a:off x="228600" y="461880"/>
-            <a:ext cx="8825760" cy="445680"/>
+            <a:ext cx="8825400" cy="445320"/>
           </a:xfrm>
           <a:prstGeom prst="rect">
             <a:avLst/>
@@ -4581,6 +7207,83 @@
               <a:t>Descarte de Embalagens e Produtos de Agrotóxicos</a:t>
             </a:r>
             <a:endParaRPr b="0" lang="pt-BR" sz="2800" spc="-1" strike="noStrike">
+              <a:latin typeface="Arial"/>
+            </a:endParaRPr>
+          </a:p>
+        </p:txBody>
+      </p:sp>
+    </p:spTree>
+  </p:cSld>
+  <mc:AlternateContent>
+    <mc:Choice Requires="p14">
+      <p:transition spd="slow" p14:dur="2000"/>
+    </mc:Choice>
+    <mc:Fallback>
+      <p:transition spd="slow"/>
+    </mc:Fallback>
+  </mc:AlternateContent>
+</p:sld>
+</file>
+
+<file path=ppt/slides/slide20.xml><?xml version="1.0" encoding="utf-8"?>
+<p:sld xmlns:a="http://schemas.openxmlformats.org/drawingml/2006/main" xmlns:p="http://schemas.openxmlformats.org/presentationml/2006/main" xmlns:r="http://schemas.openxmlformats.org/officeDocument/2006/relationships" xmlns:p14="http://schemas.microsoft.com/office/powerpoint/2010/main" xmlns:p15="http://schemas.microsoft.com/office/powerpoint/2012/main" xmlns:mc="http://schemas.openxmlformats.org/markup-compatibility/2006">
+  <p:cSld>
+    <p:spTree>
+      <p:nvGrpSpPr>
+        <p:cNvPr id="1" name=""/>
+        <p:cNvGrpSpPr/>
+        <p:nvPr/>
+      </p:nvGrpSpPr>
+      <p:grpSpPr>
+        <a:xfrm>
+          <a:off x="0" y="0"/>
+          <a:ext cx="0" cy="0"/>
+          <a:chOff x="0" y="0"/>
+          <a:chExt cx="0" cy="0"/>
+        </a:xfrm>
+      </p:grpSpPr>
+      <p:sp>
+        <p:nvSpPr>
+          <p:cNvPr id="173" name="CustomShape 1"/>
+          <p:cNvSpPr/>
+          <p:nvPr/>
+        </p:nvSpPr>
+        <p:spPr>
+          <a:xfrm>
+            <a:off x="3642120" y="3240000"/>
+            <a:ext cx="3269520" cy="1857960"/>
+          </a:xfrm>
+          <a:prstGeom prst="rect">
+            <a:avLst/>
+          </a:prstGeom>
+          <a:noFill/>
+          <a:ln>
+            <a:noFill/>
+          </a:ln>
+        </p:spPr>
+        <p:style>
+          <a:lnRef idx="0"/>
+          <a:fillRef idx="0"/>
+          <a:effectRef idx="0"/>
+          <a:fontRef idx="minor"/>
+        </p:style>
+        <p:txBody>
+          <a:bodyPr lIns="90000" rIns="90000" tIns="45000" bIns="45000">
+            <a:noAutofit/>
+          </a:bodyPr>
+          <a:p>
+            <a:pPr>
+              <a:lnSpc>
+                <a:spcPct val="100000"/>
+              </a:lnSpc>
+            </a:pPr>
+            <a:r>
+              <a:rPr b="0" lang="pt-BR" sz="1800" spc="-1" strike="noStrike">
+                <a:latin typeface="Arial"/>
+              </a:rPr>
+              <a:t>Obrigada!</a:t>
+            </a:r>
+            <a:endParaRPr b="0" lang="pt-BR" sz="1800" spc="-1" strike="noStrike">
               <a:latin typeface="Arial"/>
             </a:endParaRPr>
           </a:p>
@@ -4625,7 +7328,7 @@
         <p:spPr>
           <a:xfrm>
             <a:off x="0" y="1001880"/>
-            <a:ext cx="9143280" cy="664560"/>
+            <a:ext cx="9142920" cy="664200"/>
           </a:xfrm>
           <a:prstGeom prst="rect">
             <a:avLst/>
@@ -4669,7 +7372,7 @@
         <p:spPr>
           <a:xfrm>
             <a:off x="206280" y="1100160"/>
-            <a:ext cx="8735400" cy="470880"/>
+            <a:ext cx="8735040" cy="470520"/>
           </a:xfrm>
           <a:prstGeom prst="rect">
             <a:avLst/>
@@ -4720,7 +7423,7 @@
         <p:spPr>
           <a:xfrm>
             <a:off x="179280" y="1770120"/>
-            <a:ext cx="8827200" cy="4118760"/>
+            <a:ext cx="8826840" cy="4118400"/>
           </a:xfrm>
           <a:prstGeom prst="rect">
             <a:avLst/>
@@ -4793,7 +7496,7 @@
         <p:spPr>
           <a:xfrm>
             <a:off x="228600" y="461880"/>
-            <a:ext cx="8825760" cy="445680"/>
+            <a:ext cx="8825400" cy="445320"/>
           </a:xfrm>
           <a:prstGeom prst="rect">
             <a:avLst/>
@@ -4848,7 +7551,7 @@
         <p:spPr>
           <a:xfrm>
             <a:off x="1440000" y="1849320"/>
-            <a:ext cx="5975640" cy="4126320"/>
+            <a:ext cx="5975280" cy="4125960"/>
           </a:xfrm>
           <a:prstGeom prst="rect">
             <a:avLst/>
@@ -4897,7 +7600,7 @@
         <p:spPr>
           <a:xfrm>
             <a:off x="0" y="1001880"/>
-            <a:ext cx="9143280" cy="664560"/>
+            <a:ext cx="9142920" cy="664200"/>
           </a:xfrm>
           <a:prstGeom prst="rect">
             <a:avLst/>
@@ -4941,7 +7644,7 @@
         <p:spPr>
           <a:xfrm>
             <a:off x="206280" y="1100160"/>
-            <a:ext cx="8735400" cy="470880"/>
+            <a:ext cx="8735040" cy="470520"/>
           </a:xfrm>
           <a:prstGeom prst="rect">
             <a:avLst/>
@@ -4992,7 +7695,7 @@
         <p:spPr>
           <a:xfrm>
             <a:off x="179280" y="1770120"/>
-            <a:ext cx="8827200" cy="4118760"/>
+            <a:ext cx="8826840" cy="4118400"/>
           </a:xfrm>
           <a:prstGeom prst="rect">
             <a:avLst/>
@@ -5065,7 +7768,7 @@
         <p:spPr>
           <a:xfrm>
             <a:off x="228600" y="461880"/>
-            <a:ext cx="8825760" cy="445680"/>
+            <a:ext cx="8825400" cy="445320"/>
           </a:xfrm>
           <a:prstGeom prst="rect">
             <a:avLst/>
@@ -5116,7 +7819,7 @@
         <p:spPr>
           <a:xfrm>
             <a:off x="288000" y="1944000"/>
-            <a:ext cx="8279640" cy="4008240"/>
+            <a:ext cx="8279280" cy="4007880"/>
           </a:xfrm>
           <a:prstGeom prst="rect">
             <a:avLst/>
@@ -5137,7 +7840,7 @@
             <a:noAutofit/>
           </a:bodyPr>
           <a:p>
-            <a:pPr marL="216000" indent="-215640">
+            <a:pPr marL="216000" indent="-215280">
               <a:lnSpc>
                 <a:spcPct val="100000"/>
               </a:lnSpc>
@@ -5154,6 +7857,7 @@
                   <a:srgbClr val="404040"/>
                 </a:solidFill>
                 <a:latin typeface="Calibri"/>
+                <a:ea typeface="DejaVu Sans"/>
               </a:rPr>
               <a:t>RNF01 - O Sistema deverá ser implantável por módulo </a:t>
             </a:r>
@@ -5162,7 +7866,7 @@
             </a:endParaRPr>
           </a:p>
           <a:p>
-            <a:pPr marL="216000" indent="-215640">
+            <a:pPr marL="216000" indent="-215280">
               <a:lnSpc>
                 <a:spcPct val="100000"/>
               </a:lnSpc>
@@ -5179,6 +7883,7 @@
                   <a:srgbClr val="404040"/>
                 </a:solidFill>
                 <a:latin typeface="Calibri"/>
+                <a:ea typeface="DejaVu Sans"/>
               </a:rPr>
               <a:t>RNF02 - O sistema deve prover boa usabilidade </a:t>
             </a:r>
@@ -5187,7 +7892,7 @@
             </a:endParaRPr>
           </a:p>
           <a:p>
-            <a:pPr marL="216000" indent="-215640">
+            <a:pPr marL="216000" indent="-215280">
               <a:lnSpc>
                 <a:spcPct val="100000"/>
               </a:lnSpc>
@@ -5204,6 +7909,7 @@
                   <a:srgbClr val="404040"/>
                 </a:solidFill>
                 <a:latin typeface="Calibri"/>
+                <a:ea typeface="DejaVu Sans"/>
               </a:rPr>
               <a:t>RNF03 - O sistema deve suportar ambientes Web responsivos e ambientes móveis.</a:t>
             </a:r>
@@ -5212,7 +7918,7 @@
             </a:endParaRPr>
           </a:p>
           <a:p>
-            <a:pPr marL="216000" indent="-215640">
+            <a:pPr marL="216000" indent="-215280">
               <a:lnSpc>
                 <a:spcPct val="100000"/>
               </a:lnSpc>
@@ -5229,6 +7935,7 @@
                   <a:srgbClr val="404040"/>
                 </a:solidFill>
                 <a:latin typeface="Calibri"/>
+                <a:ea typeface="DejaVu Sans"/>
               </a:rPr>
               <a:t>RNF04 - O sistema deve ser rápido.</a:t>
             </a:r>
@@ -5237,7 +7944,7 @@
             </a:endParaRPr>
           </a:p>
           <a:p>
-            <a:pPr marL="216000" indent="-215640">
+            <a:pPr marL="216000" indent="-215280">
               <a:lnSpc>
                 <a:spcPct val="100000"/>
               </a:lnSpc>
@@ -5254,6 +7961,7 @@
                   <a:srgbClr val="404040"/>
                 </a:solidFill>
                 <a:latin typeface="Calibri"/>
+                <a:ea typeface="DejaVu Sans"/>
               </a:rPr>
               <a:t>RNF05 - O sistema deve apresentar manutenção facilitada.</a:t>
             </a:r>
@@ -5262,7 +7970,7 @@
             </a:endParaRPr>
           </a:p>
           <a:p>
-            <a:pPr marL="216000" indent="-215640">
+            <a:pPr marL="216000" indent="-215280">
               <a:lnSpc>
                 <a:spcPct val="100000"/>
               </a:lnSpc>
@@ -5279,6 +7987,7 @@
                   <a:srgbClr val="404040"/>
                 </a:solidFill>
                 <a:latin typeface="Calibri"/>
+                <a:ea typeface="DejaVu Sans"/>
               </a:rPr>
               <a:t>RNF06 - O sistema deve ser simples para testar.</a:t>
             </a:r>
@@ -5287,7 +7996,7 @@
             </a:endParaRPr>
           </a:p>
           <a:p>
-            <a:pPr marL="216000" indent="-215640">
+            <a:pPr marL="216000" indent="-215280">
               <a:lnSpc>
                 <a:spcPct val="100000"/>
               </a:lnSpc>
@@ -5304,6 +8013,7 @@
                   <a:srgbClr val="404040"/>
                 </a:solidFill>
                 <a:latin typeface="Calibri"/>
+                <a:ea typeface="DejaVu Sans"/>
               </a:rPr>
               <a:t>RNF07 - O sistema deve se comunicar com os sistemas dos agentes. </a:t>
             </a:r>
@@ -5313,6 +8023,7 @@
                   <a:srgbClr val="404040"/>
                 </a:solidFill>
                 <a:latin typeface="Calibri"/>
+                <a:ea typeface="DejaVu Sans"/>
               </a:rPr>
               <a:t>Alguns desses sistemas são antigos e desenvolvido com tecnologia COBOL/CICS</a:t>
             </a:r>
@@ -5321,7 +8032,7 @@
             </a:endParaRPr>
           </a:p>
           <a:p>
-            <a:pPr marL="216000" indent="-215640">
+            <a:pPr marL="216000" indent="-215280">
               <a:lnSpc>
                 <a:spcPct val="100000"/>
               </a:lnSpc>
@@ -5338,6 +8049,7 @@
                   <a:srgbClr val="404040"/>
                 </a:solidFill>
                 <a:latin typeface="Calibri"/>
+                <a:ea typeface="DejaVu Sans"/>
               </a:rPr>
               <a:t>RNF08 - O sistema deve operar em qualquer período do dia e da noite. </a:t>
             </a:r>
@@ -5346,7 +8058,7 @@
             </a:endParaRPr>
           </a:p>
           <a:p>
-            <a:pPr marL="216000" indent="-215640">
+            <a:pPr marL="216000" indent="-215280">
               <a:lnSpc>
                 <a:spcPct val="100000"/>
               </a:lnSpc>
@@ -5363,6 +8075,7 @@
                   <a:srgbClr val="404040"/>
                 </a:solidFill>
                 <a:latin typeface="Calibri"/>
+                <a:ea typeface="DejaVu Sans"/>
               </a:rPr>
               <a:t>RNF09 - O sistema deve apresentar altos padrões de segurança.  </a:t>
             </a:r>
@@ -5371,7 +8084,7 @@
             </a:endParaRPr>
           </a:p>
           <a:p>
-            <a:pPr marL="216000" indent="-215640">
+            <a:pPr marL="216000" indent="-215280">
               <a:lnSpc>
                 <a:spcPct val="100000"/>
               </a:lnSpc>
@@ -5388,6 +8101,7 @@
                   <a:srgbClr val="404040"/>
                 </a:solidFill>
                 <a:latin typeface="Calibri"/>
+                <a:ea typeface="DejaVu Sans"/>
               </a:rPr>
               <a:t>RNF10 - O sistema deve prover integração contínua</a:t>
             </a:r>
@@ -5396,7 +8110,7 @@
             </a:endParaRPr>
           </a:p>
           <a:p>
-            <a:pPr marL="216000" indent="-215640">
+            <a:pPr marL="216000" indent="-215280">
               <a:lnSpc>
                 <a:spcPct val="100000"/>
               </a:lnSpc>
@@ -5413,6 +8127,7 @@
                   <a:srgbClr val="404040"/>
                 </a:solidFill>
                 <a:latin typeface="Calibri"/>
+                <a:ea typeface="DejaVu Sans"/>
               </a:rPr>
               <a:t>RNF11 - O sistema deve prover implantação contínua</a:t>
             </a:r>
@@ -5421,7 +8136,7 @@
             </a:endParaRPr>
           </a:p>
           <a:p>
-            <a:pPr marL="216000" indent="-215640">
+            <a:pPr marL="216000" indent="-215280">
               <a:lnSpc>
                 <a:spcPct val="100000"/>
               </a:lnSpc>
@@ -5438,6 +8153,7 @@
                   <a:srgbClr val="404040"/>
                 </a:solidFill>
                 <a:latin typeface="Calibri"/>
+                <a:ea typeface="DejaVu Sans"/>
               </a:rPr>
               <a:t>RNF12 - O sistema deve prover alta disponibilidade</a:t>
             </a:r>
@@ -5447,6 +8163,7 @@
                   <a:srgbClr val="404040"/>
                 </a:solidFill>
                 <a:latin typeface="Calibri"/>
+                <a:ea typeface="DejaVu Sans"/>
               </a:rPr>
               <a:t> </a:t>
             </a:r>
@@ -5495,7 +8212,7 @@
         <p:spPr>
           <a:xfrm>
             <a:off x="0" y="1001880"/>
-            <a:ext cx="9143280" cy="664560"/>
+            <a:ext cx="9142920" cy="664200"/>
           </a:xfrm>
           <a:prstGeom prst="rect">
             <a:avLst/>
@@ -5539,7 +8256,7 @@
         <p:spPr>
           <a:xfrm>
             <a:off x="206280" y="1100160"/>
-            <a:ext cx="8735400" cy="470880"/>
+            <a:ext cx="8735040" cy="470520"/>
           </a:xfrm>
           <a:prstGeom prst="rect">
             <a:avLst/>
@@ -5590,7 +8307,7 @@
         <p:spPr>
           <a:xfrm>
             <a:off x="179280" y="1770120"/>
-            <a:ext cx="8827200" cy="4118760"/>
+            <a:ext cx="8826840" cy="4118400"/>
           </a:xfrm>
           <a:prstGeom prst="rect">
             <a:avLst/>
@@ -5611,7 +8328,7 @@
             <a:noAutofit/>
           </a:bodyPr>
           <a:p>
-            <a:pPr marL="216000" indent="-215640">
+            <a:pPr marL="216000" indent="-215280">
               <a:lnSpc>
                 <a:spcPct val="100000"/>
               </a:lnSpc>
@@ -5647,7 +8364,7 @@
             </a:endParaRPr>
           </a:p>
           <a:p>
-            <a:pPr marL="216000" indent="-215640">
+            <a:pPr marL="216000" indent="-215280">
               <a:lnSpc>
                 <a:spcPct val="100000"/>
               </a:lnSpc>
@@ -5683,7 +8400,7 @@
             </a:endParaRPr>
           </a:p>
           <a:p>
-            <a:pPr marL="216000" indent="-215640">
+            <a:pPr marL="216000" indent="-215280">
               <a:lnSpc>
                 <a:spcPct val="100000"/>
               </a:lnSpc>
@@ -5719,7 +8436,7 @@
             </a:endParaRPr>
           </a:p>
           <a:p>
-            <a:pPr marL="216000" indent="-215640">
+            <a:pPr marL="216000" indent="-215280">
               <a:lnSpc>
                 <a:spcPct val="100000"/>
               </a:lnSpc>
@@ -5755,7 +8472,7 @@
             </a:endParaRPr>
           </a:p>
           <a:p>
-            <a:pPr marL="216000" indent="-215640">
+            <a:pPr marL="216000" indent="-215280">
               <a:lnSpc>
                 <a:spcPct val="100000"/>
               </a:lnSpc>
@@ -5817,7 +8534,7 @@
         <p:spPr>
           <a:xfrm>
             <a:off x="228600" y="461880"/>
-            <a:ext cx="8825760" cy="445680"/>
+            <a:ext cx="8825400" cy="445320"/>
           </a:xfrm>
           <a:prstGeom prst="rect">
             <a:avLst/>
@@ -5898,7 +8615,7 @@
         <p:spPr>
           <a:xfrm>
             <a:off x="0" y="1001880"/>
-            <a:ext cx="9143280" cy="664560"/>
+            <a:ext cx="9142920" cy="664200"/>
           </a:xfrm>
           <a:prstGeom prst="rect">
             <a:avLst/>
@@ -5942,7 +8659,7 @@
         <p:spPr>
           <a:xfrm>
             <a:off x="206280" y="1100160"/>
-            <a:ext cx="8735400" cy="470880"/>
+            <a:ext cx="8735040" cy="470520"/>
           </a:xfrm>
           <a:prstGeom prst="rect">
             <a:avLst/>
@@ -5993,7 +8710,7 @@
         <p:spPr>
           <a:xfrm>
             <a:off x="179280" y="1770120"/>
-            <a:ext cx="8827200" cy="4118760"/>
+            <a:ext cx="8826840" cy="4118400"/>
           </a:xfrm>
           <a:prstGeom prst="rect">
             <a:avLst/>
@@ -6076,7 +8793,7 @@
         <p:spPr>
           <a:xfrm>
             <a:off x="228600" y="461880"/>
-            <a:ext cx="8825760" cy="445680"/>
+            <a:ext cx="8825400" cy="445320"/>
           </a:xfrm>
           <a:prstGeom prst="rect">
             <a:avLst/>
@@ -6131,7 +8848,7 @@
         <p:spPr>
           <a:xfrm>
             <a:off x="1953000" y="1739520"/>
-            <a:ext cx="4742640" cy="4236120"/>
+            <a:ext cx="4742280" cy="4235760"/>
           </a:xfrm>
           <a:prstGeom prst="rect">
             <a:avLst/>
@@ -6180,7 +8897,7 @@
         <p:spPr>
           <a:xfrm>
             <a:off x="0" y="1001880"/>
-            <a:ext cx="9143280" cy="664560"/>
+            <a:ext cx="9142920" cy="664200"/>
           </a:xfrm>
           <a:prstGeom prst="rect">
             <a:avLst/>
@@ -6224,7 +8941,7 @@
         <p:spPr>
           <a:xfrm>
             <a:off x="206280" y="1100160"/>
-            <a:ext cx="8735400" cy="470880"/>
+            <a:ext cx="8735040" cy="470520"/>
           </a:xfrm>
           <a:prstGeom prst="rect">
             <a:avLst/>
@@ -6268,17 +8985,7 @@
                 <a:latin typeface="Calibri"/>
                 <a:ea typeface="Calibri"/>
               </a:rPr>
-              <a:t>Roteamento de Mensagens e </a:t>
-            </a:r>
-            <a:r>
-              <a:rPr b="1" lang="pt-BR" sz="2500" spc="-1" strike="noStrike">
-                <a:solidFill>
-                  <a:srgbClr val="000000"/>
-                </a:solidFill>
-                <a:latin typeface="Calibri"/>
-                <a:ea typeface="Calibri"/>
-              </a:rPr>
-              <a:t>Diagrama de Componentes</a:t>
+              <a:t>Roteamento de Mensagens e Diagrama de Componentes</a:t>
             </a:r>
             <a:endParaRPr b="0" lang="pt-BR" sz="2500" spc="-1" strike="noStrike">
               <a:latin typeface="Arial"/>
@@ -6295,7 +9002,7 @@
         <p:spPr>
           <a:xfrm>
             <a:off x="179280" y="1770120"/>
-            <a:ext cx="8827200" cy="4118760"/>
+            <a:ext cx="8826840" cy="4118400"/>
           </a:xfrm>
           <a:prstGeom prst="rect">
             <a:avLst/>
@@ -6384,7 +9091,7 @@
         <p:spPr>
           <a:xfrm>
             <a:off x="228600" y="461880"/>
-            <a:ext cx="8825760" cy="445680"/>
+            <a:ext cx="8825400" cy="445320"/>
           </a:xfrm>
           <a:prstGeom prst="rect">
             <a:avLst/>
@@ -6439,7 +9146,7 @@
         <p:spPr>
           <a:xfrm>
             <a:off x="5328000" y="1770120"/>
-            <a:ext cx="3633480" cy="4220640"/>
+            <a:ext cx="3633120" cy="4220280"/>
           </a:xfrm>
           <a:prstGeom prst="rect">
             <a:avLst/>
@@ -6462,7 +9169,7 @@
         <p:spPr>
           <a:xfrm>
             <a:off x="179280" y="1756440"/>
-            <a:ext cx="5095080" cy="4268880"/>
+            <a:ext cx="5094720" cy="4268520"/>
           </a:xfrm>
           <a:prstGeom prst="rect">
             <a:avLst/>
@@ -6511,7 +9218,7 @@
         <p:spPr>
           <a:xfrm>
             <a:off x="0" y="1001880"/>
-            <a:ext cx="9143280" cy="664560"/>
+            <a:ext cx="9142920" cy="664200"/>
           </a:xfrm>
           <a:prstGeom prst="rect">
             <a:avLst/>
@@ -6555,7 +9262,7 @@
         <p:spPr>
           <a:xfrm>
             <a:off x="206280" y="1100160"/>
-            <a:ext cx="8735400" cy="470880"/>
+            <a:ext cx="8735040" cy="470520"/>
           </a:xfrm>
           <a:prstGeom prst="rect">
             <a:avLst/>
@@ -6606,7 +9313,7 @@
         <p:spPr>
           <a:xfrm>
             <a:off x="179280" y="1770120"/>
-            <a:ext cx="8827200" cy="4118760"/>
+            <a:ext cx="8826840" cy="4118400"/>
           </a:xfrm>
           <a:prstGeom prst="rect">
             <a:avLst/>
@@ -6695,7 +9402,7 @@
         <p:spPr>
           <a:xfrm>
             <a:off x="228600" y="461880"/>
-            <a:ext cx="8825760" cy="445680"/>
+            <a:ext cx="8825400" cy="445320"/>
           </a:xfrm>
           <a:prstGeom prst="rect">
             <a:avLst/>
@@ -6750,7 +9457,7 @@
         <p:spPr>
           <a:xfrm>
             <a:off x="792000" y="1944000"/>
-            <a:ext cx="7552440" cy="3933000"/>
+            <a:ext cx="7552080" cy="3932640"/>
           </a:xfrm>
           <a:prstGeom prst="rect">
             <a:avLst/>
@@ -6799,7 +9506,7 @@
         <p:spPr>
           <a:xfrm>
             <a:off x="0" y="1001880"/>
-            <a:ext cx="9143280" cy="664560"/>
+            <a:ext cx="9142920" cy="664200"/>
           </a:xfrm>
           <a:prstGeom prst="rect">
             <a:avLst/>
@@ -6843,7 +9550,7 @@
         <p:spPr>
           <a:xfrm>
             <a:off x="206280" y="1100160"/>
-            <a:ext cx="8735400" cy="470880"/>
+            <a:ext cx="8735040" cy="470520"/>
           </a:xfrm>
           <a:prstGeom prst="rect">
             <a:avLst/>
@@ -6894,7 +9601,7 @@
         <p:spPr>
           <a:xfrm>
             <a:off x="179280" y="1770120"/>
-            <a:ext cx="8827200" cy="4118760"/>
+            <a:ext cx="8826840" cy="4118400"/>
           </a:xfrm>
           <a:prstGeom prst="rect">
             <a:avLst/>
@@ -6983,7 +9690,7 @@
         <p:spPr>
           <a:xfrm>
             <a:off x="228600" y="461880"/>
-            <a:ext cx="8825760" cy="445680"/>
+            <a:ext cx="8825400" cy="445320"/>
           </a:xfrm>
           <a:prstGeom prst="rect">
             <a:avLst/>
@@ -7038,7 +9745,7 @@
         <p:spPr>
           <a:xfrm>
             <a:off x="1402200" y="1770120"/>
-            <a:ext cx="6085800" cy="4169520"/>
+            <a:ext cx="6085440" cy="4169160"/>
           </a:xfrm>
           <a:prstGeom prst="rect">
             <a:avLst/>

</xml_diff>